<commit_message>
Normal distribution section is added.
</commit_message>
<xml_diff>
--- a/Distributions.pptx
+++ b/Distributions.pptx
@@ -5,13 +5,19 @@
     <p:sldMasterId id="2147483660" r:id="rId1"/>
   </p:sldMasterIdLst>
   <p:notesMasterIdLst>
-    <p:notesMasterId r:id="rId6"/>
+    <p:notesMasterId r:id="rId12"/>
   </p:notesMasterIdLst>
   <p:sldIdLst>
     <p:sldId id="257" r:id="rId2"/>
     <p:sldId id="256" r:id="rId3"/>
     <p:sldId id="258" r:id="rId4"/>
     <p:sldId id="259" r:id="rId5"/>
+    <p:sldId id="260" r:id="rId6"/>
+    <p:sldId id="261" r:id="rId7"/>
+    <p:sldId id="262" r:id="rId8"/>
+    <p:sldId id="263" r:id="rId9"/>
+    <p:sldId id="264" r:id="rId10"/>
+    <p:sldId id="265" r:id="rId11"/>
   </p:sldIdLst>
   <p:sldSz cx="9144000" cy="6858000" type="screen4x3"/>
   <p:notesSz cx="6858000" cy="9144000"/>
@@ -212,7 +218,7 @@
           <a:p>
             <a:fld id="{CD863C69-6AC4-4515-84BB-C614EE551B82}" type="datetimeFigureOut">
               <a:rPr lang="ru-RU" smtClean="0"/>
-              <a:t>11.07.2019</a:t>
+              <a:t>21.07.2019</a:t>
             </a:fld>
             <a:endParaRPr lang="ru-RU"/>
           </a:p>
@@ -611,7 +617,7 @@
           <a:p>
             <a:fld id="{BF38C05E-219E-4729-9909-5B693F1E4DB2}" type="datetime1">
               <a:rPr lang="ru-RU" smtClean="0"/>
-              <a:t>11.07.2019</a:t>
+              <a:t>21.07.2019</a:t>
             </a:fld>
             <a:endParaRPr lang="ru-RU"/>
           </a:p>
@@ -781,7 +787,7 @@
           <a:p>
             <a:fld id="{E587BD1D-74D3-449F-A3CA-F47BBACDADC1}" type="datetime1">
               <a:rPr lang="ru-RU" smtClean="0"/>
-              <a:t>11.07.2019</a:t>
+              <a:t>21.07.2019</a:t>
             </a:fld>
             <a:endParaRPr lang="ru-RU"/>
           </a:p>
@@ -961,7 +967,7 @@
           <a:p>
             <a:fld id="{F156E365-3C59-403F-A598-8903968D44C1}" type="datetime1">
               <a:rPr lang="ru-RU" smtClean="0"/>
-              <a:t>11.07.2019</a:t>
+              <a:t>21.07.2019</a:t>
             </a:fld>
             <a:endParaRPr lang="ru-RU"/>
           </a:p>
@@ -1131,7 +1137,7 @@
           <a:p>
             <a:fld id="{D71D973D-7295-497C-A5AE-B81A0C1EA542}" type="datetime1">
               <a:rPr lang="ru-RU" smtClean="0"/>
-              <a:t>11.07.2019</a:t>
+              <a:t>21.07.2019</a:t>
             </a:fld>
             <a:endParaRPr lang="ru-RU"/>
           </a:p>
@@ -1375,7 +1381,7 @@
           <a:p>
             <a:fld id="{D43ACA65-1DF0-4542-9513-2573006F2B09}" type="datetime1">
               <a:rPr lang="ru-RU" smtClean="0"/>
-              <a:t>11.07.2019</a:t>
+              <a:t>21.07.2019</a:t>
             </a:fld>
             <a:endParaRPr lang="ru-RU"/>
           </a:p>
@@ -1607,7 +1613,7 @@
           <a:p>
             <a:fld id="{CE5D4F0D-BE92-42E2-AC19-D4AE919B8EEA}" type="datetime1">
               <a:rPr lang="ru-RU" smtClean="0"/>
-              <a:t>11.07.2019</a:t>
+              <a:t>21.07.2019</a:t>
             </a:fld>
             <a:endParaRPr lang="ru-RU"/>
           </a:p>
@@ -1974,7 +1980,7 @@
           <a:p>
             <a:fld id="{31712A4F-404C-4E2A-B048-29FEE1F56BCC}" type="datetime1">
               <a:rPr lang="ru-RU" smtClean="0"/>
-              <a:t>11.07.2019</a:t>
+              <a:t>21.07.2019</a:t>
             </a:fld>
             <a:endParaRPr lang="ru-RU"/>
           </a:p>
@@ -2092,7 +2098,7 @@
           <a:p>
             <a:fld id="{A591E32F-21C9-4A73-9D8C-CB8422C8AD99}" type="datetime1">
               <a:rPr lang="ru-RU" smtClean="0"/>
-              <a:t>11.07.2019</a:t>
+              <a:t>21.07.2019</a:t>
             </a:fld>
             <a:endParaRPr lang="ru-RU"/>
           </a:p>
@@ -2187,7 +2193,7 @@
           <a:p>
             <a:fld id="{E8BE7035-4758-4463-AF71-B436150BF40F}" type="datetime1">
               <a:rPr lang="ru-RU" smtClean="0"/>
-              <a:t>11.07.2019</a:t>
+              <a:t>21.07.2019</a:t>
             </a:fld>
             <a:endParaRPr lang="ru-RU"/>
           </a:p>
@@ -2464,7 +2470,7 @@
           <a:p>
             <a:fld id="{8BF22BB4-229E-48DC-A891-0BD3792CC568}" type="datetime1">
               <a:rPr lang="ru-RU" smtClean="0"/>
-              <a:t>11.07.2019</a:t>
+              <a:t>21.07.2019</a:t>
             </a:fld>
             <a:endParaRPr lang="ru-RU"/>
           </a:p>
@@ -2721,7 +2727,7 @@
           <a:p>
             <a:fld id="{B32F65DE-1A63-4DFF-816D-2C4DB2F0AABF}" type="datetime1">
               <a:rPr lang="ru-RU" smtClean="0"/>
-              <a:t>11.07.2019</a:t>
+              <a:t>21.07.2019</a:t>
             </a:fld>
             <a:endParaRPr lang="ru-RU"/>
           </a:p>
@@ -2934,7 +2940,7 @@
           <a:p>
             <a:fld id="{58F37F58-E97F-4EAB-9CA9-C9A7312871A5}" type="datetime1">
               <a:rPr lang="ru-RU" smtClean="0"/>
-              <a:t>11.07.2019</a:t>
+              <a:t>21.07.2019</a:t>
             </a:fld>
             <a:endParaRPr lang="ru-RU"/>
           </a:p>
@@ -3469,6 +3475,500 @@
 </p:sld>
 </file>
 
+<file path=ppt/slides/slide10.xml><?xml version="1.0" encoding="utf-8"?>
+<p:sld xmlns:a="http://schemas.openxmlformats.org/drawingml/2006/main" xmlns:r="http://schemas.openxmlformats.org/officeDocument/2006/relationships" xmlns:p="http://schemas.openxmlformats.org/presentationml/2006/main">
+  <p:cSld>
+    <p:spTree>
+      <p:nvGrpSpPr>
+        <p:cNvPr id="1" name=""/>
+        <p:cNvGrpSpPr/>
+        <p:nvPr/>
+      </p:nvGrpSpPr>
+      <p:grpSpPr>
+        <a:xfrm>
+          <a:off x="0" y="0"/>
+          <a:ext cx="0" cy="0"/>
+          <a:chOff x="0" y="0"/>
+          <a:chExt cx="0" cy="0"/>
+        </a:xfrm>
+      </p:grpSpPr>
+      <p:sp>
+        <p:nvSpPr>
+          <p:cNvPr id="4" name="Номер слайда 3"/>
+          <p:cNvSpPr>
+            <a:spLocks noGrp="1"/>
+          </p:cNvSpPr>
+          <p:nvPr>
+            <p:ph type="sldNum" sz="quarter" idx="12"/>
+          </p:nvPr>
+        </p:nvSpPr>
+        <p:spPr/>
+        <p:txBody>
+          <a:bodyPr/>
+          <a:lstStyle/>
+          <a:p>
+            <a:fld id="{C936BD1D-689F-4FB2-8C94-2D2423F07E62}" type="slidenum">
+              <a:rPr lang="ru-RU" smtClean="0"/>
+              <a:t>10</a:t>
+            </a:fld>
+            <a:endParaRPr lang="ru-RU"/>
+          </a:p>
+        </p:txBody>
+      </p:sp>
+      <p:sp>
+        <p:nvSpPr>
+          <p:cNvPr id="5" name="Заголовок 1"/>
+          <p:cNvSpPr>
+            <a:spLocks noGrp="1"/>
+          </p:cNvSpPr>
+          <p:nvPr>
+            <p:ph type="title"/>
+          </p:nvPr>
+        </p:nvSpPr>
+        <p:spPr>
+          <a:xfrm>
+            <a:off x="547168" y="92968"/>
+            <a:ext cx="7886700" cy="422525"/>
+          </a:xfrm>
+        </p:spPr>
+        <p:txBody>
+          <a:bodyPr vert="horz" lIns="91440" tIns="45720" rIns="91440" bIns="45720" rtlCol="0" anchor="ctr">
+            <a:normAutofit/>
+          </a:bodyPr>
+          <a:lstStyle/>
+          <a:p>
+            <a:pPr algn="ctr"/>
+            <a:r>
+              <a:rPr lang="en-US" sz="2400" b="1" dirty="0" smtClean="0">
+                <a:solidFill>
+                  <a:srgbClr val="00B0F0"/>
+                </a:solidFill>
+              </a:rPr>
+              <a:t>Standard Normal Deviate</a:t>
+            </a:r>
+            <a:endParaRPr lang="ru-RU" sz="2400" b="1" dirty="0">
+              <a:solidFill>
+                <a:srgbClr val="00B0F0"/>
+              </a:solidFill>
+            </a:endParaRPr>
+          </a:p>
+        </p:txBody>
+      </p:sp>
+      <p:sp>
+        <p:nvSpPr>
+          <p:cNvPr id="7" name="Прямоугольник 6"/>
+          <p:cNvSpPr/>
+          <p:nvPr/>
+        </p:nvSpPr>
+        <p:spPr>
+          <a:xfrm>
+            <a:off x="269340" y="637058"/>
+            <a:ext cx="8442355" cy="923330"/>
+          </a:xfrm>
+          <a:prstGeom prst="rect">
+            <a:avLst/>
+          </a:prstGeom>
+        </p:spPr>
+        <p:txBody>
+          <a:bodyPr wrap="square">
+            <a:spAutoFit/>
+          </a:bodyPr>
+          <a:lstStyle/>
+          <a:p>
+            <a:pPr algn="just"/>
+            <a:r>
+              <a:rPr lang="en-US" dirty="0" smtClean="0">
+                <a:solidFill>
+                  <a:srgbClr val="373D3F"/>
+                </a:solidFill>
+                <a:latin typeface="proxima-nova"/>
+              </a:rPr>
+              <a:t>The </a:t>
+            </a:r>
+            <a:r>
+              <a:rPr lang="en-US" i="1" u="sng" dirty="0" smtClean="0">
+                <a:solidFill>
+                  <a:srgbClr val="373D3F"/>
+                </a:solidFill>
+                <a:latin typeface="proxima-nova"/>
+              </a:rPr>
+              <a:t>standard normal distribution</a:t>
+            </a:r>
+            <a:r>
+              <a:rPr lang="en-US" dirty="0" smtClean="0">
+                <a:solidFill>
+                  <a:srgbClr val="373D3F"/>
+                </a:solidFill>
+                <a:latin typeface="proxima-nova"/>
+              </a:rPr>
+              <a:t> is a normal distribution of standardized values called </a:t>
+            </a:r>
+            <a:r>
+              <a:rPr lang="en-US" b="1" i="1" dirty="0" smtClean="0">
+                <a:solidFill>
+                  <a:srgbClr val="373D3F"/>
+                </a:solidFill>
+                <a:latin typeface="proxima-nova"/>
+              </a:rPr>
+              <a:t>z</a:t>
+            </a:r>
+            <a:r>
+              <a:rPr lang="en-US" b="1" dirty="0" smtClean="0">
+                <a:solidFill>
+                  <a:srgbClr val="373D3F"/>
+                </a:solidFill>
+                <a:latin typeface="proxima-nova"/>
+              </a:rPr>
+              <a:t>-scores</a:t>
+            </a:r>
+            <a:r>
+              <a:rPr lang="en-US" dirty="0" smtClean="0">
+                <a:solidFill>
+                  <a:srgbClr val="373D3F"/>
+                </a:solidFill>
+                <a:latin typeface="proxima-nova"/>
+              </a:rPr>
+              <a:t>. </a:t>
+            </a:r>
+          </a:p>
+          <a:p>
+            <a:pPr algn="just"/>
+            <a:r>
+              <a:rPr lang="en-US" dirty="0" smtClean="0">
+                <a:solidFill>
+                  <a:srgbClr val="373D3F"/>
+                </a:solidFill>
+                <a:latin typeface="proxima-nova"/>
+              </a:rPr>
+              <a:t>A </a:t>
+            </a:r>
+            <a:r>
+              <a:rPr lang="en-US" i="1" dirty="0" smtClean="0">
+                <a:solidFill>
+                  <a:srgbClr val="373D3F"/>
+                </a:solidFill>
+                <a:latin typeface="proxima-nova"/>
+              </a:rPr>
+              <a:t>z</a:t>
+            </a:r>
+            <a:r>
+              <a:rPr lang="en-US" dirty="0" smtClean="0">
+                <a:solidFill>
+                  <a:srgbClr val="373D3F"/>
+                </a:solidFill>
+                <a:latin typeface="proxima-nova"/>
+              </a:rPr>
+              <a:t>-score is measured in units of the standard deviation. </a:t>
+            </a:r>
+            <a:endParaRPr lang="ru-RU" dirty="0"/>
+          </a:p>
+        </p:txBody>
+      </p:sp>
+      <p:sp>
+        <p:nvSpPr>
+          <p:cNvPr id="8" name="Прямоугольник 7"/>
+          <p:cNvSpPr/>
+          <p:nvPr/>
+        </p:nvSpPr>
+        <p:spPr>
+          <a:xfrm>
+            <a:off x="176946" y="5957505"/>
+            <a:ext cx="8234693" cy="276999"/>
+          </a:xfrm>
+          <a:prstGeom prst="rect">
+            <a:avLst/>
+          </a:prstGeom>
+        </p:spPr>
+        <p:txBody>
+          <a:bodyPr wrap="square">
+            <a:spAutoFit/>
+          </a:bodyPr>
+          <a:lstStyle/>
+          <a:p>
+            <a:r>
+              <a:rPr lang="en-US" sz="1200" dirty="0">
+                <a:hlinkClick r:id="rId2"/>
+              </a:rPr>
+              <a:t>https://courses.lumenlearning.com/introstats1/chapter/the-standard-normal-distribution/</a:t>
+            </a:r>
+            <a:endParaRPr lang="ru-RU" sz="1200" dirty="0"/>
+          </a:p>
+        </p:txBody>
+      </p:sp>
+      <p:pic>
+        <p:nvPicPr>
+          <p:cNvPr id="9" name="Рисунок 8"/>
+          <p:cNvPicPr>
+            <a:picLocks noChangeAspect="1"/>
+          </p:cNvPicPr>
+          <p:nvPr/>
+        </p:nvPicPr>
+        <p:blipFill>
+          <a:blip r:embed="rId3"/>
+          <a:stretch>
+            <a:fillRect/>
+          </a:stretch>
+        </p:blipFill>
+        <p:spPr>
+          <a:xfrm>
+            <a:off x="350822" y="2881368"/>
+            <a:ext cx="1535372" cy="690055"/>
+          </a:xfrm>
+          <a:prstGeom prst="rect">
+            <a:avLst/>
+          </a:prstGeom>
+        </p:spPr>
+      </p:pic>
+      <p:sp>
+        <p:nvSpPr>
+          <p:cNvPr id="10" name="Прямоугольник 9"/>
+          <p:cNvSpPr/>
+          <p:nvPr/>
+        </p:nvSpPr>
+        <p:spPr>
+          <a:xfrm>
+            <a:off x="208228" y="4039718"/>
+            <a:ext cx="8564578" cy="646331"/>
+          </a:xfrm>
+          <a:prstGeom prst="rect">
+            <a:avLst/>
+          </a:prstGeom>
+        </p:spPr>
+        <p:txBody>
+          <a:bodyPr wrap="square">
+            <a:spAutoFit/>
+          </a:bodyPr>
+          <a:lstStyle/>
+          <a:p>
+            <a:r>
+              <a:rPr lang="en-US" dirty="0">
+                <a:solidFill>
+                  <a:srgbClr val="373D3F"/>
+                </a:solidFill>
+                <a:latin typeface="proxima-nova"/>
+              </a:rPr>
+              <a:t>The </a:t>
+            </a:r>
+            <a:r>
+              <a:rPr lang="en-US" i="1" dirty="0" smtClean="0">
+                <a:solidFill>
+                  <a:srgbClr val="373D3F"/>
+                </a:solidFill>
+                <a:latin typeface="proxima-nova"/>
+              </a:rPr>
+              <a:t>z</a:t>
+            </a:r>
+            <a:r>
+              <a:rPr lang="en-US" dirty="0" smtClean="0">
+                <a:solidFill>
+                  <a:srgbClr val="373D3F"/>
+                </a:solidFill>
+                <a:latin typeface="proxima-nova"/>
+              </a:rPr>
+              <a:t>-score </a:t>
+            </a:r>
+            <a:r>
+              <a:rPr lang="en-US" dirty="0">
+                <a:solidFill>
+                  <a:srgbClr val="373D3F"/>
+                </a:solidFill>
+                <a:latin typeface="proxima-nova"/>
+              </a:rPr>
+              <a:t>tells you how many standard </a:t>
+            </a:r>
+            <a:r>
+              <a:rPr lang="en-US" dirty="0" smtClean="0">
+                <a:solidFill>
+                  <a:srgbClr val="373D3F"/>
+                </a:solidFill>
+                <a:latin typeface="proxima-nova"/>
+              </a:rPr>
+              <a:t>deviations (</a:t>
+            </a:r>
+            <a:r>
+              <a:rPr lang="el-GR" dirty="0" smtClean="0">
+                <a:solidFill>
+                  <a:srgbClr val="FF0000"/>
+                </a:solidFill>
+                <a:latin typeface="proxima-nova"/>
+              </a:rPr>
+              <a:t>σ</a:t>
+            </a:r>
+            <a:r>
+              <a:rPr lang="en-US" dirty="0" smtClean="0">
+                <a:solidFill>
+                  <a:srgbClr val="373D3F"/>
+                </a:solidFill>
+                <a:latin typeface="proxima-nova"/>
+              </a:rPr>
+              <a:t>) </a:t>
+            </a:r>
+            <a:r>
+              <a:rPr lang="en-US" dirty="0">
+                <a:solidFill>
+                  <a:srgbClr val="373D3F"/>
+                </a:solidFill>
+                <a:latin typeface="proxima-nova"/>
+              </a:rPr>
+              <a:t>the value </a:t>
+            </a:r>
+            <a:r>
+              <a:rPr lang="en-US" i="1" dirty="0">
+                <a:solidFill>
+                  <a:srgbClr val="FF0000"/>
+                </a:solidFill>
+                <a:latin typeface="proxima-nova"/>
+              </a:rPr>
+              <a:t>x</a:t>
+            </a:r>
+            <a:r>
+              <a:rPr lang="en-US" dirty="0">
+                <a:solidFill>
+                  <a:srgbClr val="373D3F"/>
+                </a:solidFill>
+                <a:latin typeface="proxima-nova"/>
+              </a:rPr>
+              <a:t> is above (to the right of) or below (to the left of) the mean, </a:t>
+            </a:r>
+            <a:r>
+              <a:rPr lang="en-US" i="1" dirty="0">
+                <a:solidFill>
+                  <a:srgbClr val="FF0000"/>
+                </a:solidFill>
+                <a:latin typeface="proxima-nova"/>
+              </a:rPr>
+              <a:t>μ</a:t>
+            </a:r>
+            <a:r>
+              <a:rPr lang="en-US" dirty="0">
+                <a:solidFill>
+                  <a:srgbClr val="373D3F"/>
+                </a:solidFill>
+                <a:latin typeface="proxima-nova"/>
+              </a:rPr>
+              <a:t>.</a:t>
+            </a:r>
+            <a:endParaRPr lang="ru-RU" dirty="0"/>
+          </a:p>
+        </p:txBody>
+      </p:sp>
+      <p:sp>
+        <p:nvSpPr>
+          <p:cNvPr id="11" name="Прямоугольник 10"/>
+          <p:cNvSpPr/>
+          <p:nvPr/>
+        </p:nvSpPr>
+        <p:spPr>
+          <a:xfrm>
+            <a:off x="208228" y="5083349"/>
+            <a:ext cx="7505324" cy="276999"/>
+          </a:xfrm>
+          <a:prstGeom prst="rect">
+            <a:avLst/>
+          </a:prstGeom>
+        </p:spPr>
+        <p:txBody>
+          <a:bodyPr wrap="square">
+            <a:spAutoFit/>
+          </a:bodyPr>
+          <a:lstStyle/>
+          <a:p>
+            <a:r>
+              <a:rPr lang="en-US" sz="1200" dirty="0" smtClean="0">
+                <a:hlinkClick r:id="rId4"/>
+              </a:rPr>
+              <a:t>https</a:t>
+            </a:r>
+            <a:r>
+              <a:rPr lang="en-US" sz="1200" dirty="0">
+                <a:hlinkClick r:id="rId4"/>
+              </a:rPr>
+              <a:t>://www.mathsisfun.com/data/standard-normal-distribution-table.html</a:t>
+            </a:r>
+            <a:endParaRPr lang="ru-RU" sz="1200" dirty="0"/>
+          </a:p>
+        </p:txBody>
+      </p:sp>
+      <p:sp>
+        <p:nvSpPr>
+          <p:cNvPr id="13" name="Прямоугольник 12"/>
+          <p:cNvSpPr/>
+          <p:nvPr/>
+        </p:nvSpPr>
+        <p:spPr>
+          <a:xfrm>
+            <a:off x="185999" y="4777118"/>
+            <a:ext cx="8564578" cy="307777"/>
+          </a:xfrm>
+          <a:prstGeom prst="rect">
+            <a:avLst/>
+          </a:prstGeom>
+        </p:spPr>
+        <p:txBody>
+          <a:bodyPr wrap="square">
+            <a:spAutoFit/>
+          </a:bodyPr>
+          <a:lstStyle/>
+          <a:p>
+            <a:r>
+              <a:rPr lang="en-US" sz="1400" b="1" dirty="0" smtClean="0">
+                <a:solidFill>
+                  <a:srgbClr val="373D3F"/>
+                </a:solidFill>
+                <a:latin typeface="proxima-nova"/>
+              </a:rPr>
+              <a:t>How to apply Z-tables:</a:t>
+            </a:r>
+            <a:r>
+              <a:rPr lang="en-US" sz="1400" dirty="0">
+                <a:solidFill>
+                  <a:srgbClr val="373D3F"/>
+                </a:solidFill>
+                <a:latin typeface="proxima-nova"/>
+              </a:rPr>
+              <a:t> </a:t>
+            </a:r>
+            <a:endParaRPr lang="ru-RU" sz="1400" dirty="0"/>
+          </a:p>
+        </p:txBody>
+      </p:sp>
+      <p:pic>
+        <p:nvPicPr>
+          <p:cNvPr id="14" name="Рисунок 13"/>
+          <p:cNvPicPr>
+            <a:picLocks noChangeAspect="1"/>
+          </p:cNvPicPr>
+          <p:nvPr/>
+        </p:nvPicPr>
+        <p:blipFill>
+          <a:blip r:embed="rId5"/>
+          <a:stretch>
+            <a:fillRect/>
+          </a:stretch>
+        </p:blipFill>
+        <p:spPr>
+          <a:xfrm>
+            <a:off x="467480" y="1512375"/>
+            <a:ext cx="5619750" cy="1133475"/>
+          </a:xfrm>
+          <a:prstGeom prst="rect">
+            <a:avLst/>
+          </a:prstGeom>
+        </p:spPr>
+      </p:pic>
+    </p:spTree>
+    <p:extLst>
+      <p:ext uri="{BB962C8B-B14F-4D97-AF65-F5344CB8AC3E}">
+        <p14:creationId xmlns:p14="http://schemas.microsoft.com/office/powerpoint/2010/main" val="2227307067"/>
+      </p:ext>
+    </p:extLst>
+  </p:cSld>
+  <p:clrMapOvr>
+    <a:masterClrMapping/>
+  </p:clrMapOvr>
+</p:sld>
+</file>
+
 <file path=ppt/slides/slide2.xml><?xml version="1.0" encoding="utf-8"?>
 <p:sld xmlns:a="http://schemas.openxmlformats.org/drawingml/2006/main" xmlns:r="http://schemas.openxmlformats.org/officeDocument/2006/relationships" xmlns:p="http://schemas.openxmlformats.org/presentationml/2006/main">
   <p:cSld>
@@ -3785,7 +4285,15 @@
             </a:pPr>
             <a:r>
               <a:rPr lang="en-US" dirty="0" smtClean="0"/>
-              <a:t>So it stipulates that random value is within the specific range from the mean.</a:t>
+              <a:t>So it </a:t>
+            </a:r>
+            <a:r>
+              <a:rPr lang="en-US" i="1" u="sng" dirty="0" smtClean="0"/>
+              <a:t>stipulates</a:t>
+            </a:r>
+            <a:r>
+              <a:rPr lang="en-US" dirty="0" smtClean="0"/>
+              <a:t> that random value is within the specific range from the mean.</a:t>
             </a:r>
           </a:p>
           <a:p>
@@ -3954,7 +4462,58 @@
             <a:pPr marL="0" indent="0" algn="just">
               <a:buNone/>
             </a:pPr>
+            <a:r>
+              <a:rPr lang="en-US" dirty="0" smtClean="0"/>
+              <a:t>↑ of the quantity of random variables -&gt; Arithmetic Mean loses the random property -&gt;</a:t>
+            </a:r>
+          </a:p>
+          <a:p>
+            <a:pPr marL="0" indent="0" algn="just">
+              <a:buNone/>
+            </a:pPr>
+            <a:r>
+              <a:rPr lang="en-US" dirty="0" smtClean="0">
+                <a:solidFill>
+                  <a:srgbClr val="FF0000"/>
+                </a:solidFill>
+              </a:rPr>
+              <a:t>Arithmetic Mean ~ Expected Value</a:t>
+            </a:r>
+          </a:p>
+          <a:p>
+            <a:pPr marL="0" indent="0" algn="just">
+              <a:buNone/>
+            </a:pPr>
             <a:endParaRPr lang="en-US" dirty="0" smtClean="0"/>
+          </a:p>
+          <a:p>
+            <a:pPr marL="0" indent="0" algn="just">
+              <a:buNone/>
+            </a:pPr>
+            <a:r>
+              <a:rPr lang="en-US" b="1" dirty="0" smtClean="0"/>
+              <a:t>On-job application:</a:t>
+            </a:r>
+          </a:p>
+          <a:p>
+            <a:pPr marL="0" indent="0" algn="just">
+              <a:buNone/>
+            </a:pPr>
+            <a:r>
+              <a:rPr lang="en-US" dirty="0" smtClean="0"/>
+              <a:t>The descriptive statistics of the sample is assumed to give sufficient description of the general population.</a:t>
+            </a:r>
+            <a:endParaRPr lang="uk-UA" dirty="0"/>
+          </a:p>
+          <a:p>
+            <a:pPr marL="0" indent="0" algn="just">
+              <a:buNone/>
+            </a:pPr>
+            <a:endParaRPr lang="en-US" dirty="0">
+              <a:solidFill>
+                <a:srgbClr val="FF0000"/>
+              </a:solidFill>
+            </a:endParaRPr>
           </a:p>
         </p:txBody>
       </p:sp>
@@ -4039,10 +4598,1789 @@
           </a:p>
         </p:txBody>
       </p:sp>
+      <p:sp>
+        <p:nvSpPr>
+          <p:cNvPr id="2" name="Прямоугольник 1"/>
+          <p:cNvSpPr/>
+          <p:nvPr/>
+        </p:nvSpPr>
+        <p:spPr>
+          <a:xfrm>
+            <a:off x="493413" y="5069321"/>
+            <a:ext cx="6296685" cy="369332"/>
+          </a:xfrm>
+          <a:prstGeom prst="rect">
+            <a:avLst/>
+          </a:prstGeom>
+        </p:spPr>
+        <p:txBody>
+          <a:bodyPr wrap="square">
+            <a:spAutoFit/>
+          </a:bodyPr>
+          <a:lstStyle/>
+          <a:p>
+            <a:r>
+              <a:rPr lang="en-US" dirty="0">
+                <a:hlinkClick r:id="rId2"/>
+              </a:rPr>
+              <a:t>http://www.statistics4u.com/fundstat_eng/cc_chebyshev.html</a:t>
+            </a:r>
+            <a:endParaRPr lang="ru-RU" dirty="0"/>
+          </a:p>
+        </p:txBody>
+      </p:sp>
     </p:spTree>
     <p:extLst>
       <p:ext uri="{BB962C8B-B14F-4D97-AF65-F5344CB8AC3E}">
         <p14:creationId xmlns:p14="http://schemas.microsoft.com/office/powerpoint/2010/main" val="401604747"/>
+      </p:ext>
+    </p:extLst>
+  </p:cSld>
+  <p:clrMapOvr>
+    <a:masterClrMapping/>
+  </p:clrMapOvr>
+</p:sld>
+</file>
+
+<file path=ppt/slides/slide5.xml><?xml version="1.0" encoding="utf-8"?>
+<p:sld xmlns:a="http://schemas.openxmlformats.org/drawingml/2006/main" xmlns:r="http://schemas.openxmlformats.org/officeDocument/2006/relationships" xmlns:p="http://schemas.openxmlformats.org/presentationml/2006/main">
+  <p:cSld>
+    <p:spTree>
+      <p:nvGrpSpPr>
+        <p:cNvPr id="1" name=""/>
+        <p:cNvGrpSpPr/>
+        <p:nvPr/>
+      </p:nvGrpSpPr>
+      <p:grpSpPr>
+        <a:xfrm>
+          <a:off x="0" y="0"/>
+          <a:ext cx="0" cy="0"/>
+          <a:chOff x="0" y="0"/>
+          <a:chExt cx="0" cy="0"/>
+        </a:xfrm>
+      </p:grpSpPr>
+      <p:sp>
+        <p:nvSpPr>
+          <p:cNvPr id="4" name="Номер слайда 3"/>
+          <p:cNvSpPr>
+            <a:spLocks noGrp="1"/>
+          </p:cNvSpPr>
+          <p:nvPr>
+            <p:ph type="sldNum" sz="quarter" idx="12"/>
+          </p:nvPr>
+        </p:nvSpPr>
+        <p:spPr/>
+        <p:txBody>
+          <a:bodyPr/>
+          <a:lstStyle/>
+          <a:p>
+            <a:fld id="{C936BD1D-689F-4FB2-8C94-2D2423F07E62}" type="slidenum">
+              <a:rPr lang="ru-RU" smtClean="0"/>
+              <a:t>5</a:t>
+            </a:fld>
+            <a:endParaRPr lang="ru-RU"/>
+          </a:p>
+        </p:txBody>
+      </p:sp>
+      <p:sp>
+        <p:nvSpPr>
+          <p:cNvPr id="5" name="Заголовок 1"/>
+          <p:cNvSpPr txBox="1">
+            <a:spLocks noGrp="1"/>
+          </p:cNvSpPr>
+          <p:nvPr>
+            <p:ph type="title"/>
+          </p:nvPr>
+        </p:nvSpPr>
+        <p:spPr>
+          <a:xfrm>
+            <a:off x="628650" y="365126"/>
+            <a:ext cx="7886700" cy="467793"/>
+          </a:xfrm>
+          <a:prstGeom prst="rect">
+            <a:avLst/>
+          </a:prstGeom>
+        </p:spPr>
+        <p:txBody>
+          <a:bodyPr vert="horz" lIns="91440" tIns="45720" rIns="91440" bIns="45720" rtlCol="0" anchor="ctr">
+            <a:normAutofit/>
+          </a:bodyPr>
+          <a:lstStyle/>
+          <a:p>
+            <a:pPr algn="ctr"/>
+            <a:r>
+              <a:rPr lang="en-US" sz="2400" b="1" dirty="0" smtClean="0">
+                <a:solidFill>
+                  <a:srgbClr val="00B0F0"/>
+                </a:solidFill>
+              </a:rPr>
+              <a:t>Bernoulli’s Theorem</a:t>
+            </a:r>
+            <a:endParaRPr lang="en-US" sz="2400" b="1" dirty="0">
+              <a:solidFill>
+                <a:srgbClr val="00B0F0"/>
+              </a:solidFill>
+            </a:endParaRPr>
+          </a:p>
+        </p:txBody>
+      </p:sp>
+      <p:sp>
+        <p:nvSpPr>
+          <p:cNvPr id="6" name="Прямоугольник 5"/>
+          <p:cNvSpPr/>
+          <p:nvPr/>
+        </p:nvSpPr>
+        <p:spPr>
+          <a:xfrm>
+            <a:off x="210493" y="1466662"/>
+            <a:ext cx="8723014" cy="1200329"/>
+          </a:xfrm>
+          <a:prstGeom prst="rect">
+            <a:avLst/>
+          </a:prstGeom>
+        </p:spPr>
+        <p:txBody>
+          <a:bodyPr wrap="square">
+            <a:spAutoFit/>
+          </a:bodyPr>
+          <a:lstStyle/>
+          <a:p>
+            <a:pPr algn="just"/>
+            <a:r>
+              <a:rPr lang="en-US" sz="2400" dirty="0"/>
+              <a:t>↑ of the quantity of </a:t>
+            </a:r>
+            <a:r>
+              <a:rPr lang="en-US" sz="2400" dirty="0" smtClean="0"/>
+              <a:t>observations </a:t>
+            </a:r>
+            <a:r>
+              <a:rPr lang="en-US" sz="2400" dirty="0"/>
+              <a:t>-&gt; </a:t>
+            </a:r>
+            <a:r>
+              <a:rPr lang="en-US" sz="2400" dirty="0" smtClean="0">
+                <a:solidFill>
+                  <a:srgbClr val="FF0000"/>
+                </a:solidFill>
+              </a:rPr>
+              <a:t>Frequency ~ Probability</a:t>
+            </a:r>
+            <a:r>
+              <a:rPr lang="en-US" sz="2400" dirty="0" smtClean="0"/>
+              <a:t> </a:t>
+            </a:r>
+          </a:p>
+          <a:p>
+            <a:pPr algn="just"/>
+            <a:endParaRPr lang="en-US" sz="2400" dirty="0" smtClean="0"/>
+          </a:p>
+          <a:p>
+            <a:pPr algn="just"/>
+            <a:r>
+              <a:rPr lang="en-US" sz="2400" dirty="0" smtClean="0"/>
+              <a:t>where P of random variable is within the range (0, 1] </a:t>
+            </a:r>
+          </a:p>
+        </p:txBody>
+      </p:sp>
+    </p:spTree>
+    <p:extLst>
+      <p:ext uri="{BB962C8B-B14F-4D97-AF65-F5344CB8AC3E}">
+        <p14:creationId xmlns:p14="http://schemas.microsoft.com/office/powerpoint/2010/main" val="779766482"/>
+      </p:ext>
+    </p:extLst>
+  </p:cSld>
+  <p:clrMapOvr>
+    <a:masterClrMapping/>
+  </p:clrMapOvr>
+</p:sld>
+</file>
+
+<file path=ppt/slides/slide6.xml><?xml version="1.0" encoding="utf-8"?>
+<p:sld xmlns:a="http://schemas.openxmlformats.org/drawingml/2006/main" xmlns:r="http://schemas.openxmlformats.org/officeDocument/2006/relationships" xmlns:p="http://schemas.openxmlformats.org/presentationml/2006/main">
+  <p:cSld>
+    <p:spTree>
+      <p:nvGrpSpPr>
+        <p:cNvPr id="1" name=""/>
+        <p:cNvGrpSpPr/>
+        <p:nvPr/>
+      </p:nvGrpSpPr>
+      <p:grpSpPr>
+        <a:xfrm>
+          <a:off x="0" y="0"/>
+          <a:ext cx="0" cy="0"/>
+          <a:chOff x="0" y="0"/>
+          <a:chExt cx="0" cy="0"/>
+        </a:xfrm>
+      </p:grpSpPr>
+      <p:sp>
+        <p:nvSpPr>
+          <p:cNvPr id="2" name="Заголовок 1"/>
+          <p:cNvSpPr>
+            <a:spLocks noGrp="1"/>
+          </p:cNvSpPr>
+          <p:nvPr>
+            <p:ph type="title"/>
+          </p:nvPr>
+        </p:nvSpPr>
+        <p:spPr>
+          <a:xfrm>
+            <a:off x="628650" y="365126"/>
+            <a:ext cx="7886700" cy="422525"/>
+          </a:xfrm>
+        </p:spPr>
+        <p:txBody>
+          <a:bodyPr vert="horz" lIns="91440" tIns="45720" rIns="91440" bIns="45720" rtlCol="0" anchor="ctr">
+            <a:normAutofit/>
+          </a:bodyPr>
+          <a:lstStyle/>
+          <a:p>
+            <a:pPr algn="ctr"/>
+            <a:r>
+              <a:rPr lang="en-US" sz="2400" b="1" dirty="0">
+                <a:solidFill>
+                  <a:srgbClr val="00B0F0"/>
+                </a:solidFill>
+              </a:rPr>
+              <a:t>Distribution properties</a:t>
+            </a:r>
+            <a:endParaRPr lang="ru-RU" sz="2400" b="1" dirty="0">
+              <a:solidFill>
+                <a:srgbClr val="00B0F0"/>
+              </a:solidFill>
+            </a:endParaRPr>
+          </a:p>
+        </p:txBody>
+      </p:sp>
+      <p:sp>
+        <p:nvSpPr>
+          <p:cNvPr id="4" name="Номер слайда 3"/>
+          <p:cNvSpPr>
+            <a:spLocks noGrp="1"/>
+          </p:cNvSpPr>
+          <p:nvPr>
+            <p:ph type="sldNum" sz="quarter" idx="12"/>
+          </p:nvPr>
+        </p:nvSpPr>
+        <p:spPr/>
+        <p:txBody>
+          <a:bodyPr/>
+          <a:lstStyle/>
+          <a:p>
+            <a:fld id="{C936BD1D-689F-4FB2-8C94-2D2423F07E62}" type="slidenum">
+              <a:rPr lang="ru-RU" smtClean="0"/>
+              <a:t>6</a:t>
+            </a:fld>
+            <a:endParaRPr lang="ru-RU"/>
+          </a:p>
+        </p:txBody>
+      </p:sp>
+      <p:pic>
+        <p:nvPicPr>
+          <p:cNvPr id="1027" name="Picture 3" descr="https://miro.medium.com/max/390/0*3XXCQed3bPHrD1lt.png"/>
+          <p:cNvPicPr>
+            <a:picLocks noChangeAspect="1" noChangeArrowheads="1"/>
+          </p:cNvPicPr>
+          <p:nvPr/>
+        </p:nvPicPr>
+        <p:blipFill>
+          <a:blip r:embed="rId2">
+            <a:extLst>
+              <a:ext uri="{28A0092B-C50C-407E-A947-70E740481C1C}">
+                <a14:useLocalDpi xmlns:a14="http://schemas.microsoft.com/office/drawing/2010/main" val="0"/>
+              </a:ext>
+            </a:extLst>
+          </a:blip>
+          <a:srcRect/>
+          <a:stretch>
+            <a:fillRect/>
+          </a:stretch>
+        </p:blipFill>
+        <p:spPr bwMode="auto">
+          <a:xfrm>
+            <a:off x="0" y="996655"/>
+            <a:ext cx="3714750" cy="3714751"/>
+          </a:xfrm>
+          <a:prstGeom prst="rect">
+            <a:avLst/>
+          </a:prstGeom>
+          <a:noFill/>
+          <a:extLst>
+            <a:ext uri="{909E8E84-426E-40DD-AFC4-6F175D3DCCD1}">
+              <a14:hiddenFill xmlns:a14="http://schemas.microsoft.com/office/drawing/2010/main">
+                <a:solidFill>
+                  <a:srgbClr val="FFFFFF"/>
+                </a:solidFill>
+              </a14:hiddenFill>
+            </a:ext>
+          </a:extLst>
+        </p:spPr>
+      </p:pic>
+      <p:sp>
+        <p:nvSpPr>
+          <p:cNvPr id="5" name="TextBox 4"/>
+          <p:cNvSpPr txBox="1"/>
+          <p:nvPr/>
+        </p:nvSpPr>
+        <p:spPr>
+          <a:xfrm>
+            <a:off x="452672" y="787651"/>
+            <a:ext cx="1303699" cy="369332"/>
+          </a:xfrm>
+          <a:prstGeom prst="rect">
+            <a:avLst/>
+          </a:prstGeom>
+          <a:noFill/>
+        </p:spPr>
+        <p:txBody>
+          <a:bodyPr wrap="square" rtlCol="0">
+            <a:spAutoFit/>
+          </a:bodyPr>
+          <a:lstStyle/>
+          <a:p>
+            <a:r>
+              <a:rPr lang="en-US" b="1" dirty="0" smtClean="0"/>
+              <a:t>Stationarity</a:t>
+            </a:r>
+            <a:endParaRPr lang="ru-RU" b="1" dirty="0"/>
+          </a:p>
+        </p:txBody>
+      </p:sp>
+      <p:sp>
+        <p:nvSpPr>
+          <p:cNvPr id="6" name="Прямоугольник 5"/>
+          <p:cNvSpPr/>
+          <p:nvPr/>
+        </p:nvSpPr>
+        <p:spPr>
+          <a:xfrm>
+            <a:off x="131274" y="4658800"/>
+            <a:ext cx="4834550" cy="261610"/>
+          </a:xfrm>
+          <a:prstGeom prst="rect">
+            <a:avLst/>
+          </a:prstGeom>
+        </p:spPr>
+        <p:txBody>
+          <a:bodyPr wrap="square">
+            <a:spAutoFit/>
+          </a:bodyPr>
+          <a:lstStyle/>
+          <a:p>
+            <a:r>
+              <a:rPr lang="en-US" sz="1100" dirty="0">
+                <a:hlinkClick r:id="rId3"/>
+              </a:rPr>
+              <a:t>https://towardsdatascience.com/stationarity-in-time-series-analysis-90c94f27322</a:t>
+            </a:r>
+            <a:endParaRPr lang="ru-RU" sz="1100" dirty="0"/>
+          </a:p>
+        </p:txBody>
+      </p:sp>
+      <p:sp>
+        <p:nvSpPr>
+          <p:cNvPr id="7" name="Прямоугольник 6"/>
+          <p:cNvSpPr/>
+          <p:nvPr/>
+        </p:nvSpPr>
+        <p:spPr>
+          <a:xfrm>
+            <a:off x="3873186" y="1156983"/>
+            <a:ext cx="5008264" cy="830997"/>
+          </a:xfrm>
+          <a:prstGeom prst="rect">
+            <a:avLst/>
+          </a:prstGeom>
+        </p:spPr>
+        <p:txBody>
+          <a:bodyPr wrap="square">
+            <a:spAutoFit/>
+          </a:bodyPr>
+          <a:lstStyle/>
+          <a:p>
+            <a:r>
+              <a:rPr lang="en-US" sz="1200" dirty="0" smtClean="0">
+                <a:solidFill>
+                  <a:srgbClr val="222222"/>
+                </a:solidFill>
+                <a:latin typeface="Arial" panose="020B0604020202020204" pitchFamily="34" charset="0"/>
+              </a:rPr>
+              <a:t>Distribution is</a:t>
+            </a:r>
+            <a:r>
+              <a:rPr lang="en-US" sz="1200" dirty="0">
+                <a:solidFill>
+                  <a:srgbClr val="222222"/>
+                </a:solidFill>
+                <a:latin typeface="Arial" panose="020B0604020202020204" pitchFamily="34" charset="0"/>
+              </a:rPr>
+              <a:t> </a:t>
+            </a:r>
+            <a:r>
+              <a:rPr lang="en-US" sz="1200" dirty="0">
+                <a:solidFill>
+                  <a:srgbClr val="FF0000"/>
+                </a:solidFill>
+                <a:latin typeface="Arial" panose="020B0604020202020204" pitchFamily="34" charset="0"/>
+              </a:rPr>
+              <a:t>stable</a:t>
+            </a:r>
+            <a:r>
+              <a:rPr lang="en-US" sz="1200" dirty="0">
+                <a:solidFill>
+                  <a:srgbClr val="222222"/>
+                </a:solidFill>
+                <a:latin typeface="Arial" panose="020B0604020202020204" pitchFamily="34" charset="0"/>
+              </a:rPr>
+              <a:t> if </a:t>
+            </a:r>
+            <a:r>
+              <a:rPr lang="en-US" sz="1200" dirty="0" smtClean="0">
+                <a:solidFill>
+                  <a:srgbClr val="222222"/>
+                </a:solidFill>
+                <a:latin typeface="Arial" panose="020B0604020202020204" pitchFamily="34" charset="0"/>
+              </a:rPr>
+              <a:t>a linear combination</a:t>
+            </a:r>
+            <a:r>
+              <a:rPr lang="en-US" sz="1200" dirty="0">
+                <a:solidFill>
+                  <a:srgbClr val="222222"/>
+                </a:solidFill>
+                <a:latin typeface="Arial" panose="020B0604020202020204" pitchFamily="34" charset="0"/>
+              </a:rPr>
+              <a:t> of two </a:t>
+            </a:r>
+            <a:r>
+              <a:rPr lang="en-US" sz="1200" dirty="0" smtClean="0">
+                <a:solidFill>
+                  <a:srgbClr val="222222"/>
+                </a:solidFill>
+                <a:latin typeface="Arial" panose="020B0604020202020204" pitchFamily="34" charset="0"/>
+              </a:rPr>
+              <a:t>independent random variables</a:t>
+            </a:r>
+            <a:r>
+              <a:rPr lang="en-US" sz="1200" dirty="0">
+                <a:solidFill>
+                  <a:srgbClr val="222222"/>
+                </a:solidFill>
+                <a:latin typeface="Arial" panose="020B0604020202020204" pitchFamily="34" charset="0"/>
+              </a:rPr>
+              <a:t> with this distribution has the same distribution, </a:t>
+            </a:r>
+            <a:r>
+              <a:rPr lang="en-US" sz="1200" dirty="0" smtClean="0">
+                <a:solidFill>
+                  <a:srgbClr val="222222"/>
+                </a:solidFill>
+                <a:latin typeface="Arial" panose="020B0604020202020204" pitchFamily="34" charset="0"/>
+              </a:rPr>
+              <a:t>up to location</a:t>
+            </a:r>
+            <a:r>
+              <a:rPr lang="en-US" sz="1200" dirty="0" smtClean="0">
+                <a:solidFill>
+                  <a:srgbClr val="222222"/>
+                </a:solidFill>
+                <a:latin typeface="Arial" panose="020B0604020202020204" pitchFamily="34" charset="0"/>
+                <a:hlinkClick r:id="rId4" tooltip="Up to"/>
+              </a:rPr>
+              <a:t> </a:t>
+            </a:r>
+            <a:r>
+              <a:rPr lang="en-US" sz="1200" dirty="0" smtClean="0">
+                <a:solidFill>
+                  <a:srgbClr val="222222"/>
+                </a:solidFill>
+                <a:latin typeface="Arial" panose="020B0604020202020204" pitchFamily="34" charset="0"/>
+              </a:rPr>
+              <a:t>and</a:t>
+            </a:r>
+            <a:r>
+              <a:rPr lang="en-US" sz="1200" dirty="0">
+                <a:solidFill>
+                  <a:srgbClr val="222222"/>
+                </a:solidFill>
+                <a:latin typeface="Arial" panose="020B0604020202020204" pitchFamily="34" charset="0"/>
+              </a:rPr>
+              <a:t> </a:t>
+            </a:r>
+            <a:r>
+              <a:rPr lang="en-US" sz="1200" dirty="0" smtClean="0">
+                <a:solidFill>
+                  <a:srgbClr val="222222"/>
+                </a:solidFill>
+                <a:latin typeface="Arial" panose="020B0604020202020204" pitchFamily="34" charset="0"/>
+              </a:rPr>
+              <a:t>scale</a:t>
+            </a:r>
+            <a:r>
+              <a:rPr lang="en-US" sz="1200" dirty="0">
+                <a:solidFill>
+                  <a:srgbClr val="222222"/>
+                </a:solidFill>
+                <a:latin typeface="Arial" panose="020B0604020202020204" pitchFamily="34" charset="0"/>
+              </a:rPr>
+              <a:t> parameters. </a:t>
+            </a:r>
+            <a:endParaRPr lang="en-US" sz="1200" dirty="0" smtClean="0">
+              <a:solidFill>
+                <a:srgbClr val="222222"/>
+              </a:solidFill>
+              <a:latin typeface="Arial" panose="020B0604020202020204" pitchFamily="34" charset="0"/>
+            </a:endParaRPr>
+          </a:p>
+          <a:p>
+            <a:r>
+              <a:rPr lang="en-US" sz="1200" dirty="0" smtClean="0">
+                <a:solidFill>
+                  <a:srgbClr val="222222"/>
+                </a:solidFill>
+                <a:latin typeface="Arial" panose="020B0604020202020204" pitchFamily="34" charset="0"/>
+              </a:rPr>
+              <a:t>A </a:t>
+            </a:r>
+            <a:r>
+              <a:rPr lang="en-US" sz="1200" i="1" u="sng" dirty="0">
+                <a:solidFill>
+                  <a:srgbClr val="222222"/>
+                </a:solidFill>
+                <a:latin typeface="Arial" panose="020B0604020202020204" pitchFamily="34" charset="0"/>
+              </a:rPr>
+              <a:t>random variable </a:t>
+            </a:r>
+            <a:r>
+              <a:rPr lang="en-US" sz="1200" dirty="0">
+                <a:solidFill>
+                  <a:srgbClr val="222222"/>
+                </a:solidFill>
+                <a:latin typeface="Arial" panose="020B0604020202020204" pitchFamily="34" charset="0"/>
+              </a:rPr>
+              <a:t>is  </a:t>
+            </a:r>
+            <a:r>
+              <a:rPr lang="en-US" sz="1200" i="1" u="sng" dirty="0">
+                <a:solidFill>
+                  <a:srgbClr val="222222"/>
+                </a:solidFill>
+                <a:latin typeface="Arial" panose="020B0604020202020204" pitchFamily="34" charset="0"/>
+              </a:rPr>
+              <a:t>stable</a:t>
+            </a:r>
+            <a:r>
+              <a:rPr lang="en-US" sz="1200" dirty="0">
+                <a:solidFill>
+                  <a:srgbClr val="222222"/>
+                </a:solidFill>
+                <a:latin typeface="Arial" panose="020B0604020202020204" pitchFamily="34" charset="0"/>
+              </a:rPr>
+              <a:t> if its distribution is stable</a:t>
+            </a:r>
+            <a:endParaRPr lang="ru-RU" sz="1200" dirty="0">
+              <a:solidFill>
+                <a:srgbClr val="222222"/>
+              </a:solidFill>
+              <a:latin typeface="Arial" panose="020B0604020202020204" pitchFamily="34" charset="0"/>
+            </a:endParaRPr>
+          </a:p>
+        </p:txBody>
+      </p:sp>
+      <p:sp>
+        <p:nvSpPr>
+          <p:cNvPr id="10" name="TextBox 9"/>
+          <p:cNvSpPr txBox="1"/>
+          <p:nvPr/>
+        </p:nvSpPr>
+        <p:spPr>
+          <a:xfrm>
+            <a:off x="3873186" y="787651"/>
+            <a:ext cx="1015685" cy="369332"/>
+          </a:xfrm>
+          <a:prstGeom prst="rect">
+            <a:avLst/>
+          </a:prstGeom>
+          <a:noFill/>
+        </p:spPr>
+        <p:txBody>
+          <a:bodyPr wrap="square" rtlCol="0">
+            <a:spAutoFit/>
+          </a:bodyPr>
+          <a:lstStyle/>
+          <a:p>
+            <a:r>
+              <a:rPr lang="en-US" b="1" dirty="0" smtClean="0"/>
+              <a:t>Stability</a:t>
+            </a:r>
+            <a:endParaRPr lang="ru-RU" b="1" dirty="0"/>
+          </a:p>
+        </p:txBody>
+      </p:sp>
+      <p:sp>
+        <p:nvSpPr>
+          <p:cNvPr id="8" name="Прямоугольник 7"/>
+          <p:cNvSpPr/>
+          <p:nvPr/>
+        </p:nvSpPr>
+        <p:spPr>
+          <a:xfrm>
+            <a:off x="3873186" y="1987980"/>
+            <a:ext cx="3046491" cy="261610"/>
+          </a:xfrm>
+          <a:prstGeom prst="rect">
+            <a:avLst/>
+          </a:prstGeom>
+        </p:spPr>
+        <p:txBody>
+          <a:bodyPr wrap="square">
+            <a:spAutoFit/>
+          </a:bodyPr>
+          <a:lstStyle/>
+          <a:p>
+            <a:r>
+              <a:rPr lang="en-US" sz="1100" dirty="0">
+                <a:hlinkClick r:id="rId5"/>
+              </a:rPr>
+              <a:t>https://en.wikipedia.org/wiki/Stable_distribution</a:t>
+            </a:r>
+            <a:endParaRPr lang="ru-RU" sz="1100" dirty="0"/>
+          </a:p>
+        </p:txBody>
+      </p:sp>
+      <p:sp>
+        <p:nvSpPr>
+          <p:cNvPr id="12" name="TextBox 11"/>
+          <p:cNvSpPr txBox="1"/>
+          <p:nvPr/>
+        </p:nvSpPr>
+        <p:spPr>
+          <a:xfrm>
+            <a:off x="3873186" y="2769392"/>
+            <a:ext cx="1631321" cy="369332"/>
+          </a:xfrm>
+          <a:prstGeom prst="rect">
+            <a:avLst/>
+          </a:prstGeom>
+          <a:noFill/>
+        </p:spPr>
+        <p:txBody>
+          <a:bodyPr wrap="square" rtlCol="0">
+            <a:spAutoFit/>
+          </a:bodyPr>
+          <a:lstStyle/>
+          <a:p>
+            <a:r>
+              <a:rPr lang="en-US" b="1" dirty="0" smtClean="0"/>
+              <a:t>Finite Variance</a:t>
+            </a:r>
+            <a:endParaRPr lang="ru-RU" b="1" dirty="0"/>
+          </a:p>
+        </p:txBody>
+      </p:sp>
+      <p:sp>
+        <p:nvSpPr>
+          <p:cNvPr id="9" name="Прямоугольник 8"/>
+          <p:cNvSpPr/>
+          <p:nvPr/>
+        </p:nvSpPr>
+        <p:spPr>
+          <a:xfrm>
+            <a:off x="3873187" y="3080587"/>
+            <a:ext cx="5008264" cy="461665"/>
+          </a:xfrm>
+          <a:prstGeom prst="rect">
+            <a:avLst/>
+          </a:prstGeom>
+        </p:spPr>
+        <p:txBody>
+          <a:bodyPr wrap="square">
+            <a:spAutoFit/>
+          </a:bodyPr>
+          <a:lstStyle/>
+          <a:p>
+            <a:r>
+              <a:rPr lang="en-US" sz="1200" dirty="0">
+                <a:hlinkClick r:id="rId6"/>
+              </a:rPr>
+              <a:t>https://stats.stackexchange.com/questions/94402/what-is-the-difference-between-finite-and-infinite-variance</a:t>
+            </a:r>
+            <a:endParaRPr lang="ru-RU" sz="1200" dirty="0"/>
+          </a:p>
+        </p:txBody>
+      </p:sp>
+    </p:spTree>
+    <p:extLst>
+      <p:ext uri="{BB962C8B-B14F-4D97-AF65-F5344CB8AC3E}">
+        <p14:creationId xmlns:p14="http://schemas.microsoft.com/office/powerpoint/2010/main" val="1823494446"/>
+      </p:ext>
+    </p:extLst>
+  </p:cSld>
+  <p:clrMapOvr>
+    <a:masterClrMapping/>
+  </p:clrMapOvr>
+</p:sld>
+</file>
+
+<file path=ppt/slides/slide7.xml><?xml version="1.0" encoding="utf-8"?>
+<p:sld xmlns:a="http://schemas.openxmlformats.org/drawingml/2006/main" xmlns:r="http://schemas.openxmlformats.org/officeDocument/2006/relationships" xmlns:p="http://schemas.openxmlformats.org/presentationml/2006/main">
+  <p:cSld>
+    <p:spTree>
+      <p:nvGrpSpPr>
+        <p:cNvPr id="1" name=""/>
+        <p:cNvGrpSpPr/>
+        <p:nvPr/>
+      </p:nvGrpSpPr>
+      <p:grpSpPr>
+        <a:xfrm>
+          <a:off x="0" y="0"/>
+          <a:ext cx="0" cy="0"/>
+          <a:chOff x="0" y="0"/>
+          <a:chExt cx="0" cy="0"/>
+        </a:xfrm>
+      </p:grpSpPr>
+      <p:sp>
+        <p:nvSpPr>
+          <p:cNvPr id="4" name="Номер слайда 3"/>
+          <p:cNvSpPr>
+            <a:spLocks noGrp="1"/>
+          </p:cNvSpPr>
+          <p:nvPr>
+            <p:ph type="sldNum" sz="quarter" idx="12"/>
+          </p:nvPr>
+        </p:nvSpPr>
+        <p:spPr/>
+        <p:txBody>
+          <a:bodyPr/>
+          <a:lstStyle/>
+          <a:p>
+            <a:fld id="{C936BD1D-689F-4FB2-8C94-2D2423F07E62}" type="slidenum">
+              <a:rPr lang="ru-RU" smtClean="0"/>
+              <a:t>7</a:t>
+            </a:fld>
+            <a:endParaRPr lang="ru-RU"/>
+          </a:p>
+        </p:txBody>
+      </p:sp>
+      <p:sp>
+        <p:nvSpPr>
+          <p:cNvPr id="5" name="Заголовок 1"/>
+          <p:cNvSpPr>
+            <a:spLocks noGrp="1"/>
+          </p:cNvSpPr>
+          <p:nvPr>
+            <p:ph type="title"/>
+          </p:nvPr>
+        </p:nvSpPr>
+        <p:spPr>
+          <a:xfrm>
+            <a:off x="510954" y="84469"/>
+            <a:ext cx="7886700" cy="422525"/>
+          </a:xfrm>
+        </p:spPr>
+        <p:txBody>
+          <a:bodyPr vert="horz" lIns="91440" tIns="45720" rIns="91440" bIns="45720" rtlCol="0" anchor="ctr">
+            <a:normAutofit/>
+          </a:bodyPr>
+          <a:lstStyle/>
+          <a:p>
+            <a:pPr algn="ctr"/>
+            <a:r>
+              <a:rPr lang="en-US" sz="2400" b="1" dirty="0" smtClean="0">
+                <a:solidFill>
+                  <a:srgbClr val="00B0F0"/>
+                </a:solidFill>
+              </a:rPr>
+              <a:t>Normal Distribution</a:t>
+            </a:r>
+            <a:endParaRPr lang="ru-RU" sz="2400" b="1" dirty="0">
+              <a:solidFill>
+                <a:srgbClr val="00B0F0"/>
+              </a:solidFill>
+            </a:endParaRPr>
+          </a:p>
+        </p:txBody>
+      </p:sp>
+      <p:pic>
+        <p:nvPicPr>
+          <p:cNvPr id="2" name="Рисунок 1"/>
+          <p:cNvPicPr>
+            <a:picLocks noChangeAspect="1"/>
+          </p:cNvPicPr>
+          <p:nvPr/>
+        </p:nvPicPr>
+        <p:blipFill>
+          <a:blip r:embed="rId2"/>
+          <a:stretch>
+            <a:fillRect/>
+          </a:stretch>
+        </p:blipFill>
+        <p:spPr>
+          <a:xfrm>
+            <a:off x="5278453" y="435809"/>
+            <a:ext cx="3412874" cy="768266"/>
+          </a:xfrm>
+          <a:prstGeom prst="rect">
+            <a:avLst/>
+          </a:prstGeom>
+        </p:spPr>
+      </p:pic>
+      <p:pic>
+        <p:nvPicPr>
+          <p:cNvPr id="6" name="Рисунок 5"/>
+          <p:cNvPicPr>
+            <a:picLocks noChangeAspect="1"/>
+          </p:cNvPicPr>
+          <p:nvPr/>
+        </p:nvPicPr>
+        <p:blipFill>
+          <a:blip r:embed="rId3"/>
+          <a:stretch>
+            <a:fillRect/>
+          </a:stretch>
+        </p:blipFill>
+        <p:spPr>
+          <a:xfrm>
+            <a:off x="303148" y="506994"/>
+            <a:ext cx="4612884" cy="3269075"/>
+          </a:xfrm>
+          <a:prstGeom prst="rect">
+            <a:avLst/>
+          </a:prstGeom>
+        </p:spPr>
+      </p:pic>
+      <p:sp>
+        <p:nvSpPr>
+          <p:cNvPr id="7" name="Прямоугольник 6"/>
+          <p:cNvSpPr/>
+          <p:nvPr/>
+        </p:nvSpPr>
+        <p:spPr>
+          <a:xfrm>
+            <a:off x="366522" y="5700976"/>
+            <a:ext cx="8487766" cy="430887"/>
+          </a:xfrm>
+          <a:prstGeom prst="rect">
+            <a:avLst/>
+          </a:prstGeom>
+        </p:spPr>
+        <p:txBody>
+          <a:bodyPr wrap="square">
+            <a:spAutoFit/>
+          </a:bodyPr>
+          <a:lstStyle/>
+          <a:p>
+            <a:r>
+              <a:rPr lang="en-US" sz="1100" dirty="0">
+                <a:hlinkClick r:id="rId4"/>
+              </a:rPr>
+              <a:t>https://</a:t>
+            </a:r>
+            <a:r>
+              <a:rPr lang="en-US" sz="1100" dirty="0" smtClean="0">
+                <a:hlinkClick r:id="rId4"/>
+              </a:rPr>
+              <a:t>en.wikipedia.org/wiki/Normal_distribution</a:t>
+            </a:r>
+            <a:endParaRPr lang="en-US" sz="1100" dirty="0" smtClean="0"/>
+          </a:p>
+          <a:p>
+            <a:r>
+              <a:rPr lang="en-US" sz="1100" dirty="0">
+                <a:hlinkClick r:id="rId5"/>
+              </a:rPr>
+              <a:t>https://courses.lumenlearning.com/introstats1/chapter/the-standard-normal-distribution/</a:t>
+            </a:r>
+            <a:endParaRPr lang="ru-RU" sz="1100" dirty="0"/>
+          </a:p>
+        </p:txBody>
+      </p:sp>
+      <mc:AlternateContent xmlns:mc="http://schemas.openxmlformats.org/markup-compatibility/2006">
+        <mc:Choice xmlns:a14="http://schemas.microsoft.com/office/drawing/2010/main" Requires="a14">
+          <p:sp>
+            <p:nvSpPr>
+              <p:cNvPr id="12" name="TextBox 11"/>
+              <p:cNvSpPr txBox="1"/>
+              <p:nvPr/>
+            </p:nvSpPr>
+            <p:spPr>
+              <a:xfrm>
+                <a:off x="5060886" y="1739781"/>
+                <a:ext cx="3902045" cy="1015663"/>
+              </a:xfrm>
+              <a:prstGeom prst="rect">
+                <a:avLst/>
+              </a:prstGeom>
+              <a:noFill/>
+            </p:spPr>
+            <p:txBody>
+              <a:bodyPr wrap="square" rtlCol="0">
+                <a:spAutoFit/>
+              </a:bodyPr>
+              <a:lstStyle/>
+              <a:p>
+                <a:r>
+                  <a:rPr lang="en-US" sz="1200" dirty="0" smtClean="0"/>
+                  <a:t>where</a:t>
+                </a:r>
+              </a:p>
+              <a:p>
+                <a:r>
+                  <a:rPr lang="ru-RU" sz="1200" dirty="0" smtClean="0">
+                    <a:solidFill>
+                      <a:srgbClr val="FF0000"/>
+                    </a:solidFill>
+                  </a:rPr>
+                  <a:t>µ</a:t>
+                </a:r>
+                <a:r>
+                  <a:rPr lang="en-US" sz="1200" dirty="0" smtClean="0"/>
+                  <a:t> </a:t>
+                </a:r>
+                <a:r>
+                  <a:rPr lang="en-US" sz="1200" dirty="0"/>
+                  <a:t>–</a:t>
+                </a:r>
+                <a:r>
+                  <a:rPr lang="en-US" sz="1200" dirty="0" smtClean="0"/>
+                  <a:t> the mean or expected value of the distribution (also it could be median and mode)</a:t>
+                </a:r>
+              </a:p>
+              <a:p>
+                <a:r>
+                  <a:rPr lang="el-GR" sz="1200" dirty="0">
+                    <a:solidFill>
+                      <a:srgbClr val="FF0000"/>
+                    </a:solidFill>
+                  </a:rPr>
+                  <a:t>σ</a:t>
+                </a:r>
+                <a:r>
+                  <a:rPr lang="en-US" sz="1200" dirty="0" smtClean="0"/>
+                  <a:t> – the standard deviation</a:t>
+                </a:r>
+              </a:p>
+              <a:p>
+                <a:pPr/>
+                <a14:m>
+                  <m:oMath xmlns:m="http://schemas.openxmlformats.org/officeDocument/2006/math">
+                    <m:sSup>
+                      <m:sSupPr>
+                        <m:ctrlPr>
+                          <a:rPr lang="en-US" sz="1200" i="1" smtClean="0">
+                            <a:solidFill>
+                              <a:srgbClr val="FF0000"/>
+                            </a:solidFill>
+                            <a:latin typeface="Cambria Math" panose="02040503050406030204" pitchFamily="18" charset="0"/>
+                          </a:rPr>
+                        </m:ctrlPr>
+                      </m:sSupPr>
+                      <m:e>
+                        <m:r>
+                          <m:rPr>
+                            <m:sty m:val="p"/>
+                          </m:rPr>
+                          <a:rPr lang="el-GR" sz="1200" i="1" smtClean="0">
+                            <a:solidFill>
+                              <a:srgbClr val="FF0000"/>
+                            </a:solidFill>
+                            <a:latin typeface="Cambria Math" panose="02040503050406030204" pitchFamily="18" charset="0"/>
+                          </a:rPr>
+                          <m:t>σ</m:t>
+                        </m:r>
+                      </m:e>
+                      <m:sup>
+                        <m:r>
+                          <a:rPr lang="en-US" sz="1200" i="1" smtClean="0">
+                            <a:solidFill>
+                              <a:srgbClr val="FF0000"/>
+                            </a:solidFill>
+                            <a:latin typeface="Cambria Math" panose="02040503050406030204" pitchFamily="18" charset="0"/>
+                          </a:rPr>
+                          <m:t>2</m:t>
+                        </m:r>
+                      </m:sup>
+                    </m:sSup>
+                  </m:oMath>
+                </a14:m>
+                <a:r>
+                  <a:rPr lang="en-US" sz="1200" dirty="0" smtClean="0"/>
+                  <a:t> </a:t>
+                </a:r>
+                <a:r>
+                  <a:rPr lang="en-US" sz="1200" dirty="0"/>
+                  <a:t>–</a:t>
+                </a:r>
+                <a:r>
+                  <a:rPr lang="en-US" sz="1200" dirty="0" smtClean="0"/>
+                  <a:t> the variance</a:t>
+                </a:r>
+              </a:p>
+            </p:txBody>
+          </p:sp>
+        </mc:Choice>
+        <mc:Fallback>
+          <p:sp>
+            <p:nvSpPr>
+              <p:cNvPr id="12" name="TextBox 11"/>
+              <p:cNvSpPr txBox="1">
+                <a:spLocks noRot="1" noChangeAspect="1" noMove="1" noResize="1" noEditPoints="1" noAdjustHandles="1" noChangeArrowheads="1" noChangeShapeType="1" noTextEdit="1"/>
+              </p:cNvSpPr>
+              <p:nvPr/>
+            </p:nvSpPr>
+            <p:spPr>
+              <a:xfrm>
+                <a:off x="5060886" y="1739781"/>
+                <a:ext cx="3902045" cy="1015663"/>
+              </a:xfrm>
+              <a:prstGeom prst="rect">
+                <a:avLst/>
+              </a:prstGeom>
+              <a:blipFill>
+                <a:blip r:embed="rId6"/>
+                <a:stretch>
+                  <a:fillRect b="-4192"/>
+                </a:stretch>
+              </a:blipFill>
+            </p:spPr>
+            <p:txBody>
+              <a:bodyPr/>
+              <a:lstStyle/>
+              <a:p>
+                <a:r>
+                  <a:rPr lang="ru-RU">
+                    <a:noFill/>
+                  </a:rPr>
+                  <a:t> </a:t>
+                </a:r>
+              </a:p>
+            </p:txBody>
+          </p:sp>
+        </mc:Fallback>
+      </mc:AlternateContent>
+      <p:sp>
+        <p:nvSpPr>
+          <p:cNvPr id="17" name="TextBox 16"/>
+          <p:cNvSpPr txBox="1"/>
+          <p:nvPr/>
+        </p:nvSpPr>
+        <p:spPr>
+          <a:xfrm>
+            <a:off x="303148" y="4323024"/>
+            <a:ext cx="2621122" cy="276999"/>
+          </a:xfrm>
+          <a:prstGeom prst="rect">
+            <a:avLst/>
+          </a:prstGeom>
+          <a:noFill/>
+        </p:spPr>
+        <p:txBody>
+          <a:bodyPr wrap="square" rtlCol="0">
+            <a:spAutoFit/>
+          </a:bodyPr>
+          <a:lstStyle/>
+          <a:p>
+            <a:r>
+              <a:rPr lang="en-US" sz="1200" dirty="0" smtClean="0"/>
+              <a:t>Area under the curve = </a:t>
+            </a:r>
+            <a:r>
+              <a:rPr lang="en-US" sz="1200" b="1" dirty="0" smtClean="0"/>
+              <a:t>1 (probability) </a:t>
+            </a:r>
+          </a:p>
+        </p:txBody>
+      </p:sp>
+    </p:spTree>
+    <p:extLst>
+      <p:ext uri="{BB962C8B-B14F-4D97-AF65-F5344CB8AC3E}">
+        <p14:creationId xmlns:p14="http://schemas.microsoft.com/office/powerpoint/2010/main" val="574146306"/>
+      </p:ext>
+    </p:extLst>
+  </p:cSld>
+  <p:clrMapOvr>
+    <a:masterClrMapping/>
+  </p:clrMapOvr>
+</p:sld>
+</file>
+
+<file path=ppt/slides/slide8.xml><?xml version="1.0" encoding="utf-8"?>
+<p:sld xmlns:a="http://schemas.openxmlformats.org/drawingml/2006/main" xmlns:r="http://schemas.openxmlformats.org/officeDocument/2006/relationships" xmlns:p="http://schemas.openxmlformats.org/presentationml/2006/main">
+  <p:cSld>
+    <p:spTree>
+      <p:nvGrpSpPr>
+        <p:cNvPr id="1" name=""/>
+        <p:cNvGrpSpPr/>
+        <p:nvPr/>
+      </p:nvGrpSpPr>
+      <p:grpSpPr>
+        <a:xfrm>
+          <a:off x="0" y="0"/>
+          <a:ext cx="0" cy="0"/>
+          <a:chOff x="0" y="0"/>
+          <a:chExt cx="0" cy="0"/>
+        </a:xfrm>
+      </p:grpSpPr>
+      <p:sp>
+        <p:nvSpPr>
+          <p:cNvPr id="4" name="Номер слайда 3"/>
+          <p:cNvSpPr>
+            <a:spLocks noGrp="1"/>
+          </p:cNvSpPr>
+          <p:nvPr>
+            <p:ph type="sldNum" sz="quarter" idx="12"/>
+          </p:nvPr>
+        </p:nvSpPr>
+        <p:spPr/>
+        <p:txBody>
+          <a:bodyPr/>
+          <a:lstStyle/>
+          <a:p>
+            <a:fld id="{C936BD1D-689F-4FB2-8C94-2D2423F07E62}" type="slidenum">
+              <a:rPr lang="ru-RU" smtClean="0"/>
+              <a:t>8</a:t>
+            </a:fld>
+            <a:endParaRPr lang="ru-RU"/>
+          </a:p>
+        </p:txBody>
+      </p:sp>
+      <p:sp>
+        <p:nvSpPr>
+          <p:cNvPr id="5" name="Заголовок 1"/>
+          <p:cNvSpPr>
+            <a:spLocks noGrp="1"/>
+          </p:cNvSpPr>
+          <p:nvPr>
+            <p:ph type="title"/>
+          </p:nvPr>
+        </p:nvSpPr>
+        <p:spPr>
+          <a:xfrm>
+            <a:off x="483794" y="247431"/>
+            <a:ext cx="7886700" cy="422525"/>
+          </a:xfrm>
+        </p:spPr>
+        <p:txBody>
+          <a:bodyPr vert="horz" lIns="91440" tIns="45720" rIns="91440" bIns="45720" rtlCol="0" anchor="ctr">
+            <a:normAutofit/>
+          </a:bodyPr>
+          <a:lstStyle/>
+          <a:p>
+            <a:pPr algn="ctr"/>
+            <a:r>
+              <a:rPr lang="en-US" sz="2400" b="1" dirty="0" smtClean="0">
+                <a:solidFill>
+                  <a:srgbClr val="00B0F0"/>
+                </a:solidFill>
+              </a:rPr>
+              <a:t>Central Limit Theorem (CLT)</a:t>
+            </a:r>
+            <a:endParaRPr lang="ru-RU" sz="2400" b="1" dirty="0">
+              <a:solidFill>
+                <a:srgbClr val="00B0F0"/>
+              </a:solidFill>
+            </a:endParaRPr>
+          </a:p>
+        </p:txBody>
+      </p:sp>
+      <p:sp>
+        <p:nvSpPr>
+          <p:cNvPr id="6" name="Прямоугольник 5"/>
+          <p:cNvSpPr/>
+          <p:nvPr/>
+        </p:nvSpPr>
+        <p:spPr>
+          <a:xfrm>
+            <a:off x="483794" y="952071"/>
+            <a:ext cx="8198479" cy="923330"/>
+          </a:xfrm>
+          <a:prstGeom prst="rect">
+            <a:avLst/>
+          </a:prstGeom>
+        </p:spPr>
+        <p:txBody>
+          <a:bodyPr wrap="square">
+            <a:spAutoFit/>
+          </a:bodyPr>
+          <a:lstStyle/>
+          <a:p>
+            <a:pPr algn="just"/>
+            <a:r>
+              <a:rPr lang="en-US" dirty="0" smtClean="0">
+                <a:latin typeface="pt sans"/>
+              </a:rPr>
+              <a:t>The </a:t>
+            </a:r>
+            <a:r>
+              <a:rPr lang="en-US" dirty="0">
+                <a:latin typeface="pt sans"/>
+              </a:rPr>
+              <a:t>sampling distribution of the sample means </a:t>
+            </a:r>
+            <a:r>
+              <a:rPr lang="en-US" i="1" u="sng" dirty="0">
+                <a:latin typeface="pt sans"/>
+              </a:rPr>
+              <a:t>approaches a </a:t>
+            </a:r>
+            <a:r>
+              <a:rPr lang="en-US" i="1" u="sng" dirty="0" smtClean="0">
+                <a:latin typeface="pt sans"/>
+              </a:rPr>
+              <a:t>normal distribution</a:t>
+            </a:r>
+            <a:r>
+              <a:rPr lang="en-US" i="1" u="sng" dirty="0">
+                <a:latin typeface="pt sans"/>
+              </a:rPr>
+              <a:t> as the </a:t>
+            </a:r>
+            <a:r>
+              <a:rPr lang="en-US" i="1" u="sng" dirty="0" smtClean="0">
+                <a:latin typeface="pt sans"/>
+              </a:rPr>
+              <a:t>sample size</a:t>
+            </a:r>
+            <a:r>
+              <a:rPr lang="en-US" i="1" u="sng" dirty="0">
+                <a:latin typeface="pt sans"/>
+              </a:rPr>
+              <a:t> gets larger</a:t>
+            </a:r>
+            <a:r>
+              <a:rPr lang="en-US" dirty="0">
+                <a:latin typeface="pt sans"/>
+              </a:rPr>
+              <a:t> — </a:t>
+            </a:r>
+            <a:r>
+              <a:rPr lang="en-US" i="1" dirty="0">
+                <a:latin typeface="pt sans"/>
+              </a:rPr>
+              <a:t>no matter what the shape of the population distribution</a:t>
+            </a:r>
+            <a:r>
+              <a:rPr lang="en-US" dirty="0">
+                <a:latin typeface="pt sans"/>
+              </a:rPr>
+              <a:t>. </a:t>
+            </a:r>
+            <a:endParaRPr lang="ru-RU" dirty="0"/>
+          </a:p>
+        </p:txBody>
+      </p:sp>
+      <p:sp>
+        <p:nvSpPr>
+          <p:cNvPr id="7" name="Прямоугольник 6"/>
+          <p:cNvSpPr/>
+          <p:nvPr/>
+        </p:nvSpPr>
+        <p:spPr>
+          <a:xfrm>
+            <a:off x="362138" y="2361549"/>
+            <a:ext cx="8116998" cy="1600438"/>
+          </a:xfrm>
+          <a:prstGeom prst="rect">
+            <a:avLst/>
+          </a:prstGeom>
+        </p:spPr>
+        <p:txBody>
+          <a:bodyPr wrap="square">
+            <a:spAutoFit/>
+          </a:bodyPr>
+          <a:lstStyle/>
+          <a:p>
+            <a:pPr algn="just"/>
+            <a:r>
+              <a:rPr lang="en-US" sz="1400" dirty="0">
+                <a:latin typeface="pt sans"/>
+              </a:rPr>
+              <a:t>An essential component of the Central Limit Theorem is that the </a:t>
+            </a:r>
+            <a:r>
+              <a:rPr lang="en-US" sz="1400" dirty="0" smtClean="0">
+                <a:latin typeface="pt sans"/>
+              </a:rPr>
+              <a:t>average </a:t>
+            </a:r>
+            <a:r>
+              <a:rPr lang="en-US" sz="1400" b="1" dirty="0" smtClean="0">
+                <a:latin typeface="pt sans"/>
+              </a:rPr>
+              <a:t>of </a:t>
+            </a:r>
+            <a:r>
+              <a:rPr lang="en-US" sz="1400" b="1" dirty="0">
+                <a:latin typeface="pt sans"/>
+              </a:rPr>
+              <a:t>your sample means will be the population mean</a:t>
+            </a:r>
+            <a:r>
+              <a:rPr lang="en-US" sz="1400" dirty="0">
+                <a:latin typeface="pt sans"/>
+              </a:rPr>
+              <a:t>. </a:t>
+            </a:r>
+            <a:endParaRPr lang="en-US" sz="1400" dirty="0" smtClean="0">
+              <a:latin typeface="pt sans"/>
+            </a:endParaRPr>
+          </a:p>
+          <a:p>
+            <a:pPr algn="just"/>
+            <a:endParaRPr lang="en-US" sz="1400" dirty="0" smtClean="0">
+              <a:latin typeface="pt sans"/>
+            </a:endParaRPr>
+          </a:p>
+          <a:p>
+            <a:pPr algn="just"/>
+            <a:endParaRPr lang="en-US" sz="1400" dirty="0">
+              <a:latin typeface="pt sans"/>
+            </a:endParaRPr>
+          </a:p>
+          <a:p>
+            <a:pPr algn="just"/>
+            <a:endParaRPr lang="en-US" sz="1400" dirty="0">
+              <a:latin typeface="pt sans"/>
+            </a:endParaRPr>
+          </a:p>
+          <a:p>
+            <a:pPr algn="just"/>
+            <a:r>
+              <a:rPr lang="en-US" sz="1400" dirty="0" smtClean="0">
+                <a:latin typeface="pt sans"/>
+              </a:rPr>
+              <a:t>Similarly</a:t>
+            </a:r>
+            <a:r>
+              <a:rPr lang="en-US" sz="1400" dirty="0">
+                <a:latin typeface="pt sans"/>
+              </a:rPr>
+              <a:t>, if you find the </a:t>
+            </a:r>
+            <a:r>
+              <a:rPr lang="en-US" sz="1400" i="1" u="sng" dirty="0">
+                <a:latin typeface="pt sans"/>
+              </a:rPr>
+              <a:t>average of all of the </a:t>
+            </a:r>
+            <a:r>
+              <a:rPr lang="en-US" sz="1400" i="1" u="sng" dirty="0" smtClean="0">
+                <a:latin typeface="pt sans"/>
+              </a:rPr>
+              <a:t>standard deviations</a:t>
+            </a:r>
+            <a:r>
+              <a:rPr lang="en-US" sz="1400" dirty="0">
+                <a:latin typeface="pt sans"/>
+              </a:rPr>
+              <a:t> in your </a:t>
+            </a:r>
+            <a:r>
+              <a:rPr lang="en-US" sz="1400" dirty="0" smtClean="0">
+                <a:latin typeface="pt sans"/>
+              </a:rPr>
+              <a:t>samples, </a:t>
+            </a:r>
+            <a:r>
+              <a:rPr lang="en-US" sz="1400" dirty="0">
+                <a:latin typeface="pt sans"/>
+              </a:rPr>
+              <a:t>you’ll find the </a:t>
+            </a:r>
+            <a:r>
+              <a:rPr lang="en-US" sz="1400" b="1" dirty="0">
+                <a:latin typeface="pt sans"/>
+              </a:rPr>
+              <a:t>actual</a:t>
+            </a:r>
+            <a:r>
+              <a:rPr lang="en-US" sz="1400" dirty="0">
+                <a:latin typeface="pt sans"/>
+              </a:rPr>
+              <a:t> standard deviation for your population. </a:t>
+            </a:r>
+            <a:endParaRPr lang="ru-RU" sz="1400" dirty="0"/>
+          </a:p>
+        </p:txBody>
+      </p:sp>
+      <p:sp>
+        <p:nvSpPr>
+          <p:cNvPr id="8" name="Прямоугольник 7"/>
+          <p:cNvSpPr/>
+          <p:nvPr/>
+        </p:nvSpPr>
+        <p:spPr>
+          <a:xfrm>
+            <a:off x="362138" y="5282325"/>
+            <a:ext cx="7682431" cy="461665"/>
+          </a:xfrm>
+          <a:prstGeom prst="rect">
+            <a:avLst/>
+          </a:prstGeom>
+        </p:spPr>
+        <p:txBody>
+          <a:bodyPr wrap="square">
+            <a:spAutoFit/>
+          </a:bodyPr>
+          <a:lstStyle/>
+          <a:p>
+            <a:r>
+              <a:rPr lang="en-US" sz="1200" dirty="0">
+                <a:hlinkClick r:id="rId2"/>
+              </a:rPr>
+              <a:t>https://www.statisticshowto.datasciencecentral.com/probability-and-statistics/normal-distributions/central-limit-theorem-definition-examples/</a:t>
+            </a:r>
+            <a:endParaRPr lang="ru-RU" sz="1200" dirty="0"/>
+          </a:p>
+        </p:txBody>
+      </p:sp>
+    </p:spTree>
+    <p:extLst>
+      <p:ext uri="{BB962C8B-B14F-4D97-AF65-F5344CB8AC3E}">
+        <p14:creationId xmlns:p14="http://schemas.microsoft.com/office/powerpoint/2010/main" val="3931866593"/>
+      </p:ext>
+    </p:extLst>
+  </p:cSld>
+  <p:clrMapOvr>
+    <a:masterClrMapping/>
+  </p:clrMapOvr>
+</p:sld>
+</file>
+
+<file path=ppt/slides/slide9.xml><?xml version="1.0" encoding="utf-8"?>
+<p:sld xmlns:a="http://schemas.openxmlformats.org/drawingml/2006/main" xmlns:r="http://schemas.openxmlformats.org/officeDocument/2006/relationships" xmlns:p="http://schemas.openxmlformats.org/presentationml/2006/main">
+  <p:cSld>
+    <p:spTree>
+      <p:nvGrpSpPr>
+        <p:cNvPr id="1" name=""/>
+        <p:cNvGrpSpPr/>
+        <p:nvPr/>
+      </p:nvGrpSpPr>
+      <p:grpSpPr>
+        <a:xfrm>
+          <a:off x="0" y="0"/>
+          <a:ext cx="0" cy="0"/>
+          <a:chOff x="0" y="0"/>
+          <a:chExt cx="0" cy="0"/>
+        </a:xfrm>
+      </p:grpSpPr>
+      <p:sp>
+        <p:nvSpPr>
+          <p:cNvPr id="4" name="Номер слайда 3"/>
+          <p:cNvSpPr>
+            <a:spLocks noGrp="1"/>
+          </p:cNvSpPr>
+          <p:nvPr>
+            <p:ph type="sldNum" sz="quarter" idx="12"/>
+          </p:nvPr>
+        </p:nvSpPr>
+        <p:spPr/>
+        <p:txBody>
+          <a:bodyPr/>
+          <a:lstStyle/>
+          <a:p>
+            <a:fld id="{C936BD1D-689F-4FB2-8C94-2D2423F07E62}" type="slidenum">
+              <a:rPr lang="ru-RU" smtClean="0"/>
+              <a:t>9</a:t>
+            </a:fld>
+            <a:endParaRPr lang="ru-RU"/>
+          </a:p>
+        </p:txBody>
+      </p:sp>
+      <p:sp>
+        <p:nvSpPr>
+          <p:cNvPr id="5" name="Заголовок 1"/>
+          <p:cNvSpPr>
+            <a:spLocks noGrp="1"/>
+          </p:cNvSpPr>
+          <p:nvPr>
+            <p:ph type="title"/>
+          </p:nvPr>
+        </p:nvSpPr>
+        <p:spPr>
+          <a:xfrm>
+            <a:off x="329885" y="138236"/>
+            <a:ext cx="7886700" cy="422525"/>
+          </a:xfrm>
+        </p:spPr>
+        <p:txBody>
+          <a:bodyPr vert="horz" lIns="91440" tIns="45720" rIns="91440" bIns="45720" rtlCol="0" anchor="ctr">
+            <a:normAutofit/>
+          </a:bodyPr>
+          <a:lstStyle/>
+          <a:p>
+            <a:pPr algn="ctr"/>
+            <a:r>
+              <a:rPr lang="en-US" sz="2400" b="1" dirty="0" smtClean="0">
+                <a:solidFill>
+                  <a:srgbClr val="00B0F0"/>
+                </a:solidFill>
+              </a:rPr>
+              <a:t>Three Sigma Rule</a:t>
+            </a:r>
+            <a:endParaRPr lang="ru-RU" sz="2400" b="1" dirty="0">
+              <a:solidFill>
+                <a:srgbClr val="00B0F0"/>
+              </a:solidFill>
+            </a:endParaRPr>
+          </a:p>
+        </p:txBody>
+      </p:sp>
+      <p:pic>
+        <p:nvPicPr>
+          <p:cNvPr id="6" name="Рисунок 5"/>
+          <p:cNvPicPr>
+            <a:picLocks noChangeAspect="1"/>
+          </p:cNvPicPr>
+          <p:nvPr/>
+        </p:nvPicPr>
+        <p:blipFill>
+          <a:blip r:embed="rId2"/>
+          <a:stretch>
+            <a:fillRect/>
+          </a:stretch>
+        </p:blipFill>
+        <p:spPr>
+          <a:xfrm>
+            <a:off x="2172971" y="560761"/>
+            <a:ext cx="4200525" cy="4047716"/>
+          </a:xfrm>
+          <a:prstGeom prst="rect">
+            <a:avLst/>
+          </a:prstGeom>
+        </p:spPr>
+      </p:pic>
+      <p:sp>
+        <p:nvSpPr>
+          <p:cNvPr id="7" name="Прямоугольник 6"/>
+          <p:cNvSpPr/>
+          <p:nvPr/>
+        </p:nvSpPr>
+        <p:spPr>
+          <a:xfrm>
+            <a:off x="162962" y="4685783"/>
+            <a:ext cx="8854289" cy="1015663"/>
+          </a:xfrm>
+          <a:prstGeom prst="rect">
+            <a:avLst/>
+          </a:prstGeom>
+        </p:spPr>
+        <p:txBody>
+          <a:bodyPr wrap="square">
+            <a:spAutoFit/>
+          </a:bodyPr>
+          <a:lstStyle/>
+          <a:p>
+            <a:pPr algn="just"/>
+            <a:r>
+              <a:rPr lang="en-US" sz="1200" dirty="0"/>
+              <a:t>An empirical rule stating that, for many reasonably symmetric unimodal distributions, almost all of the population lies within three standard deviations of the mean</a:t>
+            </a:r>
+            <a:r>
+              <a:rPr lang="en-US" sz="1200" dirty="0" smtClean="0"/>
+              <a:t>.</a:t>
+            </a:r>
+          </a:p>
+          <a:p>
+            <a:pPr algn="just"/>
+            <a:endParaRPr lang="en-US" sz="1200" dirty="0" smtClean="0">
+              <a:solidFill>
+                <a:srgbClr val="222222"/>
+              </a:solidFill>
+              <a:latin typeface="Arial" panose="020B0604020202020204" pitchFamily="34" charset="0"/>
+            </a:endParaRPr>
+          </a:p>
+          <a:p>
+            <a:pPr algn="just"/>
+            <a:r>
+              <a:rPr lang="en-US" sz="1200" dirty="0" smtClean="0">
+                <a:solidFill>
+                  <a:srgbClr val="222222"/>
+                </a:solidFill>
+                <a:latin typeface="Arial" panose="020B0604020202020204" pitchFamily="34" charset="0"/>
+              </a:rPr>
+              <a:t>In statistics, the</a:t>
+            </a:r>
+            <a:r>
+              <a:rPr lang="en-US" sz="1200" dirty="0">
+                <a:solidFill>
+                  <a:srgbClr val="222222"/>
+                </a:solidFill>
+                <a:latin typeface="Arial" panose="020B0604020202020204" pitchFamily="34" charset="0"/>
+              </a:rPr>
+              <a:t> </a:t>
+            </a:r>
+            <a:r>
+              <a:rPr lang="en-US" sz="1200" b="1" dirty="0">
+                <a:solidFill>
+                  <a:srgbClr val="222222"/>
+                </a:solidFill>
+                <a:latin typeface="Arial" panose="020B0604020202020204" pitchFamily="34" charset="0"/>
+              </a:rPr>
+              <a:t>empirical </a:t>
+            </a:r>
+            <a:r>
+              <a:rPr lang="en-US" sz="1200" b="1" dirty="0" smtClean="0">
+                <a:solidFill>
+                  <a:srgbClr val="222222"/>
+                </a:solidFill>
+                <a:latin typeface="Arial" panose="020B0604020202020204" pitchFamily="34" charset="0"/>
+              </a:rPr>
+              <a:t>rule</a:t>
+            </a:r>
+            <a:r>
+              <a:rPr lang="en-US" sz="1200" dirty="0" smtClean="0">
+                <a:solidFill>
+                  <a:srgbClr val="222222"/>
+                </a:solidFill>
+                <a:latin typeface="Arial" panose="020B0604020202020204" pitchFamily="34" charset="0"/>
+              </a:rPr>
+              <a:t> stipulates that the specific fraction of the population lies  within a band </a:t>
+            </a:r>
+            <a:r>
+              <a:rPr lang="en-US" sz="1200" dirty="0">
+                <a:solidFill>
+                  <a:srgbClr val="222222"/>
+                </a:solidFill>
+                <a:latin typeface="Arial" panose="020B0604020202020204" pitchFamily="34" charset="0"/>
+              </a:rPr>
+              <a:t>around the </a:t>
+            </a:r>
+            <a:r>
+              <a:rPr lang="en-US" sz="1200" dirty="0" smtClean="0">
+                <a:solidFill>
+                  <a:srgbClr val="222222"/>
+                </a:solidFill>
+                <a:latin typeface="Arial" panose="020B0604020202020204" pitchFamily="34" charset="0"/>
+              </a:rPr>
+              <a:t>mean</a:t>
+            </a:r>
+            <a:r>
+              <a:rPr lang="en-US" sz="1200" dirty="0">
+                <a:solidFill>
+                  <a:srgbClr val="222222"/>
+                </a:solidFill>
+                <a:latin typeface="Arial" panose="020B0604020202020204" pitchFamily="34" charset="0"/>
+              </a:rPr>
+              <a:t> in a </a:t>
+            </a:r>
+            <a:r>
+              <a:rPr lang="en-US" sz="1200" dirty="0" smtClean="0">
+                <a:solidFill>
+                  <a:srgbClr val="222222"/>
+                </a:solidFill>
+                <a:latin typeface="Arial" panose="020B0604020202020204" pitchFamily="34" charset="0"/>
+              </a:rPr>
+              <a:t>normal distribution</a:t>
+            </a:r>
+            <a:r>
+              <a:rPr lang="en-US" sz="1200" dirty="0" smtClean="0">
+                <a:solidFill>
+                  <a:srgbClr val="0B0080"/>
+                </a:solidFill>
+                <a:latin typeface="Arial" panose="020B0604020202020204" pitchFamily="34" charset="0"/>
+              </a:rPr>
+              <a:t> </a:t>
+            </a:r>
+            <a:r>
+              <a:rPr lang="en-US" sz="1200" dirty="0" smtClean="0">
+                <a:solidFill>
+                  <a:srgbClr val="222222"/>
+                </a:solidFill>
+                <a:latin typeface="Arial" panose="020B0604020202020204" pitchFamily="34" charset="0"/>
+              </a:rPr>
+              <a:t>with </a:t>
+            </a:r>
+            <a:r>
+              <a:rPr lang="en-US" sz="1200" dirty="0">
+                <a:solidFill>
+                  <a:srgbClr val="222222"/>
+                </a:solidFill>
+                <a:latin typeface="Arial" panose="020B0604020202020204" pitchFamily="34" charset="0"/>
+              </a:rPr>
+              <a:t>a width of two, four and six </a:t>
+            </a:r>
+            <a:r>
+              <a:rPr lang="en-US" sz="1200" dirty="0" smtClean="0">
+                <a:solidFill>
+                  <a:srgbClr val="222222"/>
+                </a:solidFill>
+                <a:latin typeface="Arial" panose="020B0604020202020204" pitchFamily="34" charset="0"/>
+              </a:rPr>
+              <a:t>standard deviations. </a:t>
+            </a:r>
+            <a:endParaRPr lang="ru-RU" sz="1200" dirty="0"/>
+          </a:p>
+        </p:txBody>
+      </p:sp>
+      <p:sp>
+        <p:nvSpPr>
+          <p:cNvPr id="8" name="Прямоугольник 7"/>
+          <p:cNvSpPr/>
+          <p:nvPr/>
+        </p:nvSpPr>
+        <p:spPr>
+          <a:xfrm>
+            <a:off x="162962" y="5925464"/>
+            <a:ext cx="8564578" cy="600164"/>
+          </a:xfrm>
+          <a:prstGeom prst="rect">
+            <a:avLst/>
+          </a:prstGeom>
+        </p:spPr>
+        <p:txBody>
+          <a:bodyPr wrap="square">
+            <a:spAutoFit/>
+          </a:bodyPr>
+          <a:lstStyle/>
+          <a:p>
+            <a:r>
+              <a:rPr lang="en-US" sz="1100" dirty="0">
+                <a:hlinkClick r:id="rId3"/>
+              </a:rPr>
+              <a:t>https://www.oxfordreference.com/view/10.1093/oi/authority.20110803104447825</a:t>
+            </a:r>
+            <a:endParaRPr lang="en-US" sz="1100" dirty="0" smtClean="0">
+              <a:hlinkClick r:id="rId4"/>
+            </a:endParaRPr>
+          </a:p>
+          <a:p>
+            <a:r>
+              <a:rPr lang="en-US" sz="1100" dirty="0" smtClean="0">
+                <a:hlinkClick r:id="rId4"/>
+              </a:rPr>
+              <a:t>https</a:t>
+            </a:r>
+            <a:r>
+              <a:rPr lang="en-US" sz="1100" dirty="0">
+                <a:hlinkClick r:id="rId4"/>
+              </a:rPr>
+              <a:t>://</a:t>
+            </a:r>
+            <a:r>
+              <a:rPr lang="en-US" sz="1100" dirty="0" smtClean="0">
+                <a:hlinkClick r:id="rId4"/>
+              </a:rPr>
+              <a:t>en.wikipedia.org/wiki/68%E2%80%9395%E2%80%9399.7_rule</a:t>
+            </a:r>
+            <a:endParaRPr lang="en-US" sz="1100" dirty="0" smtClean="0"/>
+          </a:p>
+          <a:p>
+            <a:r>
+              <a:rPr lang="en-US" sz="1100" dirty="0">
+                <a:hlinkClick r:id="rId5"/>
+              </a:rPr>
+              <a:t>https://www.mathsisfun.com/data/standard-normal-distribution.html</a:t>
+            </a:r>
+            <a:endParaRPr lang="ru-RU" sz="1100" dirty="0"/>
+          </a:p>
+        </p:txBody>
+      </p:sp>
+    </p:spTree>
+    <p:extLst>
+      <p:ext uri="{BB962C8B-B14F-4D97-AF65-F5344CB8AC3E}">
+        <p14:creationId xmlns:p14="http://schemas.microsoft.com/office/powerpoint/2010/main" val="3266835710"/>
       </p:ext>
     </p:extLst>
   </p:cSld>

</xml_diff>

<commit_message>
Chi distribution is added.
</commit_message>
<xml_diff>
--- a/Distributions.pptx
+++ b/Distributions.pptx
@@ -5,7 +5,7 @@
     <p:sldMasterId id="2147483660" r:id="rId1"/>
   </p:sldMasterIdLst>
   <p:notesMasterIdLst>
-    <p:notesMasterId r:id="rId12"/>
+    <p:notesMasterId r:id="rId15"/>
   </p:notesMasterIdLst>
   <p:sldIdLst>
     <p:sldId id="257" r:id="rId2"/>
@@ -17,7 +17,10 @@
     <p:sldId id="262" r:id="rId8"/>
     <p:sldId id="263" r:id="rId9"/>
     <p:sldId id="264" r:id="rId10"/>
-    <p:sldId id="265" r:id="rId11"/>
+    <p:sldId id="266" r:id="rId11"/>
+    <p:sldId id="265" r:id="rId12"/>
+    <p:sldId id="267" r:id="rId13"/>
+    <p:sldId id="268" r:id="rId14"/>
   </p:sldIdLst>
   <p:sldSz cx="9144000" cy="6858000" type="screen4x3"/>
   <p:notesSz cx="6858000" cy="9144000"/>
@@ -218,7 +221,7 @@
           <a:p>
             <a:fld id="{CD863C69-6AC4-4515-84BB-C614EE551B82}" type="datetimeFigureOut">
               <a:rPr lang="ru-RU" smtClean="0"/>
-              <a:t>21.07.2019</a:t>
+              <a:t>24.07.2019</a:t>
             </a:fld>
             <a:endParaRPr lang="ru-RU"/>
           </a:p>
@@ -617,7 +620,7 @@
           <a:p>
             <a:fld id="{BF38C05E-219E-4729-9909-5B693F1E4DB2}" type="datetime1">
               <a:rPr lang="ru-RU" smtClean="0"/>
-              <a:t>21.07.2019</a:t>
+              <a:t>24.07.2019</a:t>
             </a:fld>
             <a:endParaRPr lang="ru-RU"/>
           </a:p>
@@ -787,7 +790,7 @@
           <a:p>
             <a:fld id="{E587BD1D-74D3-449F-A3CA-F47BBACDADC1}" type="datetime1">
               <a:rPr lang="ru-RU" smtClean="0"/>
-              <a:t>21.07.2019</a:t>
+              <a:t>24.07.2019</a:t>
             </a:fld>
             <a:endParaRPr lang="ru-RU"/>
           </a:p>
@@ -967,7 +970,7 @@
           <a:p>
             <a:fld id="{F156E365-3C59-403F-A598-8903968D44C1}" type="datetime1">
               <a:rPr lang="ru-RU" smtClean="0"/>
-              <a:t>21.07.2019</a:t>
+              <a:t>24.07.2019</a:t>
             </a:fld>
             <a:endParaRPr lang="ru-RU"/>
           </a:p>
@@ -1137,7 +1140,7 @@
           <a:p>
             <a:fld id="{D71D973D-7295-497C-A5AE-B81A0C1EA542}" type="datetime1">
               <a:rPr lang="ru-RU" smtClean="0"/>
-              <a:t>21.07.2019</a:t>
+              <a:t>24.07.2019</a:t>
             </a:fld>
             <a:endParaRPr lang="ru-RU"/>
           </a:p>
@@ -1381,7 +1384,7 @@
           <a:p>
             <a:fld id="{D43ACA65-1DF0-4542-9513-2573006F2B09}" type="datetime1">
               <a:rPr lang="ru-RU" smtClean="0"/>
-              <a:t>21.07.2019</a:t>
+              <a:t>24.07.2019</a:t>
             </a:fld>
             <a:endParaRPr lang="ru-RU"/>
           </a:p>
@@ -1613,7 +1616,7 @@
           <a:p>
             <a:fld id="{CE5D4F0D-BE92-42E2-AC19-D4AE919B8EEA}" type="datetime1">
               <a:rPr lang="ru-RU" smtClean="0"/>
-              <a:t>21.07.2019</a:t>
+              <a:t>24.07.2019</a:t>
             </a:fld>
             <a:endParaRPr lang="ru-RU"/>
           </a:p>
@@ -1980,7 +1983,7 @@
           <a:p>
             <a:fld id="{31712A4F-404C-4E2A-B048-29FEE1F56BCC}" type="datetime1">
               <a:rPr lang="ru-RU" smtClean="0"/>
-              <a:t>21.07.2019</a:t>
+              <a:t>24.07.2019</a:t>
             </a:fld>
             <a:endParaRPr lang="ru-RU"/>
           </a:p>
@@ -2098,7 +2101,7 @@
           <a:p>
             <a:fld id="{A591E32F-21C9-4A73-9D8C-CB8422C8AD99}" type="datetime1">
               <a:rPr lang="ru-RU" smtClean="0"/>
-              <a:t>21.07.2019</a:t>
+              <a:t>24.07.2019</a:t>
             </a:fld>
             <a:endParaRPr lang="ru-RU"/>
           </a:p>
@@ -2193,7 +2196,7 @@
           <a:p>
             <a:fld id="{E8BE7035-4758-4463-AF71-B436150BF40F}" type="datetime1">
               <a:rPr lang="ru-RU" smtClean="0"/>
-              <a:t>21.07.2019</a:t>
+              <a:t>24.07.2019</a:t>
             </a:fld>
             <a:endParaRPr lang="ru-RU"/>
           </a:p>
@@ -2470,7 +2473,7 @@
           <a:p>
             <a:fld id="{8BF22BB4-229E-48DC-A891-0BD3792CC568}" type="datetime1">
               <a:rPr lang="ru-RU" smtClean="0"/>
-              <a:t>21.07.2019</a:t>
+              <a:t>24.07.2019</a:t>
             </a:fld>
             <a:endParaRPr lang="ru-RU"/>
           </a:p>
@@ -2727,7 +2730,7 @@
           <a:p>
             <a:fld id="{B32F65DE-1A63-4DFF-816D-2C4DB2F0AABF}" type="datetime1">
               <a:rPr lang="ru-RU" smtClean="0"/>
-              <a:t>21.07.2019</a:t>
+              <a:t>24.07.2019</a:t>
             </a:fld>
             <a:endParaRPr lang="ru-RU"/>
           </a:p>
@@ -2940,7 +2943,7 @@
           <a:p>
             <a:fld id="{58F37F58-E97F-4EAB-9CA9-C9A7312871A5}" type="datetime1">
               <a:rPr lang="ru-RU" smtClean="0"/>
-              <a:t>21.07.2019</a:t>
+              <a:t>24.07.2019</a:t>
             </a:fld>
             <a:endParaRPr lang="ru-RU"/>
           </a:p>
@@ -3527,7 +3530,7 @@
         </p:nvSpPr>
         <p:spPr>
           <a:xfrm>
-            <a:off x="547168" y="92968"/>
+            <a:off x="329885" y="138236"/>
             <a:ext cx="7886700" cy="422525"/>
           </a:xfrm>
         </p:spPr>
@@ -3544,7 +3547,7 @@
                   <a:srgbClr val="00B0F0"/>
                 </a:solidFill>
               </a:rPr>
-              <a:t>Standard Normal Deviate</a:t>
+              <a:t>Skewness and Kurtosis</a:t>
             </a:r>
             <a:endParaRPr lang="ru-RU" sz="2400" b="1" dirty="0">
               <a:solidFill>
@@ -3556,14 +3559,88 @@
       </p:sp>
       <p:sp>
         <p:nvSpPr>
+          <p:cNvPr id="6" name="Прямоугольник 5"/>
+          <p:cNvSpPr/>
+          <p:nvPr/>
+        </p:nvSpPr>
+        <p:spPr>
+          <a:xfrm>
+            <a:off x="398353" y="4103297"/>
+            <a:ext cx="7523429" cy="276999"/>
+          </a:xfrm>
+          <a:prstGeom prst="rect">
+            <a:avLst/>
+          </a:prstGeom>
+        </p:spPr>
+        <p:txBody>
+          <a:bodyPr wrap="square">
+            <a:spAutoFit/>
+          </a:bodyPr>
+          <a:lstStyle/>
+          <a:p>
+            <a:r>
+              <a:rPr lang="en-US" sz="1200" dirty="0">
+                <a:hlinkClick r:id="rId2"/>
+              </a:rPr>
+              <a:t>https://www.spcforexcel.com/knowledge/basic-statistics/are-skewness-and-kurtosis-useful-statistics</a:t>
+            </a:r>
+            <a:endParaRPr lang="ru-RU" sz="1200" dirty="0"/>
+          </a:p>
+        </p:txBody>
+      </p:sp>
+      <p:pic>
+        <p:nvPicPr>
+          <p:cNvPr id="1026" name="Picture 2" descr="Chi-square distribution">
+            <a:hlinkClick r:id="rId3"/>
+          </p:cNvPr>
+          <p:cNvPicPr>
+            <a:picLocks noChangeAspect="1" noChangeArrowheads="1"/>
+          </p:cNvPicPr>
+          <p:nvPr/>
+        </p:nvPicPr>
+        <p:blipFill>
+          <a:blip r:embed="rId4">
+            <a:extLst>
+              <a:ext uri="{28A0092B-C50C-407E-A947-70E740481C1C}">
+                <a14:useLocalDpi xmlns:a14="http://schemas.microsoft.com/office/drawing/2010/main" val="0"/>
+              </a:ext>
+            </a:extLst>
+          </a:blip>
+          <a:srcRect/>
+          <a:stretch>
+            <a:fillRect/>
+          </a:stretch>
+        </p:blipFill>
+        <p:spPr bwMode="auto">
+          <a:xfrm>
+            <a:off x="2055436" y="606760"/>
+            <a:ext cx="4825407" cy="2895244"/>
+          </a:xfrm>
+          <a:prstGeom prst="rect">
+            <a:avLst/>
+          </a:prstGeom>
+          <a:noFill/>
+          <a:extLst>
+            <a:ext uri="{909E8E84-426E-40DD-AFC4-6F175D3DCCD1}">
+              <a14:hiddenFill xmlns:a14="http://schemas.microsoft.com/office/drawing/2010/main">
+                <a:solidFill>
+                  <a:srgbClr val="FFFFFF"/>
+                </a:solidFill>
+              </a14:hiddenFill>
+            </a:ext>
+          </a:extLst>
+        </p:spPr>
+      </p:pic>
+      <p:sp>
+        <p:nvSpPr>
           <p:cNvPr id="7" name="Прямоугольник 6"/>
           <p:cNvSpPr/>
           <p:nvPr/>
         </p:nvSpPr>
         <p:spPr>
           <a:xfrm>
-            <a:off x="269340" y="637058"/>
-            <a:ext cx="8442355" cy="923330"/>
+            <a:off x="398353" y="3733401"/>
+            <a:ext cx="8682273" cy="276999"/>
           </a:xfrm>
           <a:prstGeom prst="rect">
             <a:avLst/>
@@ -3575,9 +3652,132 @@
           </a:bodyPr>
           <a:lstStyle/>
           <a:p>
+            <a:r>
+              <a:rPr lang="en-US" sz="1200" dirty="0">
+                <a:hlinkClick r:id="rId5"/>
+              </a:rPr>
+              <a:t>http://www.real-statistics.com/descriptive-statistics/symmetry-skewness-kurtosis/</a:t>
+            </a:r>
+            <a:endParaRPr lang="ru-RU" sz="1200" dirty="0"/>
+          </a:p>
+        </p:txBody>
+      </p:sp>
+    </p:spTree>
+    <p:extLst>
+      <p:ext uri="{BB962C8B-B14F-4D97-AF65-F5344CB8AC3E}">
+        <p14:creationId xmlns:p14="http://schemas.microsoft.com/office/powerpoint/2010/main" val="3930046774"/>
+      </p:ext>
+    </p:extLst>
+  </p:cSld>
+  <p:clrMapOvr>
+    <a:masterClrMapping/>
+  </p:clrMapOvr>
+</p:sld>
+</file>
+
+<file path=ppt/slides/slide11.xml><?xml version="1.0" encoding="utf-8"?>
+<p:sld xmlns:a="http://schemas.openxmlformats.org/drawingml/2006/main" xmlns:r="http://schemas.openxmlformats.org/officeDocument/2006/relationships" xmlns:p="http://schemas.openxmlformats.org/presentationml/2006/main">
+  <p:cSld>
+    <p:spTree>
+      <p:nvGrpSpPr>
+        <p:cNvPr id="1" name=""/>
+        <p:cNvGrpSpPr/>
+        <p:nvPr/>
+      </p:nvGrpSpPr>
+      <p:grpSpPr>
+        <a:xfrm>
+          <a:off x="0" y="0"/>
+          <a:ext cx="0" cy="0"/>
+          <a:chOff x="0" y="0"/>
+          <a:chExt cx="0" cy="0"/>
+        </a:xfrm>
+      </p:grpSpPr>
+      <p:sp>
+        <p:nvSpPr>
+          <p:cNvPr id="4" name="Номер слайда 3"/>
+          <p:cNvSpPr>
+            <a:spLocks noGrp="1"/>
+          </p:cNvSpPr>
+          <p:nvPr>
+            <p:ph type="sldNum" sz="quarter" idx="12"/>
+          </p:nvPr>
+        </p:nvSpPr>
+        <p:spPr/>
+        <p:txBody>
+          <a:bodyPr/>
+          <a:lstStyle/>
+          <a:p>
+            <a:fld id="{C936BD1D-689F-4FB2-8C94-2D2423F07E62}" type="slidenum">
+              <a:rPr lang="ru-RU" smtClean="0"/>
+              <a:t>11</a:t>
+            </a:fld>
+            <a:endParaRPr lang="ru-RU"/>
+          </a:p>
+        </p:txBody>
+      </p:sp>
+      <p:sp>
+        <p:nvSpPr>
+          <p:cNvPr id="5" name="Заголовок 1"/>
+          <p:cNvSpPr>
+            <a:spLocks noGrp="1"/>
+          </p:cNvSpPr>
+          <p:nvPr>
+            <p:ph type="title"/>
+          </p:nvPr>
+        </p:nvSpPr>
+        <p:spPr>
+          <a:xfrm>
+            <a:off x="547168" y="92968"/>
+            <a:ext cx="7886700" cy="422525"/>
+          </a:xfrm>
+        </p:spPr>
+        <p:txBody>
+          <a:bodyPr vert="horz" lIns="91440" tIns="45720" rIns="91440" bIns="45720" rtlCol="0" anchor="ctr">
+            <a:normAutofit/>
+          </a:bodyPr>
+          <a:lstStyle/>
+          <a:p>
+            <a:pPr algn="ctr"/>
+            <a:r>
+              <a:rPr lang="en-US" sz="2400" b="1" dirty="0" smtClean="0">
+                <a:solidFill>
+                  <a:srgbClr val="00B0F0"/>
+                </a:solidFill>
+              </a:rPr>
+              <a:t>Standard Normal Deviate</a:t>
+            </a:r>
+            <a:endParaRPr lang="ru-RU" sz="2400" b="1" dirty="0">
+              <a:solidFill>
+                <a:srgbClr val="00B0F0"/>
+              </a:solidFill>
+            </a:endParaRPr>
+          </a:p>
+        </p:txBody>
+      </p:sp>
+      <p:sp>
+        <p:nvSpPr>
+          <p:cNvPr id="7" name="Прямоугольник 6"/>
+          <p:cNvSpPr/>
+          <p:nvPr/>
+        </p:nvSpPr>
+        <p:spPr>
+          <a:xfrm>
+            <a:off x="269340" y="637058"/>
+            <a:ext cx="8442355" cy="830997"/>
+          </a:xfrm>
+          <a:prstGeom prst="rect">
+            <a:avLst/>
+          </a:prstGeom>
+        </p:spPr>
+        <p:txBody>
+          <a:bodyPr wrap="square">
+            <a:spAutoFit/>
+          </a:bodyPr>
+          <a:lstStyle/>
+          <a:p>
             <a:pPr algn="just"/>
             <a:r>
-              <a:rPr lang="en-US" dirty="0" smtClean="0">
+              <a:rPr lang="en-US" sz="1600" dirty="0" smtClean="0">
                 <a:solidFill>
                   <a:srgbClr val="373D3F"/>
                 </a:solidFill>
@@ -3586,7 +3786,7 @@
               <a:t>The </a:t>
             </a:r>
             <a:r>
-              <a:rPr lang="en-US" i="1" u="sng" dirty="0" smtClean="0">
+              <a:rPr lang="en-US" sz="1600" i="1" u="sng" dirty="0" smtClean="0">
                 <a:solidFill>
                   <a:srgbClr val="373D3F"/>
                 </a:solidFill>
@@ -3595,7 +3795,7 @@
               <a:t>standard normal distribution</a:t>
             </a:r>
             <a:r>
-              <a:rPr lang="en-US" dirty="0" smtClean="0">
+              <a:rPr lang="en-US" sz="1600" dirty="0" smtClean="0">
                 <a:solidFill>
                   <a:srgbClr val="373D3F"/>
                 </a:solidFill>
@@ -3604,7 +3804,7 @@
               <a:t> is a normal distribution of standardized values called </a:t>
             </a:r>
             <a:r>
-              <a:rPr lang="en-US" b="1" i="1" dirty="0" smtClean="0">
+              <a:rPr lang="en-US" sz="1600" b="1" i="1" dirty="0" smtClean="0">
                 <a:solidFill>
                   <a:srgbClr val="373D3F"/>
                 </a:solidFill>
@@ -3613,7 +3813,7 @@
               <a:t>z</a:t>
             </a:r>
             <a:r>
-              <a:rPr lang="en-US" b="1" dirty="0" smtClean="0">
+              <a:rPr lang="en-US" sz="1600" b="1" dirty="0" smtClean="0">
                 <a:solidFill>
                   <a:srgbClr val="373D3F"/>
                 </a:solidFill>
@@ -3622,7 +3822,7 @@
               <a:t>-scores</a:t>
             </a:r>
             <a:r>
-              <a:rPr lang="en-US" dirty="0" smtClean="0">
+              <a:rPr lang="en-US" sz="1600" dirty="0" smtClean="0">
                 <a:solidFill>
                   <a:srgbClr val="373D3F"/>
                 </a:solidFill>
@@ -3634,7 +3834,7 @@
           <a:p>
             <a:pPr algn="just"/>
             <a:r>
-              <a:rPr lang="en-US" dirty="0" smtClean="0">
+              <a:rPr lang="en-US" sz="1600" dirty="0" smtClean="0">
                 <a:solidFill>
                   <a:srgbClr val="373D3F"/>
                 </a:solidFill>
@@ -3643,7 +3843,7 @@
               <a:t>A </a:t>
             </a:r>
             <a:r>
-              <a:rPr lang="en-US" i="1" dirty="0" smtClean="0">
+              <a:rPr lang="en-US" sz="1600" i="1" dirty="0" smtClean="0">
                 <a:solidFill>
                   <a:srgbClr val="373D3F"/>
                 </a:solidFill>
@@ -3652,7 +3852,7 @@
               <a:t>z</a:t>
             </a:r>
             <a:r>
-              <a:rPr lang="en-US" dirty="0" smtClean="0">
+              <a:rPr lang="en-US" sz="1600" dirty="0" smtClean="0">
                 <a:solidFill>
                   <a:srgbClr val="373D3F"/>
                 </a:solidFill>
@@ -3660,7 +3860,7 @@
               </a:rPr>
               <a:t>-score is measured in units of the standard deviation. </a:t>
             </a:r>
-            <a:endParaRPr lang="ru-RU" dirty="0"/>
+            <a:endParaRPr lang="ru-RU" sz="1600" dirty="0"/>
           </a:p>
         </p:txBody>
       </p:sp>
@@ -3672,8 +3872,8 @@
         </p:nvSpPr>
         <p:spPr>
           <a:xfrm>
-            <a:off x="176946" y="5957505"/>
-            <a:ext cx="8234693" cy="276999"/>
+            <a:off x="185999" y="6080898"/>
+            <a:ext cx="8595860" cy="261610"/>
           </a:xfrm>
           <a:prstGeom prst="rect">
             <a:avLst/>
@@ -3686,12 +3886,18 @@
           <a:lstStyle/>
           <a:p>
             <a:r>
-              <a:rPr lang="en-US" sz="1200" dirty="0">
+              <a:rPr lang="en-US" sz="1100" dirty="0">
                 <a:hlinkClick r:id="rId2"/>
               </a:rPr>
-              <a:t>https://courses.lumenlearning.com/introstats1/chapter/the-standard-normal-distribution/</a:t>
-            </a:r>
-            <a:endParaRPr lang="ru-RU" sz="1200" dirty="0"/>
+              <a:t>https://courses.lumenlearning.com/introstats1/chapter/the-standard-normal-distribution</a:t>
+            </a:r>
+            <a:r>
+              <a:rPr lang="en-US" sz="1100" dirty="0" smtClean="0">
+                <a:hlinkClick r:id="rId2"/>
+              </a:rPr>
+              <a:t>/</a:t>
+            </a:r>
+            <a:endParaRPr lang="ru-RU" sz="1100" dirty="0"/>
           </a:p>
         </p:txBody>
       </p:sp>
@@ -3711,8 +3917,8 @@
         </p:blipFill>
         <p:spPr>
           <a:xfrm>
-            <a:off x="350822" y="2881368"/>
-            <a:ext cx="1535372" cy="690055"/>
+            <a:off x="350822" y="3242308"/>
+            <a:ext cx="1369336" cy="615432"/>
           </a:xfrm>
           <a:prstGeom prst="rect">
             <a:avLst/>
@@ -3727,8 +3933,8 @@
         </p:nvSpPr>
         <p:spPr>
           <a:xfrm>
-            <a:off x="208228" y="4039718"/>
-            <a:ext cx="8564578" cy="646331"/>
+            <a:off x="185999" y="3978263"/>
+            <a:ext cx="8564578" cy="584775"/>
           </a:xfrm>
           <a:prstGeom prst="rect">
             <a:avLst/>
@@ -3740,8 +3946,9 @@
           </a:bodyPr>
           <a:lstStyle/>
           <a:p>
-            <a:r>
-              <a:rPr lang="en-US" dirty="0">
+            <a:pPr algn="just"/>
+            <a:r>
+              <a:rPr lang="en-US" sz="1600" dirty="0">
                 <a:solidFill>
                   <a:srgbClr val="373D3F"/>
                 </a:solidFill>
@@ -3750,7 +3957,7 @@
               <a:t>The </a:t>
             </a:r>
             <a:r>
-              <a:rPr lang="en-US" i="1" dirty="0" smtClean="0">
+              <a:rPr lang="en-US" sz="1600" i="1" dirty="0" smtClean="0">
                 <a:solidFill>
                   <a:srgbClr val="373D3F"/>
                 </a:solidFill>
@@ -3759,7 +3966,7 @@
               <a:t>z</a:t>
             </a:r>
             <a:r>
-              <a:rPr lang="en-US" dirty="0" smtClean="0">
+              <a:rPr lang="en-US" sz="1600" dirty="0" smtClean="0">
                 <a:solidFill>
                   <a:srgbClr val="373D3F"/>
                 </a:solidFill>
@@ -3768,7 +3975,7 @@
               <a:t>-score </a:t>
             </a:r>
             <a:r>
-              <a:rPr lang="en-US" dirty="0">
+              <a:rPr lang="en-US" sz="1600" dirty="0">
                 <a:solidFill>
                   <a:srgbClr val="373D3F"/>
                 </a:solidFill>
@@ -3777,7 +3984,7 @@
               <a:t>tells you how many standard </a:t>
             </a:r>
             <a:r>
-              <a:rPr lang="en-US" dirty="0" smtClean="0">
+              <a:rPr lang="en-US" sz="1600" dirty="0" smtClean="0">
                 <a:solidFill>
                   <a:srgbClr val="373D3F"/>
                 </a:solidFill>
@@ -3786,7 +3993,7 @@
               <a:t>deviations (</a:t>
             </a:r>
             <a:r>
-              <a:rPr lang="el-GR" dirty="0" smtClean="0">
+              <a:rPr lang="el-GR" sz="1600" dirty="0" smtClean="0">
                 <a:solidFill>
                   <a:srgbClr val="FF0000"/>
                 </a:solidFill>
@@ -3795,7 +4002,7 @@
               <a:t>σ</a:t>
             </a:r>
             <a:r>
-              <a:rPr lang="en-US" dirty="0" smtClean="0">
+              <a:rPr lang="en-US" sz="1600" dirty="0" smtClean="0">
                 <a:solidFill>
                   <a:srgbClr val="373D3F"/>
                 </a:solidFill>
@@ -3804,7 +4011,7 @@
               <a:t>) </a:t>
             </a:r>
             <a:r>
-              <a:rPr lang="en-US" dirty="0">
+              <a:rPr lang="en-US" sz="1600" dirty="0">
                 <a:solidFill>
                   <a:srgbClr val="373D3F"/>
                 </a:solidFill>
@@ -3813,7 +4020,7 @@
               <a:t>the value </a:t>
             </a:r>
             <a:r>
-              <a:rPr lang="en-US" i="1" dirty="0">
+              <a:rPr lang="en-US" sz="1600" i="1" dirty="0">
                 <a:solidFill>
                   <a:srgbClr val="FF0000"/>
                 </a:solidFill>
@@ -3822,7 +4029,7 @@
               <a:t>x</a:t>
             </a:r>
             <a:r>
-              <a:rPr lang="en-US" dirty="0">
+              <a:rPr lang="en-US" sz="1600" dirty="0">
                 <a:solidFill>
                   <a:srgbClr val="373D3F"/>
                 </a:solidFill>
@@ -3831,7 +4038,7 @@
               <a:t> is above (to the right of) or below (to the left of) the mean, </a:t>
             </a:r>
             <a:r>
-              <a:rPr lang="en-US" i="1" dirty="0">
+              <a:rPr lang="en-US" sz="1600" i="1" dirty="0">
                 <a:solidFill>
                   <a:srgbClr val="FF0000"/>
                 </a:solidFill>
@@ -3840,7 +4047,7 @@
               <a:t>μ</a:t>
             </a:r>
             <a:r>
-              <a:rPr lang="en-US" dirty="0">
+              <a:rPr lang="en-US" sz="1600" dirty="0">
                 <a:solidFill>
                   <a:srgbClr val="373D3F"/>
                 </a:solidFill>
@@ -3848,7 +4055,7 @@
               </a:rPr>
               <a:t>.</a:t>
             </a:r>
-            <a:endParaRPr lang="ru-RU" dirty="0"/>
+            <a:endParaRPr lang="ru-RU" sz="1600" dirty="0"/>
           </a:p>
         </p:txBody>
       </p:sp>
@@ -3948,7 +4155,7 @@
         </p:blipFill>
         <p:spPr>
           <a:xfrm>
-            <a:off x="467480" y="1512375"/>
+            <a:off x="269340" y="1569367"/>
             <a:ext cx="5619750" cy="1133475"/>
           </a:xfrm>
           <a:prstGeom prst="rect">
@@ -3956,10 +4163,586 @@
           </a:prstGeom>
         </p:spPr>
       </p:pic>
+      <p:sp>
+        <p:nvSpPr>
+          <p:cNvPr id="6" name="Прямоугольник 5"/>
+          <p:cNvSpPr/>
+          <p:nvPr/>
+        </p:nvSpPr>
+        <p:spPr>
+          <a:xfrm>
+            <a:off x="269340" y="2826036"/>
+            <a:ext cx="8603056" cy="338554"/>
+          </a:xfrm>
+          <a:prstGeom prst="rect">
+            <a:avLst/>
+          </a:prstGeom>
+        </p:spPr>
+        <p:txBody>
+          <a:bodyPr wrap="square">
+            <a:spAutoFit/>
+          </a:bodyPr>
+          <a:lstStyle/>
+          <a:p>
+            <a:pPr algn="just"/>
+            <a:r>
+              <a:rPr lang="en-US" sz="800" dirty="0">
+                <a:hlinkClick r:id="rId6"/>
+              </a:rPr>
+              <a:t>https://www.google.com/search?q=standardized+normal+distribution+function&amp;tbm=isch&amp;source=iu&amp;ictx=1&amp;fir=KnzOYQYCWGe7eM%253A%252CcNmGppNGE7l3gM%252C_&amp;vet=1&amp;usg=AI4_-kSUsKWlMfyq3ne8kzSjdv_RmJl-kA&amp;sa=X&amp;ved=2ahUKEwiZ25_RycbjAhWPa1AKHeBmCLkQ9QEwBHoECAYQBg#imgrc=3TG6TWgAvYWz-M:&amp;vet=1</a:t>
+            </a:r>
+            <a:endParaRPr lang="ru-RU" sz="800" dirty="0"/>
+          </a:p>
+        </p:txBody>
+      </p:sp>
     </p:spTree>
     <p:extLst>
       <p:ext uri="{BB962C8B-B14F-4D97-AF65-F5344CB8AC3E}">
         <p14:creationId xmlns:p14="http://schemas.microsoft.com/office/powerpoint/2010/main" val="2227307067"/>
+      </p:ext>
+    </p:extLst>
+  </p:cSld>
+  <p:clrMapOvr>
+    <a:masterClrMapping/>
+  </p:clrMapOvr>
+</p:sld>
+</file>
+
+<file path=ppt/slides/slide12.xml><?xml version="1.0" encoding="utf-8"?>
+<p:sld xmlns:a="http://schemas.openxmlformats.org/drawingml/2006/main" xmlns:r="http://schemas.openxmlformats.org/officeDocument/2006/relationships" xmlns:p="http://schemas.openxmlformats.org/presentationml/2006/main">
+  <p:cSld>
+    <p:spTree>
+      <p:nvGrpSpPr>
+        <p:cNvPr id="1" name=""/>
+        <p:cNvGrpSpPr/>
+        <p:nvPr/>
+      </p:nvGrpSpPr>
+      <p:grpSpPr>
+        <a:xfrm>
+          <a:off x="0" y="0"/>
+          <a:ext cx="0" cy="0"/>
+          <a:chOff x="0" y="0"/>
+          <a:chExt cx="0" cy="0"/>
+        </a:xfrm>
+      </p:grpSpPr>
+      <p:sp>
+        <p:nvSpPr>
+          <p:cNvPr id="4" name="Номер слайда 3"/>
+          <p:cNvSpPr>
+            <a:spLocks noGrp="1"/>
+          </p:cNvSpPr>
+          <p:nvPr>
+            <p:ph type="sldNum" sz="quarter" idx="12"/>
+          </p:nvPr>
+        </p:nvSpPr>
+        <p:spPr/>
+        <p:txBody>
+          <a:bodyPr/>
+          <a:lstStyle/>
+          <a:p>
+            <a:fld id="{C936BD1D-689F-4FB2-8C94-2D2423F07E62}" type="slidenum">
+              <a:rPr lang="ru-RU" smtClean="0"/>
+              <a:t>12</a:t>
+            </a:fld>
+            <a:endParaRPr lang="ru-RU"/>
+          </a:p>
+        </p:txBody>
+      </p:sp>
+      <p:sp>
+        <p:nvSpPr>
+          <p:cNvPr id="5" name="Заголовок 1"/>
+          <p:cNvSpPr>
+            <a:spLocks noGrp="1"/>
+          </p:cNvSpPr>
+          <p:nvPr>
+            <p:ph type="title"/>
+          </p:nvPr>
+        </p:nvSpPr>
+        <p:spPr>
+          <a:xfrm>
+            <a:off x="547168" y="92968"/>
+            <a:ext cx="7886700" cy="422525"/>
+          </a:xfrm>
+        </p:spPr>
+        <p:txBody>
+          <a:bodyPr vert="horz" lIns="91440" tIns="45720" rIns="91440" bIns="45720" rtlCol="0" anchor="ctr">
+            <a:normAutofit/>
+          </a:bodyPr>
+          <a:lstStyle/>
+          <a:p>
+            <a:pPr algn="ctr"/>
+            <a:r>
+              <a:rPr lang="en-US" sz="2400" b="1" dirty="0" smtClean="0">
+                <a:solidFill>
+                  <a:srgbClr val="00B0F0"/>
+                </a:solidFill>
+              </a:rPr>
+              <a:t>χ(Chi) Distribution</a:t>
+            </a:r>
+            <a:endParaRPr lang="ru-RU" sz="2400" b="1" dirty="0">
+              <a:solidFill>
+                <a:srgbClr val="00B0F0"/>
+              </a:solidFill>
+            </a:endParaRPr>
+          </a:p>
+        </p:txBody>
+      </p:sp>
+      <p:pic>
+        <p:nvPicPr>
+          <p:cNvPr id="6" name="Рисунок 5"/>
+          <p:cNvPicPr>
+            <a:picLocks noChangeAspect="1"/>
+          </p:cNvPicPr>
+          <p:nvPr/>
+        </p:nvPicPr>
+        <p:blipFill>
+          <a:blip r:embed="rId2"/>
+          <a:stretch>
+            <a:fillRect/>
+          </a:stretch>
+        </p:blipFill>
+        <p:spPr>
+          <a:xfrm>
+            <a:off x="398352" y="1059770"/>
+            <a:ext cx="1685925" cy="885825"/>
+          </a:xfrm>
+          <a:prstGeom prst="rect">
+            <a:avLst/>
+          </a:prstGeom>
+        </p:spPr>
+      </p:pic>
+      <p:sp>
+        <p:nvSpPr>
+          <p:cNvPr id="7" name="TextBox 6"/>
+          <p:cNvSpPr txBox="1"/>
+          <p:nvPr/>
+        </p:nvSpPr>
+        <p:spPr>
+          <a:xfrm>
+            <a:off x="398352" y="633743"/>
+            <a:ext cx="2679826" cy="307777"/>
+          </a:xfrm>
+          <a:prstGeom prst="rect">
+            <a:avLst/>
+          </a:prstGeom>
+          <a:noFill/>
+        </p:spPr>
+        <p:txBody>
+          <a:bodyPr wrap="square" rtlCol="0">
+            <a:spAutoFit/>
+          </a:bodyPr>
+          <a:lstStyle/>
+          <a:p>
+            <a:r>
+              <a:rPr lang="en-US" sz="1400" b="1" dirty="0" smtClean="0"/>
+              <a:t>Probability Density Function</a:t>
+            </a:r>
+            <a:endParaRPr lang="ru-RU" sz="1400" b="1" dirty="0"/>
+          </a:p>
+        </p:txBody>
+      </p:sp>
+      <p:pic>
+        <p:nvPicPr>
+          <p:cNvPr id="13" name="Рисунок 12"/>
+          <p:cNvPicPr>
+            <a:picLocks noChangeAspect="1"/>
+          </p:cNvPicPr>
+          <p:nvPr/>
+        </p:nvPicPr>
+        <p:blipFill>
+          <a:blip r:embed="rId3"/>
+          <a:stretch>
+            <a:fillRect/>
+          </a:stretch>
+        </p:blipFill>
+        <p:spPr>
+          <a:xfrm>
+            <a:off x="398352" y="2022550"/>
+            <a:ext cx="495300" cy="228600"/>
+          </a:xfrm>
+          <a:prstGeom prst="rect">
+            <a:avLst/>
+          </a:prstGeom>
+        </p:spPr>
+      </p:pic>
+      <p:sp>
+        <p:nvSpPr>
+          <p:cNvPr id="14" name="TextBox 13"/>
+          <p:cNvSpPr txBox="1"/>
+          <p:nvPr/>
+        </p:nvSpPr>
+        <p:spPr>
+          <a:xfrm>
+            <a:off x="893652" y="1974151"/>
+            <a:ext cx="8051172" cy="461665"/>
+          </a:xfrm>
+          <a:prstGeom prst="rect">
+            <a:avLst/>
+          </a:prstGeom>
+          <a:noFill/>
+        </p:spPr>
+        <p:txBody>
+          <a:bodyPr wrap="square" rtlCol="0">
+            <a:spAutoFit/>
+          </a:bodyPr>
+          <a:lstStyle/>
+          <a:p>
+            <a:r>
+              <a:rPr lang="en-US" sz="1200" dirty="0" smtClean="0"/>
+              <a:t>- Gamma function </a:t>
+            </a:r>
+            <a:r>
+              <a:rPr lang="en-US" sz="1200" dirty="0" smtClean="0">
+                <a:hlinkClick r:id="rId4"/>
+              </a:rPr>
+              <a:t>https</a:t>
+            </a:r>
+            <a:r>
+              <a:rPr lang="en-US" sz="1200" dirty="0">
+                <a:hlinkClick r:id="rId4"/>
+              </a:rPr>
+              <a:t>://en.wikipedia.org/wiki/Gamma_function</a:t>
+            </a:r>
+            <a:r>
+              <a:rPr lang="en-US" sz="1200" dirty="0" smtClean="0"/>
+              <a:t>), </a:t>
+            </a:r>
+            <a:r>
+              <a:rPr lang="en-US" sz="1200" dirty="0" smtClean="0">
+                <a:solidFill>
+                  <a:srgbClr val="FF0000"/>
+                </a:solidFill>
+              </a:rPr>
+              <a:t>k</a:t>
+            </a:r>
+            <a:r>
+              <a:rPr lang="en-US" sz="1200" dirty="0" smtClean="0"/>
+              <a:t> – degree of freedom, x – standard random normal variable.</a:t>
+            </a:r>
+            <a:endParaRPr lang="ru-RU" sz="1200" dirty="0"/>
+          </a:p>
+        </p:txBody>
+      </p:sp>
+      <p:pic>
+        <p:nvPicPr>
+          <p:cNvPr id="2" name="Рисунок 1"/>
+          <p:cNvPicPr>
+            <a:picLocks noChangeAspect="1"/>
+          </p:cNvPicPr>
+          <p:nvPr/>
+        </p:nvPicPr>
+        <p:blipFill>
+          <a:blip r:embed="rId5"/>
+          <a:stretch>
+            <a:fillRect/>
+          </a:stretch>
+        </p:blipFill>
+        <p:spPr>
+          <a:xfrm>
+            <a:off x="269080" y="2512771"/>
+            <a:ext cx="3630393" cy="3618190"/>
+          </a:xfrm>
+          <a:prstGeom prst="rect">
+            <a:avLst/>
+          </a:prstGeom>
+        </p:spPr>
+      </p:pic>
+      <p:sp>
+        <p:nvSpPr>
+          <p:cNvPr id="3" name="Прямоугольник 2"/>
+          <p:cNvSpPr/>
+          <p:nvPr/>
+        </p:nvSpPr>
+        <p:spPr>
+          <a:xfrm>
+            <a:off x="146834" y="6077248"/>
+            <a:ext cx="8797989" cy="461665"/>
+          </a:xfrm>
+          <a:prstGeom prst="rect">
+            <a:avLst/>
+          </a:prstGeom>
+        </p:spPr>
+        <p:txBody>
+          <a:bodyPr wrap="square">
+            <a:spAutoFit/>
+          </a:bodyPr>
+          <a:lstStyle/>
+          <a:p>
+            <a:pPr algn="just"/>
+            <a:r>
+              <a:rPr lang="en-US" sz="1200" dirty="0">
+                <a:hlinkClick r:id="rId6"/>
+              </a:rPr>
+              <a:t>https://www.khanacademy.org/math/statistics-probability/inference-categorical-data-chi-square-tests/chi-square-goodness-of-fit-tests/v/chi-square-distribution-introduction</a:t>
+            </a:r>
+            <a:endParaRPr lang="ru-RU" sz="1200" dirty="0"/>
+          </a:p>
+        </p:txBody>
+      </p:sp>
+      <p:sp>
+        <p:nvSpPr>
+          <p:cNvPr id="8" name="TextBox 7"/>
+          <p:cNvSpPr txBox="1"/>
+          <p:nvPr/>
+        </p:nvSpPr>
+        <p:spPr>
+          <a:xfrm>
+            <a:off x="4220894" y="2625316"/>
+            <a:ext cx="4723929" cy="3046988"/>
+          </a:xfrm>
+          <a:prstGeom prst="rect">
+            <a:avLst/>
+          </a:prstGeom>
+          <a:noFill/>
+        </p:spPr>
+        <p:txBody>
+          <a:bodyPr wrap="square" rtlCol="0">
+            <a:spAutoFit/>
+          </a:bodyPr>
+          <a:lstStyle/>
+          <a:p>
+            <a:r>
+              <a:rPr lang="en-US" b="1" dirty="0" smtClean="0"/>
+              <a:t>Application of Chi distribution:</a:t>
+            </a:r>
+          </a:p>
+          <a:p>
+            <a:endParaRPr lang="en-US" b="1" dirty="0" smtClean="0"/>
+          </a:p>
+          <a:p>
+            <a:pPr marL="285750" indent="-285750">
+              <a:buFont typeface="Arial" panose="020B0604020202020204" pitchFamily="34" charset="0"/>
+              <a:buChar char="•"/>
+            </a:pPr>
+            <a:r>
+              <a:rPr lang="en-US" sz="1400" dirty="0"/>
+              <a:t>t</a:t>
+            </a:r>
+            <a:r>
+              <a:rPr lang="en-US" sz="1400" dirty="0" smtClean="0"/>
+              <a:t>esting </a:t>
+            </a:r>
+            <a:r>
+              <a:rPr lang="en-US" sz="1400" dirty="0"/>
+              <a:t>for a </a:t>
+            </a:r>
+            <a:r>
+              <a:rPr lang="en-US" sz="1400" dirty="0" smtClean="0"/>
+              <a:t>population </a:t>
+            </a:r>
+            <a:r>
+              <a:rPr lang="en-US" sz="1400" dirty="0"/>
+              <a:t>v</a:t>
+            </a:r>
+            <a:r>
+              <a:rPr lang="en-US" sz="1400" dirty="0" smtClean="0"/>
+              <a:t>ariance</a:t>
+            </a:r>
+          </a:p>
+          <a:p>
+            <a:pPr marL="285750" indent="-285750">
+              <a:buFont typeface="Arial" panose="020B0604020202020204" pitchFamily="34" charset="0"/>
+              <a:buChar char="•"/>
+            </a:pPr>
+            <a:endParaRPr lang="en-US" sz="1400" dirty="0" smtClean="0"/>
+          </a:p>
+          <a:p>
+            <a:pPr marL="285750" indent="-285750">
+              <a:buFont typeface="Arial" panose="020B0604020202020204" pitchFamily="34" charset="0"/>
+              <a:buChar char="•"/>
+            </a:pPr>
+            <a:r>
+              <a:rPr lang="en-US" sz="1400" dirty="0"/>
+              <a:t>t</a:t>
+            </a:r>
+            <a:r>
+              <a:rPr lang="en-US" sz="1400" dirty="0" smtClean="0"/>
+              <a:t>est </a:t>
+            </a:r>
+            <a:r>
+              <a:rPr lang="en-US" sz="1400" dirty="0"/>
+              <a:t>for statistical </a:t>
+            </a:r>
+            <a:r>
+              <a:rPr lang="en-US" sz="1400" dirty="0" smtClean="0"/>
+              <a:t>independence</a:t>
+            </a:r>
+          </a:p>
+          <a:p>
+            <a:pPr marL="285750" indent="-285750">
+              <a:buFont typeface="Arial" panose="020B0604020202020204" pitchFamily="34" charset="0"/>
+              <a:buChar char="•"/>
+            </a:pPr>
+            <a:endParaRPr lang="en-US" sz="1400" dirty="0" smtClean="0"/>
+          </a:p>
+          <a:p>
+            <a:pPr marL="285750" indent="-285750">
+              <a:buFont typeface="Arial" panose="020B0604020202020204" pitchFamily="34" charset="0"/>
+              <a:buChar char="•"/>
+            </a:pPr>
+            <a:r>
+              <a:rPr lang="en-US" sz="1400" dirty="0"/>
+              <a:t>t</a:t>
+            </a:r>
+            <a:r>
+              <a:rPr lang="en-US" sz="1400" dirty="0" smtClean="0"/>
+              <a:t>est </a:t>
+            </a:r>
+            <a:r>
+              <a:rPr lang="en-US" sz="1400" dirty="0"/>
+              <a:t>for </a:t>
+            </a:r>
+            <a:r>
+              <a:rPr lang="en-US" sz="1400" dirty="0" smtClean="0"/>
+              <a:t>goodness </a:t>
+            </a:r>
+            <a:r>
+              <a:rPr lang="en-US" sz="1400" dirty="0"/>
+              <a:t>of </a:t>
+            </a:r>
+            <a:r>
+              <a:rPr lang="en-US" sz="1400" dirty="0"/>
+              <a:t>f</a:t>
+            </a:r>
+            <a:r>
+              <a:rPr lang="en-US" sz="1400" dirty="0" smtClean="0"/>
+              <a:t>it</a:t>
+            </a:r>
+          </a:p>
+          <a:p>
+            <a:pPr marL="285750" indent="-285750">
+              <a:buFont typeface="Arial" panose="020B0604020202020204" pitchFamily="34" charset="0"/>
+              <a:buChar char="•"/>
+            </a:pPr>
+            <a:endParaRPr lang="en-US" sz="1400" dirty="0" smtClean="0"/>
+          </a:p>
+          <a:p>
+            <a:pPr marL="285750" indent="-285750">
+              <a:buFont typeface="Arial" panose="020B0604020202020204" pitchFamily="34" charset="0"/>
+              <a:buChar char="•"/>
+            </a:pPr>
+            <a:r>
+              <a:rPr lang="en-US" sz="1400" dirty="0"/>
+              <a:t>t</a:t>
+            </a:r>
+            <a:r>
+              <a:rPr lang="en-US" sz="1400" dirty="0" smtClean="0"/>
+              <a:t>est </a:t>
+            </a:r>
+            <a:r>
+              <a:rPr lang="en-US" sz="1400" dirty="0"/>
+              <a:t>for </a:t>
+            </a:r>
+            <a:r>
+              <a:rPr lang="en-US" sz="1400" dirty="0" smtClean="0"/>
+              <a:t>homogeneity</a:t>
+            </a:r>
+            <a:endParaRPr lang="en-US" sz="1400" dirty="0"/>
+          </a:p>
+          <a:p>
+            <a:pPr marL="285750" indent="-285750">
+              <a:buFont typeface="Arial" panose="020B0604020202020204" pitchFamily="34" charset="0"/>
+              <a:buChar char="•"/>
+            </a:pPr>
+            <a:endParaRPr lang="en-US" sz="1400" dirty="0"/>
+          </a:p>
+          <a:p>
+            <a:r>
+              <a:rPr lang="en-US" sz="1200" dirty="0">
+                <a:hlinkClick r:id="rId7"/>
+              </a:rPr>
+              <a:t>https://stepupanalytics.com/application-of-chi-square-distribution/</a:t>
+            </a:r>
+            <a:endParaRPr lang="en-US" sz="1200" b="1" dirty="0"/>
+          </a:p>
+          <a:p>
+            <a:pPr marL="285750" indent="-285750">
+              <a:buFont typeface="Arial" panose="020B0604020202020204" pitchFamily="34" charset="0"/>
+              <a:buChar char="•"/>
+            </a:pPr>
+            <a:endParaRPr lang="en-US" sz="1400" dirty="0"/>
+          </a:p>
+          <a:p>
+            <a:endParaRPr lang="ru-RU" dirty="0"/>
+          </a:p>
+        </p:txBody>
+      </p:sp>
+    </p:spTree>
+    <p:extLst>
+      <p:ext uri="{BB962C8B-B14F-4D97-AF65-F5344CB8AC3E}">
+        <p14:creationId xmlns:p14="http://schemas.microsoft.com/office/powerpoint/2010/main" val="2363931006"/>
+      </p:ext>
+    </p:extLst>
+  </p:cSld>
+  <p:clrMapOvr>
+    <a:masterClrMapping/>
+  </p:clrMapOvr>
+</p:sld>
+</file>
+
+<file path=ppt/slides/slide13.xml><?xml version="1.0" encoding="utf-8"?>
+<p:sld xmlns:a="http://schemas.openxmlformats.org/drawingml/2006/main" xmlns:r="http://schemas.openxmlformats.org/officeDocument/2006/relationships" xmlns:p="http://schemas.openxmlformats.org/presentationml/2006/main">
+  <p:cSld>
+    <p:spTree>
+      <p:nvGrpSpPr>
+        <p:cNvPr id="1" name=""/>
+        <p:cNvGrpSpPr/>
+        <p:nvPr/>
+      </p:nvGrpSpPr>
+      <p:grpSpPr>
+        <a:xfrm>
+          <a:off x="0" y="0"/>
+          <a:ext cx="0" cy="0"/>
+          <a:chOff x="0" y="0"/>
+          <a:chExt cx="0" cy="0"/>
+        </a:xfrm>
+      </p:grpSpPr>
+      <p:sp>
+        <p:nvSpPr>
+          <p:cNvPr id="2" name="Заголовок 1"/>
+          <p:cNvSpPr>
+            <a:spLocks noGrp="1"/>
+          </p:cNvSpPr>
+          <p:nvPr>
+            <p:ph type="title"/>
+          </p:nvPr>
+        </p:nvSpPr>
+        <p:spPr/>
+        <p:txBody>
+          <a:bodyPr/>
+          <a:lstStyle/>
+          <a:p>
+            <a:endParaRPr lang="ru-RU" dirty="0"/>
+          </a:p>
+        </p:txBody>
+      </p:sp>
+      <p:sp>
+        <p:nvSpPr>
+          <p:cNvPr id="4" name="Номер слайда 3"/>
+          <p:cNvSpPr>
+            <a:spLocks noGrp="1"/>
+          </p:cNvSpPr>
+          <p:nvPr>
+            <p:ph type="sldNum" sz="quarter" idx="12"/>
+          </p:nvPr>
+        </p:nvSpPr>
+        <p:spPr/>
+        <p:txBody>
+          <a:bodyPr/>
+          <a:lstStyle/>
+          <a:p>
+            <a:fld id="{C936BD1D-689F-4FB2-8C94-2D2423F07E62}" type="slidenum">
+              <a:rPr lang="ru-RU" smtClean="0"/>
+              <a:t>13</a:t>
+            </a:fld>
+            <a:endParaRPr lang="ru-RU"/>
+          </a:p>
+        </p:txBody>
+      </p:sp>
+    </p:spTree>
+    <p:extLst>
+      <p:ext uri="{BB962C8B-B14F-4D97-AF65-F5344CB8AC3E}">
+        <p14:creationId xmlns:p14="http://schemas.microsoft.com/office/powerpoint/2010/main" val="598574929"/>
       </p:ext>
     </p:extLst>
   </p:cSld>
@@ -5496,8 +6279,8 @@
           </a:p>
         </p:txBody>
       </p:sp>
-      <mc:AlternateContent xmlns:mc="http://schemas.openxmlformats.org/markup-compatibility/2006">
-        <mc:Choice xmlns:a14="http://schemas.microsoft.com/office/drawing/2010/main" Requires="a14">
+      <mc:AlternateContent xmlns:mc="http://schemas.openxmlformats.org/markup-compatibility/2006" xmlns:a14="http://schemas.microsoft.com/office/drawing/2010/main">
+        <mc:Choice Requires="a14">
           <p:sp>
             <p:nvSpPr>
               <p:cNvPr id="12" name="TextBox 11"/>
@@ -5562,7 +6345,6 @@
                 </a:r>
               </a:p>
               <a:p>
-                <a:pPr/>
                 <a14:m>
                   <m:oMath xmlns:m="http://schemas.openxmlformats.org/officeDocument/2006/math">
                     <m:sSup>
@@ -5620,7 +6402,7 @@
             </p:txBody>
           </p:sp>
         </mc:Choice>
-        <mc:Fallback>
+        <mc:Fallback xmlns="">
           <p:sp>
             <p:nvSpPr>
               <p:cNvPr id="12" name="TextBox 11"/>

</xml_diff>

<commit_message>
additional distributions are added.
</commit_message>
<xml_diff>
--- a/Distributions.pptx
+++ b/Distributions.pptx
@@ -5,7 +5,7 @@
     <p:sldMasterId id="2147483660" r:id="rId1"/>
   </p:sldMasterIdLst>
   <p:notesMasterIdLst>
-    <p:notesMasterId r:id="rId15"/>
+    <p:notesMasterId r:id="rId16"/>
   </p:notesMasterIdLst>
   <p:sldIdLst>
     <p:sldId id="257" r:id="rId2"/>
@@ -21,6 +21,7 @@
     <p:sldId id="265" r:id="rId12"/>
     <p:sldId id="267" r:id="rId13"/>
     <p:sldId id="268" r:id="rId14"/>
+    <p:sldId id="269" r:id="rId15"/>
   </p:sldIdLst>
   <p:sldSz cx="9144000" cy="6858000" type="screen4x3"/>
   <p:notesSz cx="6858000" cy="9144000"/>
@@ -221,7 +222,7 @@
           <a:p>
             <a:fld id="{CD863C69-6AC4-4515-84BB-C614EE551B82}" type="datetimeFigureOut">
               <a:rPr lang="ru-RU" smtClean="0"/>
-              <a:t>24.07.2019</a:t>
+              <a:t>25.07.2019</a:t>
             </a:fld>
             <a:endParaRPr lang="ru-RU"/>
           </a:p>
@@ -285,38 +286,37 @@
           <a:p>
             <a:pPr lvl="0"/>
             <a:r>
-              <a:rPr lang="ru-RU" smtClean="0"/>
+              <a:rPr lang="ru-RU"/>
               <a:t>Образец текста</a:t>
             </a:r>
           </a:p>
           <a:p>
             <a:pPr lvl="1"/>
             <a:r>
-              <a:rPr lang="ru-RU" smtClean="0"/>
+              <a:rPr lang="ru-RU"/>
               <a:t>Второй уровень</a:t>
             </a:r>
           </a:p>
           <a:p>
             <a:pPr lvl="2"/>
             <a:r>
-              <a:rPr lang="ru-RU" smtClean="0"/>
+              <a:rPr lang="ru-RU"/>
               <a:t>Третий уровень</a:t>
             </a:r>
           </a:p>
           <a:p>
             <a:pPr lvl="3"/>
             <a:r>
-              <a:rPr lang="ru-RU" smtClean="0"/>
+              <a:rPr lang="ru-RU"/>
               <a:t>Четвертый уровень</a:t>
             </a:r>
           </a:p>
           <a:p>
             <a:pPr lvl="4"/>
             <a:r>
-              <a:rPr lang="ru-RU" smtClean="0"/>
+              <a:rPr lang="ru-RU"/>
               <a:t>Пятый уровень</a:t>
             </a:r>
-            <a:endParaRPr lang="ru-RU"/>
           </a:p>
         </p:txBody>
       </p:sp>
@@ -531,7 +531,7 @@
           </a:lstStyle>
           <a:p>
             <a:r>
-              <a:rPr lang="ru-RU" smtClean="0"/>
+              <a:rPr lang="ru-RU"/>
               <a:t>Образец заголовка</a:t>
             </a:r>
             <a:endParaRPr lang="en-US" dirty="0"/>
@@ -596,7 +596,7 @@
           </a:lstStyle>
           <a:p>
             <a:r>
-              <a:rPr lang="ru-RU" smtClean="0"/>
+              <a:rPr lang="ru-RU"/>
               <a:t>Образец подзаголовка</a:t>
             </a:r>
             <a:endParaRPr lang="en-US" dirty="0"/>
@@ -620,7 +620,7 @@
           <a:p>
             <a:fld id="{BF38C05E-219E-4729-9909-5B693F1E4DB2}" type="datetime1">
               <a:rPr lang="ru-RU" smtClean="0"/>
-              <a:t>24.07.2019</a:t>
+              <a:t>25.07.2019</a:t>
             </a:fld>
             <a:endParaRPr lang="ru-RU"/>
           </a:p>
@@ -714,7 +714,7 @@
           <a:lstStyle/>
           <a:p>
             <a:r>
-              <a:rPr lang="ru-RU" smtClean="0"/>
+              <a:rPr lang="ru-RU"/>
               <a:t>Образец заголовка</a:t>
             </a:r>
             <a:endParaRPr lang="en-US" dirty="0"/>
@@ -738,35 +738,35 @@
           <a:p>
             <a:pPr lvl="0"/>
             <a:r>
-              <a:rPr lang="ru-RU" smtClean="0"/>
+              <a:rPr lang="ru-RU"/>
               <a:t>Образец текста</a:t>
             </a:r>
           </a:p>
           <a:p>
             <a:pPr lvl="1"/>
             <a:r>
-              <a:rPr lang="ru-RU" smtClean="0"/>
+              <a:rPr lang="ru-RU"/>
               <a:t>Второй уровень</a:t>
             </a:r>
           </a:p>
           <a:p>
             <a:pPr lvl="2"/>
             <a:r>
-              <a:rPr lang="ru-RU" smtClean="0"/>
+              <a:rPr lang="ru-RU"/>
               <a:t>Третий уровень</a:t>
             </a:r>
           </a:p>
           <a:p>
             <a:pPr lvl="3"/>
             <a:r>
-              <a:rPr lang="ru-RU" smtClean="0"/>
+              <a:rPr lang="ru-RU"/>
               <a:t>Четвертый уровень</a:t>
             </a:r>
           </a:p>
           <a:p>
             <a:pPr lvl="4"/>
             <a:r>
-              <a:rPr lang="ru-RU" smtClean="0"/>
+              <a:rPr lang="ru-RU"/>
               <a:t>Пятый уровень</a:t>
             </a:r>
             <a:endParaRPr lang="en-US" dirty="0"/>
@@ -790,7 +790,7 @@
           <a:p>
             <a:fld id="{E587BD1D-74D3-449F-A3CA-F47BBACDADC1}" type="datetime1">
               <a:rPr lang="ru-RU" smtClean="0"/>
-              <a:t>24.07.2019</a:t>
+              <a:t>25.07.2019</a:t>
             </a:fld>
             <a:endParaRPr lang="ru-RU"/>
           </a:p>
@@ -889,7 +889,7 @@
           <a:lstStyle/>
           <a:p>
             <a:r>
-              <a:rPr lang="ru-RU" smtClean="0"/>
+              <a:rPr lang="ru-RU"/>
               <a:t>Образец заголовка</a:t>
             </a:r>
             <a:endParaRPr lang="en-US" dirty="0"/>
@@ -918,35 +918,35 @@
           <a:p>
             <a:pPr lvl="0"/>
             <a:r>
-              <a:rPr lang="ru-RU" smtClean="0"/>
+              <a:rPr lang="ru-RU"/>
               <a:t>Образец текста</a:t>
             </a:r>
           </a:p>
           <a:p>
             <a:pPr lvl="1"/>
             <a:r>
-              <a:rPr lang="ru-RU" smtClean="0"/>
+              <a:rPr lang="ru-RU"/>
               <a:t>Второй уровень</a:t>
             </a:r>
           </a:p>
           <a:p>
             <a:pPr lvl="2"/>
             <a:r>
-              <a:rPr lang="ru-RU" smtClean="0"/>
+              <a:rPr lang="ru-RU"/>
               <a:t>Третий уровень</a:t>
             </a:r>
           </a:p>
           <a:p>
             <a:pPr lvl="3"/>
             <a:r>
-              <a:rPr lang="ru-RU" smtClean="0"/>
+              <a:rPr lang="ru-RU"/>
               <a:t>Четвертый уровень</a:t>
             </a:r>
           </a:p>
           <a:p>
             <a:pPr lvl="4"/>
             <a:r>
-              <a:rPr lang="ru-RU" smtClean="0"/>
+              <a:rPr lang="ru-RU"/>
               <a:t>Пятый уровень</a:t>
             </a:r>
             <a:endParaRPr lang="en-US" dirty="0"/>
@@ -970,7 +970,7 @@
           <a:p>
             <a:fld id="{F156E365-3C59-403F-A598-8903968D44C1}" type="datetime1">
               <a:rPr lang="ru-RU" smtClean="0"/>
-              <a:t>24.07.2019</a:t>
+              <a:t>25.07.2019</a:t>
             </a:fld>
             <a:endParaRPr lang="ru-RU"/>
           </a:p>
@@ -1064,7 +1064,7 @@
           <a:lstStyle/>
           <a:p>
             <a:r>
-              <a:rPr lang="ru-RU" smtClean="0"/>
+              <a:rPr lang="ru-RU"/>
               <a:t>Образец заголовка</a:t>
             </a:r>
             <a:endParaRPr lang="en-US" dirty="0"/>
@@ -1088,35 +1088,35 @@
           <a:p>
             <a:pPr lvl="0"/>
             <a:r>
-              <a:rPr lang="ru-RU" smtClean="0"/>
+              <a:rPr lang="ru-RU"/>
               <a:t>Образец текста</a:t>
             </a:r>
           </a:p>
           <a:p>
             <a:pPr lvl="1"/>
             <a:r>
-              <a:rPr lang="ru-RU" smtClean="0"/>
+              <a:rPr lang="ru-RU"/>
               <a:t>Второй уровень</a:t>
             </a:r>
           </a:p>
           <a:p>
             <a:pPr lvl="2"/>
             <a:r>
-              <a:rPr lang="ru-RU" smtClean="0"/>
+              <a:rPr lang="ru-RU"/>
               <a:t>Третий уровень</a:t>
             </a:r>
           </a:p>
           <a:p>
             <a:pPr lvl="3"/>
             <a:r>
-              <a:rPr lang="ru-RU" smtClean="0"/>
+              <a:rPr lang="ru-RU"/>
               <a:t>Четвертый уровень</a:t>
             </a:r>
           </a:p>
           <a:p>
             <a:pPr lvl="4"/>
             <a:r>
-              <a:rPr lang="ru-RU" smtClean="0"/>
+              <a:rPr lang="ru-RU"/>
               <a:t>Пятый уровень</a:t>
             </a:r>
             <a:endParaRPr lang="en-US" dirty="0"/>
@@ -1140,7 +1140,7 @@
           <a:p>
             <a:fld id="{D71D973D-7295-497C-A5AE-B81A0C1EA542}" type="datetime1">
               <a:rPr lang="ru-RU" smtClean="0"/>
-              <a:t>24.07.2019</a:t>
+              <a:t>25.07.2019</a:t>
             </a:fld>
             <a:endParaRPr lang="ru-RU"/>
           </a:p>
@@ -1243,7 +1243,7 @@
           </a:lstStyle>
           <a:p>
             <a:r>
-              <a:rPr lang="ru-RU" smtClean="0"/>
+              <a:rPr lang="ru-RU"/>
               <a:t>Образец заголовка</a:t>
             </a:r>
             <a:endParaRPr lang="en-US" dirty="0"/>
@@ -1361,7 +1361,7 @@
           <a:p>
             <a:pPr lvl="0"/>
             <a:r>
-              <a:rPr lang="ru-RU" smtClean="0"/>
+              <a:rPr lang="ru-RU"/>
               <a:t>Образец текста</a:t>
             </a:r>
           </a:p>
@@ -1384,7 +1384,7 @@
           <a:p>
             <a:fld id="{D43ACA65-1DF0-4542-9513-2573006F2B09}" type="datetime1">
               <a:rPr lang="ru-RU" smtClean="0"/>
-              <a:t>24.07.2019</a:t>
+              <a:t>25.07.2019</a:t>
             </a:fld>
             <a:endParaRPr lang="ru-RU"/>
           </a:p>
@@ -1478,7 +1478,7 @@
           <a:lstStyle/>
           <a:p>
             <a:r>
-              <a:rPr lang="ru-RU" smtClean="0"/>
+              <a:rPr lang="ru-RU"/>
               <a:t>Образец заголовка</a:t>
             </a:r>
             <a:endParaRPr lang="en-US" dirty="0"/>
@@ -1507,35 +1507,35 @@
           <a:p>
             <a:pPr lvl="0"/>
             <a:r>
-              <a:rPr lang="ru-RU" smtClean="0"/>
+              <a:rPr lang="ru-RU"/>
               <a:t>Образец текста</a:t>
             </a:r>
           </a:p>
           <a:p>
             <a:pPr lvl="1"/>
             <a:r>
-              <a:rPr lang="ru-RU" smtClean="0"/>
+              <a:rPr lang="ru-RU"/>
               <a:t>Второй уровень</a:t>
             </a:r>
           </a:p>
           <a:p>
             <a:pPr lvl="2"/>
             <a:r>
-              <a:rPr lang="ru-RU" smtClean="0"/>
+              <a:rPr lang="ru-RU"/>
               <a:t>Третий уровень</a:t>
             </a:r>
           </a:p>
           <a:p>
             <a:pPr lvl="3"/>
             <a:r>
-              <a:rPr lang="ru-RU" smtClean="0"/>
+              <a:rPr lang="ru-RU"/>
               <a:t>Четвертый уровень</a:t>
             </a:r>
           </a:p>
           <a:p>
             <a:pPr lvl="4"/>
             <a:r>
-              <a:rPr lang="ru-RU" smtClean="0"/>
+              <a:rPr lang="ru-RU"/>
               <a:t>Пятый уровень</a:t>
             </a:r>
             <a:endParaRPr lang="en-US" dirty="0"/>
@@ -1564,35 +1564,35 @@
           <a:p>
             <a:pPr lvl="0"/>
             <a:r>
-              <a:rPr lang="ru-RU" smtClean="0"/>
+              <a:rPr lang="ru-RU"/>
               <a:t>Образец текста</a:t>
             </a:r>
           </a:p>
           <a:p>
             <a:pPr lvl="1"/>
             <a:r>
-              <a:rPr lang="ru-RU" smtClean="0"/>
+              <a:rPr lang="ru-RU"/>
               <a:t>Второй уровень</a:t>
             </a:r>
           </a:p>
           <a:p>
             <a:pPr lvl="2"/>
             <a:r>
-              <a:rPr lang="ru-RU" smtClean="0"/>
+              <a:rPr lang="ru-RU"/>
               <a:t>Третий уровень</a:t>
             </a:r>
           </a:p>
           <a:p>
             <a:pPr lvl="3"/>
             <a:r>
-              <a:rPr lang="ru-RU" smtClean="0"/>
+              <a:rPr lang="ru-RU"/>
               <a:t>Четвертый уровень</a:t>
             </a:r>
           </a:p>
           <a:p>
             <a:pPr lvl="4"/>
             <a:r>
-              <a:rPr lang="ru-RU" smtClean="0"/>
+              <a:rPr lang="ru-RU"/>
               <a:t>Пятый уровень</a:t>
             </a:r>
             <a:endParaRPr lang="en-US" dirty="0"/>
@@ -1616,7 +1616,7 @@
           <a:p>
             <a:fld id="{CE5D4F0D-BE92-42E2-AC19-D4AE919B8EEA}" type="datetime1">
               <a:rPr lang="ru-RU" smtClean="0"/>
-              <a:t>24.07.2019</a:t>
+              <a:t>25.07.2019</a:t>
             </a:fld>
             <a:endParaRPr lang="ru-RU"/>
           </a:p>
@@ -1715,7 +1715,7 @@
           <a:lstStyle/>
           <a:p>
             <a:r>
-              <a:rPr lang="ru-RU" smtClean="0"/>
+              <a:rPr lang="ru-RU"/>
               <a:t>Образец заголовка</a:t>
             </a:r>
             <a:endParaRPr lang="en-US" dirty="0"/>
@@ -1781,7 +1781,7 @@
           <a:p>
             <a:pPr lvl="0"/>
             <a:r>
-              <a:rPr lang="ru-RU" smtClean="0"/>
+              <a:rPr lang="ru-RU"/>
               <a:t>Образец текста</a:t>
             </a:r>
           </a:p>
@@ -1809,35 +1809,35 @@
           <a:p>
             <a:pPr lvl="0"/>
             <a:r>
-              <a:rPr lang="ru-RU" smtClean="0"/>
+              <a:rPr lang="ru-RU"/>
               <a:t>Образец текста</a:t>
             </a:r>
           </a:p>
           <a:p>
             <a:pPr lvl="1"/>
             <a:r>
-              <a:rPr lang="ru-RU" smtClean="0"/>
+              <a:rPr lang="ru-RU"/>
               <a:t>Второй уровень</a:t>
             </a:r>
           </a:p>
           <a:p>
             <a:pPr lvl="2"/>
             <a:r>
-              <a:rPr lang="ru-RU" smtClean="0"/>
+              <a:rPr lang="ru-RU"/>
               <a:t>Третий уровень</a:t>
             </a:r>
           </a:p>
           <a:p>
             <a:pPr lvl="3"/>
             <a:r>
-              <a:rPr lang="ru-RU" smtClean="0"/>
+              <a:rPr lang="ru-RU"/>
               <a:t>Четвертый уровень</a:t>
             </a:r>
           </a:p>
           <a:p>
             <a:pPr lvl="4"/>
             <a:r>
-              <a:rPr lang="ru-RU" smtClean="0"/>
+              <a:rPr lang="ru-RU"/>
               <a:t>Пятый уровень</a:t>
             </a:r>
             <a:endParaRPr lang="en-US" dirty="0"/>
@@ -1903,7 +1903,7 @@
           <a:p>
             <a:pPr lvl="0"/>
             <a:r>
-              <a:rPr lang="ru-RU" smtClean="0"/>
+              <a:rPr lang="ru-RU"/>
               <a:t>Образец текста</a:t>
             </a:r>
           </a:p>
@@ -1931,35 +1931,35 @@
           <a:p>
             <a:pPr lvl="0"/>
             <a:r>
-              <a:rPr lang="ru-RU" smtClean="0"/>
+              <a:rPr lang="ru-RU"/>
               <a:t>Образец текста</a:t>
             </a:r>
           </a:p>
           <a:p>
             <a:pPr lvl="1"/>
             <a:r>
-              <a:rPr lang="ru-RU" smtClean="0"/>
+              <a:rPr lang="ru-RU"/>
               <a:t>Второй уровень</a:t>
             </a:r>
           </a:p>
           <a:p>
             <a:pPr lvl="2"/>
             <a:r>
-              <a:rPr lang="ru-RU" smtClean="0"/>
+              <a:rPr lang="ru-RU"/>
               <a:t>Третий уровень</a:t>
             </a:r>
           </a:p>
           <a:p>
             <a:pPr lvl="3"/>
             <a:r>
-              <a:rPr lang="ru-RU" smtClean="0"/>
+              <a:rPr lang="ru-RU"/>
               <a:t>Четвертый уровень</a:t>
             </a:r>
           </a:p>
           <a:p>
             <a:pPr lvl="4"/>
             <a:r>
-              <a:rPr lang="ru-RU" smtClean="0"/>
+              <a:rPr lang="ru-RU"/>
               <a:t>Пятый уровень</a:t>
             </a:r>
             <a:endParaRPr lang="en-US" dirty="0"/>
@@ -1983,7 +1983,7 @@
           <a:p>
             <a:fld id="{31712A4F-404C-4E2A-B048-29FEE1F56BCC}" type="datetime1">
               <a:rPr lang="ru-RU" smtClean="0"/>
-              <a:t>24.07.2019</a:t>
+              <a:t>25.07.2019</a:t>
             </a:fld>
             <a:endParaRPr lang="ru-RU"/>
           </a:p>
@@ -2077,7 +2077,7 @@
           <a:lstStyle/>
           <a:p>
             <a:r>
-              <a:rPr lang="ru-RU" smtClean="0"/>
+              <a:rPr lang="ru-RU"/>
               <a:t>Образец заголовка</a:t>
             </a:r>
             <a:endParaRPr lang="en-US" dirty="0"/>
@@ -2101,7 +2101,7 @@
           <a:p>
             <a:fld id="{A591E32F-21C9-4A73-9D8C-CB8422C8AD99}" type="datetime1">
               <a:rPr lang="ru-RU" smtClean="0"/>
-              <a:t>24.07.2019</a:t>
+              <a:t>25.07.2019</a:t>
             </a:fld>
             <a:endParaRPr lang="ru-RU"/>
           </a:p>
@@ -2196,7 +2196,7 @@
           <a:p>
             <a:fld id="{E8BE7035-4758-4463-AF71-B436150BF40F}" type="datetime1">
               <a:rPr lang="ru-RU" smtClean="0"/>
-              <a:t>24.07.2019</a:t>
+              <a:t>25.07.2019</a:t>
             </a:fld>
             <a:endParaRPr lang="ru-RU"/>
           </a:p>
@@ -2299,7 +2299,7 @@
           </a:lstStyle>
           <a:p>
             <a:r>
-              <a:rPr lang="ru-RU" smtClean="0"/>
+              <a:rPr lang="ru-RU"/>
               <a:t>Образец заголовка</a:t>
             </a:r>
             <a:endParaRPr lang="en-US" dirty="0"/>
@@ -2356,35 +2356,35 @@
           <a:p>
             <a:pPr lvl="0"/>
             <a:r>
-              <a:rPr lang="ru-RU" smtClean="0"/>
+              <a:rPr lang="ru-RU"/>
               <a:t>Образец текста</a:t>
             </a:r>
           </a:p>
           <a:p>
             <a:pPr lvl="1"/>
             <a:r>
-              <a:rPr lang="ru-RU" smtClean="0"/>
+              <a:rPr lang="ru-RU"/>
               <a:t>Второй уровень</a:t>
             </a:r>
           </a:p>
           <a:p>
             <a:pPr lvl="2"/>
             <a:r>
-              <a:rPr lang="ru-RU" smtClean="0"/>
+              <a:rPr lang="ru-RU"/>
               <a:t>Третий уровень</a:t>
             </a:r>
           </a:p>
           <a:p>
             <a:pPr lvl="3"/>
             <a:r>
-              <a:rPr lang="ru-RU" smtClean="0"/>
+              <a:rPr lang="ru-RU"/>
               <a:t>Четвертый уровень</a:t>
             </a:r>
           </a:p>
           <a:p>
             <a:pPr lvl="4"/>
             <a:r>
-              <a:rPr lang="ru-RU" smtClean="0"/>
+              <a:rPr lang="ru-RU"/>
               <a:t>Пятый уровень</a:t>
             </a:r>
             <a:endParaRPr lang="en-US" dirty="0"/>
@@ -2450,7 +2450,7 @@
           <a:p>
             <a:pPr lvl="0"/>
             <a:r>
-              <a:rPr lang="ru-RU" smtClean="0"/>
+              <a:rPr lang="ru-RU"/>
               <a:t>Образец текста</a:t>
             </a:r>
           </a:p>
@@ -2473,7 +2473,7 @@
           <a:p>
             <a:fld id="{8BF22BB4-229E-48DC-A891-0BD3792CC568}" type="datetime1">
               <a:rPr lang="ru-RU" smtClean="0"/>
-              <a:t>24.07.2019</a:t>
+              <a:t>25.07.2019</a:t>
             </a:fld>
             <a:endParaRPr lang="ru-RU"/>
           </a:p>
@@ -2576,7 +2576,7 @@
           </a:lstStyle>
           <a:p>
             <a:r>
-              <a:rPr lang="ru-RU" smtClean="0"/>
+              <a:rPr lang="ru-RU"/>
               <a:t>Образец заголовка</a:t>
             </a:r>
             <a:endParaRPr lang="en-US" dirty="0"/>
@@ -2641,7 +2641,7 @@
           </a:lstStyle>
           <a:p>
             <a:r>
-              <a:rPr lang="ru-RU" smtClean="0"/>
+              <a:rPr lang="ru-RU"/>
               <a:t>Вставка рисунка</a:t>
             </a:r>
             <a:endParaRPr lang="en-US" dirty="0"/>
@@ -2707,7 +2707,7 @@
           <a:p>
             <a:pPr lvl="0"/>
             <a:r>
-              <a:rPr lang="ru-RU" smtClean="0"/>
+              <a:rPr lang="ru-RU"/>
               <a:t>Образец текста</a:t>
             </a:r>
           </a:p>
@@ -2730,7 +2730,7 @@
           <a:p>
             <a:fld id="{B32F65DE-1A63-4DFF-816D-2C4DB2F0AABF}" type="datetime1">
               <a:rPr lang="ru-RU" smtClean="0"/>
-              <a:t>24.07.2019</a:t>
+              <a:t>25.07.2019</a:t>
             </a:fld>
             <a:endParaRPr lang="ru-RU"/>
           </a:p>
@@ -2839,7 +2839,7 @@
           <a:lstStyle/>
           <a:p>
             <a:r>
-              <a:rPr lang="ru-RU" smtClean="0"/>
+              <a:rPr lang="ru-RU"/>
               <a:t>Образец заголовка</a:t>
             </a:r>
             <a:endParaRPr lang="en-US" dirty="0"/>
@@ -2873,35 +2873,35 @@
           <a:p>
             <a:pPr lvl="0"/>
             <a:r>
-              <a:rPr lang="ru-RU" smtClean="0"/>
+              <a:rPr lang="ru-RU"/>
               <a:t>Образец текста</a:t>
             </a:r>
           </a:p>
           <a:p>
             <a:pPr lvl="1"/>
             <a:r>
-              <a:rPr lang="ru-RU" smtClean="0"/>
+              <a:rPr lang="ru-RU"/>
               <a:t>Второй уровень</a:t>
             </a:r>
           </a:p>
           <a:p>
             <a:pPr lvl="2"/>
             <a:r>
-              <a:rPr lang="ru-RU" smtClean="0"/>
+              <a:rPr lang="ru-RU"/>
               <a:t>Третий уровень</a:t>
             </a:r>
           </a:p>
           <a:p>
             <a:pPr lvl="3"/>
             <a:r>
-              <a:rPr lang="ru-RU" smtClean="0"/>
+              <a:rPr lang="ru-RU"/>
               <a:t>Четвертый уровень</a:t>
             </a:r>
           </a:p>
           <a:p>
             <a:pPr lvl="4"/>
             <a:r>
-              <a:rPr lang="ru-RU" smtClean="0"/>
+              <a:rPr lang="ru-RU"/>
               <a:t>Пятый уровень</a:t>
             </a:r>
             <a:endParaRPr lang="en-US" dirty="0"/>
@@ -2943,7 +2943,7 @@
           <a:p>
             <a:fld id="{58F37F58-E97F-4EAB-9CA9-C9A7312871A5}" type="datetime1">
               <a:rPr lang="ru-RU" smtClean="0"/>
-              <a:t>24.07.2019</a:t>
+              <a:t>25.07.2019</a:t>
             </a:fld>
             <a:endParaRPr lang="ru-RU"/>
           </a:p>
@@ -3373,7 +3373,7 @@
           <a:p>
             <a:pPr algn="ctr"/>
             <a:r>
-              <a:rPr lang="en-US" b="1" dirty="0" smtClean="0">
+              <a:rPr lang="en-US" b="1" dirty="0">
                 <a:solidFill>
                   <a:srgbClr val="00B0F0"/>
                 </a:solidFill>
@@ -3430,28 +3430,28 @@
           </a:lstStyle>
           <a:p>
             <a:pPr algn="ctr"/>
-            <a:endParaRPr lang="en-US" sz="1800" b="1" dirty="0" smtClean="0"/>
+            <a:endParaRPr lang="en-US" sz="1800" b="1" dirty="0"/>
           </a:p>
           <a:p>
             <a:pPr algn="ctr"/>
             <a:r>
-              <a:rPr lang="en-US" sz="1800" b="1" dirty="0" smtClean="0"/>
+              <a:rPr lang="en-US" sz="1800" b="1" dirty="0"/>
               <a:t>Developed by </a:t>
             </a:r>
             <a:r>
-              <a:rPr lang="en-US" sz="1800" b="1" dirty="0" err="1" smtClean="0"/>
+              <a:rPr lang="en-US" sz="1800" b="1" dirty="0" err="1"/>
               <a:t>Demyd</a:t>
             </a:r>
             <a:r>
-              <a:rPr lang="en-US" sz="1800" b="1" dirty="0" smtClean="0"/>
+              <a:rPr lang="en-US" sz="1800" b="1" dirty="0"/>
               <a:t> </a:t>
             </a:r>
             <a:r>
-              <a:rPr lang="en-US" sz="1800" b="1" dirty="0" err="1" smtClean="0"/>
+              <a:rPr lang="en-US" sz="1800" b="1" dirty="0" err="1"/>
               <a:t>Dzyuban</a:t>
             </a:r>
             <a:r>
-              <a:rPr lang="en-US" sz="1800" b="1" dirty="0" smtClean="0"/>
+              <a:rPr lang="en-US" sz="1800" b="1" dirty="0"/>
               <a:t> @July 2019 (draft)</a:t>
             </a:r>
             <a:endParaRPr lang="ru-RU" sz="1800" b="1" dirty="0"/>
@@ -3468,13 +3468,6 @@
   <p:clrMapOvr>
     <a:masterClrMapping/>
   </p:clrMapOvr>
-  <p:timing>
-    <p:tnLst>
-      <p:par>
-        <p:cTn id="1" dur="indefinite" restart="never" nodeType="tmRoot"/>
-      </p:par>
-    </p:tnLst>
-  </p:timing>
 </p:sld>
 </file>
 
@@ -3542,7 +3535,7 @@
           <a:p>
             <a:pPr algn="ctr"/>
             <a:r>
-              <a:rPr lang="en-US" sz="2400" b="1" dirty="0" smtClean="0">
+              <a:rPr lang="en-US" sz="2400" b="1" dirty="0">
                 <a:solidFill>
                   <a:srgbClr val="00B0F0"/>
                 </a:solidFill>
@@ -3739,7 +3732,7 @@
           <a:p>
             <a:pPr algn="ctr"/>
             <a:r>
-              <a:rPr lang="en-US" sz="2400" b="1" dirty="0" smtClean="0">
+              <a:rPr lang="en-US" sz="2400" b="1" dirty="0">
                 <a:solidFill>
                   <a:srgbClr val="00B0F0"/>
                 </a:solidFill>
@@ -3777,7 +3770,7 @@
           <a:p>
             <a:pPr algn="just"/>
             <a:r>
-              <a:rPr lang="en-US" sz="1600" dirty="0" smtClean="0">
+              <a:rPr lang="en-US" sz="1600" dirty="0">
                 <a:solidFill>
                   <a:srgbClr val="373D3F"/>
                 </a:solidFill>
@@ -3786,7 +3779,7 @@
               <a:t>The </a:t>
             </a:r>
             <a:r>
-              <a:rPr lang="en-US" sz="1600" i="1" u="sng" dirty="0" smtClean="0">
+              <a:rPr lang="en-US" sz="1600" i="1" u="sng" dirty="0">
                 <a:solidFill>
                   <a:srgbClr val="373D3F"/>
                 </a:solidFill>
@@ -3795,7 +3788,7 @@
               <a:t>standard normal distribution</a:t>
             </a:r>
             <a:r>
-              <a:rPr lang="en-US" sz="1600" dirty="0" smtClean="0">
+              <a:rPr lang="en-US" sz="1600" dirty="0">
                 <a:solidFill>
                   <a:srgbClr val="373D3F"/>
                 </a:solidFill>
@@ -3804,7 +3797,7 @@
               <a:t> is a normal distribution of standardized values called </a:t>
             </a:r>
             <a:r>
-              <a:rPr lang="en-US" sz="1600" b="1" i="1" dirty="0" smtClean="0">
+              <a:rPr lang="en-US" sz="1600" b="1" i="1" dirty="0">
                 <a:solidFill>
                   <a:srgbClr val="373D3F"/>
                 </a:solidFill>
@@ -3813,7 +3806,7 @@
               <a:t>z</a:t>
             </a:r>
             <a:r>
-              <a:rPr lang="en-US" sz="1600" b="1" dirty="0" smtClean="0">
+              <a:rPr lang="en-US" sz="1600" b="1" dirty="0">
                 <a:solidFill>
                   <a:srgbClr val="373D3F"/>
                 </a:solidFill>
@@ -3822,7 +3815,7 @@
               <a:t>-scores</a:t>
             </a:r>
             <a:r>
-              <a:rPr lang="en-US" sz="1600" dirty="0" smtClean="0">
+              <a:rPr lang="en-US" sz="1600" dirty="0">
                 <a:solidFill>
                   <a:srgbClr val="373D3F"/>
                 </a:solidFill>
@@ -3834,7 +3827,7 @@
           <a:p>
             <a:pPr algn="just"/>
             <a:r>
-              <a:rPr lang="en-US" sz="1600" dirty="0" smtClean="0">
+              <a:rPr lang="en-US" sz="1600" dirty="0">
                 <a:solidFill>
                   <a:srgbClr val="373D3F"/>
                 </a:solidFill>
@@ -3843,7 +3836,7 @@
               <a:t>A </a:t>
             </a:r>
             <a:r>
-              <a:rPr lang="en-US" sz="1600" i="1" dirty="0" smtClean="0">
+              <a:rPr lang="en-US" sz="1600" i="1" dirty="0">
                 <a:solidFill>
                   <a:srgbClr val="373D3F"/>
                 </a:solidFill>
@@ -3852,7 +3845,7 @@
               <a:t>z</a:t>
             </a:r>
             <a:r>
-              <a:rPr lang="en-US" sz="1600" dirty="0" smtClean="0">
+              <a:rPr lang="en-US" sz="1600" dirty="0">
                 <a:solidFill>
                   <a:srgbClr val="373D3F"/>
                 </a:solidFill>
@@ -3889,13 +3882,7 @@
               <a:rPr lang="en-US" sz="1100" dirty="0">
                 <a:hlinkClick r:id="rId2"/>
               </a:rPr>
-              <a:t>https://courses.lumenlearning.com/introstats1/chapter/the-standard-normal-distribution</a:t>
-            </a:r>
-            <a:r>
-              <a:rPr lang="en-US" sz="1100" dirty="0" smtClean="0">
-                <a:hlinkClick r:id="rId2"/>
-              </a:rPr>
-              <a:t>/</a:t>
+              <a:t>https://courses.lumenlearning.com/introstats1/chapter/the-standard-normal-distribution/</a:t>
             </a:r>
             <a:endParaRPr lang="ru-RU" sz="1100" dirty="0"/>
           </a:p>
@@ -3957,22 +3944,13 @@
               <a:t>The </a:t>
             </a:r>
             <a:r>
-              <a:rPr lang="en-US" sz="1600" i="1" dirty="0" smtClean="0">
+              <a:rPr lang="en-US" sz="1600" i="1" dirty="0">
                 <a:solidFill>
                   <a:srgbClr val="373D3F"/>
                 </a:solidFill>
                 <a:latin typeface="proxima-nova"/>
               </a:rPr>
               <a:t>z</a:t>
-            </a:r>
-            <a:r>
-              <a:rPr lang="en-US" sz="1600" dirty="0" smtClean="0">
-                <a:solidFill>
-                  <a:srgbClr val="373D3F"/>
-                </a:solidFill>
-                <a:latin typeface="proxima-nova"/>
-              </a:rPr>
-              <a:t>-score </a:t>
             </a:r>
             <a:r>
               <a:rPr lang="en-US" sz="1600" dirty="0">
@@ -3981,34 +3959,16 @@
                 </a:solidFill>
                 <a:latin typeface="proxima-nova"/>
               </a:rPr>
-              <a:t>tells you how many standard </a:t>
-            </a:r>
-            <a:r>
-              <a:rPr lang="en-US" sz="1600" dirty="0" smtClean="0">
-                <a:solidFill>
-                  <a:srgbClr val="373D3F"/>
-                </a:solidFill>
-                <a:latin typeface="proxima-nova"/>
-              </a:rPr>
-              <a:t>deviations (</a:t>
-            </a:r>
-            <a:r>
-              <a:rPr lang="el-GR" sz="1600" dirty="0" smtClean="0">
+              <a:t>-score tells you how many standard deviations (</a:t>
+            </a:r>
+            <a:r>
+              <a:rPr lang="el-GR" sz="1600" dirty="0">
                 <a:solidFill>
                   <a:srgbClr val="FF0000"/>
                 </a:solidFill>
                 <a:latin typeface="proxima-nova"/>
               </a:rPr>
               <a:t>σ</a:t>
-            </a:r>
-            <a:r>
-              <a:rPr lang="en-US" sz="1600" dirty="0" smtClean="0">
-                <a:solidFill>
-                  <a:srgbClr val="373D3F"/>
-                </a:solidFill>
-                <a:latin typeface="proxima-nova"/>
-              </a:rPr>
-              <a:t>) </a:t>
             </a:r>
             <a:r>
               <a:rPr lang="en-US" sz="1600" dirty="0">
@@ -4017,7 +3977,7 @@
                 </a:solidFill>
                 <a:latin typeface="proxima-nova"/>
               </a:rPr>
-              <a:t>the value </a:t>
+              <a:t>) the value </a:t>
             </a:r>
             <a:r>
               <a:rPr lang="en-US" sz="1600" i="1" dirty="0">
@@ -4081,16 +4041,10 @@
           <a:lstStyle/>
           <a:p>
             <a:r>
-              <a:rPr lang="en-US" sz="1200" dirty="0" smtClean="0">
-                <a:hlinkClick r:id="rId4"/>
-              </a:rPr>
-              <a:t>https</a:t>
-            </a:r>
-            <a:r>
               <a:rPr lang="en-US" sz="1200" dirty="0">
                 <a:hlinkClick r:id="rId4"/>
               </a:rPr>
-              <a:t>://www.mathsisfun.com/data/standard-normal-distribution-table.html</a:t>
+              <a:t>https://www.mathsisfun.com/data/standard-normal-distribution-table.html</a:t>
             </a:r>
             <a:endParaRPr lang="ru-RU" sz="1200" dirty="0"/>
           </a:p>
@@ -4118,7 +4072,7 @@
           <a:lstStyle/>
           <a:p>
             <a:r>
-              <a:rPr lang="en-US" sz="1400" b="1" dirty="0" smtClean="0">
+              <a:rPr lang="en-US" sz="1400" b="1" dirty="0">
                 <a:solidFill>
                   <a:srgbClr val="373D3F"/>
                 </a:solidFill>
@@ -4272,7 +4226,7 @@
           <a:p>
             <a:pPr algn="ctr"/>
             <a:r>
-              <a:rPr lang="en-US" sz="2400" b="1" dirty="0" smtClean="0">
+              <a:rPr lang="en-US" sz="2400" b="1" dirty="0">
                 <a:solidFill>
                   <a:srgbClr val="00B0F0"/>
                 </a:solidFill>
@@ -4334,7 +4288,7 @@
           <a:lstStyle/>
           <a:p>
             <a:r>
-              <a:rPr lang="en-US" sz="1400" b="1" dirty="0" smtClean="0"/>
+              <a:rPr lang="en-US" sz="1400" b="1" dirty="0"/>
               <a:t>Probability Density Function</a:t>
             </a:r>
             <a:endParaRPr lang="ru-RU" sz="1400" b="1" dirty="0"/>
@@ -4388,27 +4342,21 @@
           <a:lstStyle/>
           <a:p>
             <a:r>
-              <a:rPr lang="en-US" sz="1200" dirty="0" smtClean="0"/>
+              <a:rPr lang="en-US" sz="1200" dirty="0"/>
               <a:t>- Gamma function </a:t>
-            </a:r>
-            <a:r>
-              <a:rPr lang="en-US" sz="1200" dirty="0" smtClean="0">
-                <a:hlinkClick r:id="rId4"/>
-              </a:rPr>
-              <a:t>https</a:t>
             </a:r>
             <a:r>
               <a:rPr lang="en-US" sz="1200" dirty="0">
                 <a:hlinkClick r:id="rId4"/>
               </a:rPr>
-              <a:t>://en.wikipedia.org/wiki/Gamma_function</a:t>
-            </a:r>
-            <a:r>
-              <a:rPr lang="en-US" sz="1200" dirty="0" smtClean="0"/>
+              <a:t>https://en.wikipedia.org/wiki/Gamma_function</a:t>
+            </a:r>
+            <a:r>
+              <a:rPr lang="en-US" sz="1200" dirty="0"/>
               <a:t>), </a:t>
             </a:r>
             <a:r>
-              <a:rPr lang="en-US" sz="1200" dirty="0" smtClean="0">
+              <a:rPr lang="en-US" sz="1200" dirty="0">
                 <a:solidFill>
                   <a:srgbClr val="FF0000"/>
                 </a:solidFill>
@@ -4416,7 +4364,7 @@
               <a:t>k</a:t>
             </a:r>
             <a:r>
-              <a:rPr lang="en-US" sz="1200" dirty="0" smtClean="0"/>
+              <a:rPr lang="en-US" sz="1200" dirty="0"/>
               <a:t> – degree of freedom, x – standard random normal variable.</a:t>
             </a:r>
             <a:endParaRPr lang="ru-RU" sz="1200" dirty="0"/>
@@ -4502,12 +4450,12 @@
           <a:lstStyle/>
           <a:p>
             <a:r>
-              <a:rPr lang="en-US" b="1" dirty="0" smtClean="0"/>
+              <a:rPr lang="en-US" b="1" dirty="0"/>
               <a:t>Application of Chi distribution:</a:t>
             </a:r>
           </a:p>
           <a:p>
-            <a:endParaRPr lang="en-US" b="1" dirty="0" smtClean="0"/>
+            <a:endParaRPr lang="en-US" b="1" dirty="0"/>
           </a:p>
           <a:p>
             <a:pPr marL="285750" indent="-285750">
@@ -4516,27 +4464,7 @@
             </a:pPr>
             <a:r>
               <a:rPr lang="en-US" sz="1400" dirty="0"/>
-              <a:t>t</a:t>
-            </a:r>
-            <a:r>
-              <a:rPr lang="en-US" sz="1400" dirty="0" smtClean="0"/>
-              <a:t>esting </a:t>
-            </a:r>
-            <a:r>
-              <a:rPr lang="en-US" sz="1400" dirty="0"/>
-              <a:t>for a </a:t>
-            </a:r>
-            <a:r>
-              <a:rPr lang="en-US" sz="1400" dirty="0" smtClean="0"/>
-              <a:t>population </a:t>
-            </a:r>
-            <a:r>
-              <a:rPr lang="en-US" sz="1400" dirty="0"/>
-              <a:t>v</a:t>
-            </a:r>
-            <a:r>
-              <a:rPr lang="en-US" sz="1400" dirty="0" smtClean="0"/>
-              <a:t>ariance</a:t>
+              <a:t>testing for a population variance</a:t>
             </a:r>
           </a:p>
           <a:p>
@@ -4544,7 +4472,7 @@
               <a:buFont typeface="Arial" panose="020B0604020202020204" pitchFamily="34" charset="0"/>
               <a:buChar char="•"/>
             </a:pPr>
-            <a:endParaRPr lang="en-US" sz="1400" dirty="0" smtClean="0"/>
+            <a:endParaRPr lang="en-US" sz="1400" dirty="0"/>
           </a:p>
           <a:p>
             <a:pPr marL="285750" indent="-285750">
@@ -4553,19 +4481,7 @@
             </a:pPr>
             <a:r>
               <a:rPr lang="en-US" sz="1400" dirty="0"/>
-              <a:t>t</a:t>
-            </a:r>
-            <a:r>
-              <a:rPr lang="en-US" sz="1400" dirty="0" smtClean="0"/>
-              <a:t>est </a:t>
-            </a:r>
-            <a:r>
-              <a:rPr lang="en-US" sz="1400" dirty="0"/>
-              <a:t>for statistical </a:t>
-            </a:r>
-            <a:r>
-              <a:rPr lang="en-US" sz="1400" dirty="0" smtClean="0"/>
-              <a:t>independence</a:t>
+              <a:t>test for statistical independence</a:t>
             </a:r>
           </a:p>
           <a:p>
@@ -4573,7 +4489,7 @@
               <a:buFont typeface="Arial" panose="020B0604020202020204" pitchFamily="34" charset="0"/>
               <a:buChar char="•"/>
             </a:pPr>
-            <a:endParaRPr lang="en-US" sz="1400" dirty="0" smtClean="0"/>
+            <a:endParaRPr lang="en-US" sz="1400" dirty="0"/>
           </a:p>
           <a:p>
             <a:pPr marL="285750" indent="-285750">
@@ -4582,31 +4498,7 @@
             </a:pPr>
             <a:r>
               <a:rPr lang="en-US" sz="1400" dirty="0"/>
-              <a:t>t</a:t>
-            </a:r>
-            <a:r>
-              <a:rPr lang="en-US" sz="1400" dirty="0" smtClean="0"/>
-              <a:t>est </a:t>
-            </a:r>
-            <a:r>
-              <a:rPr lang="en-US" sz="1400" dirty="0"/>
-              <a:t>for </a:t>
-            </a:r>
-            <a:r>
-              <a:rPr lang="en-US" sz="1400" dirty="0" smtClean="0"/>
-              <a:t>goodness </a:t>
-            </a:r>
-            <a:r>
-              <a:rPr lang="en-US" sz="1400" dirty="0"/>
-              <a:t>of </a:t>
-            </a:r>
-            <a:r>
-              <a:rPr lang="en-US" sz="1400" dirty="0"/>
-              <a:t>f</a:t>
-            </a:r>
-            <a:r>
-              <a:rPr lang="en-US" sz="1400" dirty="0" smtClean="0"/>
-              <a:t>it</a:t>
+              <a:t>test for goodness of fit</a:t>
             </a:r>
           </a:p>
           <a:p>
@@ -4614,7 +4506,7 @@
               <a:buFont typeface="Arial" panose="020B0604020202020204" pitchFamily="34" charset="0"/>
               <a:buChar char="•"/>
             </a:pPr>
-            <a:endParaRPr lang="en-US" sz="1400" dirty="0" smtClean="0"/>
+            <a:endParaRPr lang="en-US" sz="1400" dirty="0"/>
           </a:p>
           <a:p>
             <a:pPr marL="285750" indent="-285750">
@@ -4623,21 +4515,8 @@
             </a:pPr>
             <a:r>
               <a:rPr lang="en-US" sz="1400" dirty="0"/>
-              <a:t>t</a:t>
-            </a:r>
-            <a:r>
-              <a:rPr lang="en-US" sz="1400" dirty="0" smtClean="0"/>
-              <a:t>est </a:t>
-            </a:r>
-            <a:r>
-              <a:rPr lang="en-US" sz="1400" dirty="0"/>
-              <a:t>for </a:t>
-            </a:r>
-            <a:r>
-              <a:rPr lang="en-US" sz="1400" dirty="0" smtClean="0"/>
-              <a:t>homogeneity</a:t>
-            </a:r>
-            <a:endParaRPr lang="en-US" sz="1400" dirty="0"/>
+              <a:t>test for homogeneity</a:t>
+            </a:r>
           </a:p>
           <a:p>
             <a:pPr marL="285750" indent="-285750">
@@ -4699,25 +4578,6 @@
       </p:grpSpPr>
       <p:sp>
         <p:nvSpPr>
-          <p:cNvPr id="2" name="Заголовок 1"/>
-          <p:cNvSpPr>
-            <a:spLocks noGrp="1"/>
-          </p:cNvSpPr>
-          <p:nvPr>
-            <p:ph type="title"/>
-          </p:nvPr>
-        </p:nvSpPr>
-        <p:spPr/>
-        <p:txBody>
-          <a:bodyPr/>
-          <a:lstStyle/>
-          <a:p>
-            <a:endParaRPr lang="ru-RU" dirty="0"/>
-          </a:p>
-        </p:txBody>
-      </p:sp>
-      <p:sp>
-        <p:nvSpPr>
           <p:cNvPr id="4" name="Номер слайда 3"/>
           <p:cNvSpPr>
             <a:spLocks noGrp="1"/>
@@ -4739,10 +4599,555 @@
           </a:p>
         </p:txBody>
       </p:sp>
+      <p:pic>
+        <p:nvPicPr>
+          <p:cNvPr id="3" name="Picture 2">
+            <a:extLst>
+              <a:ext uri="{FF2B5EF4-FFF2-40B4-BE49-F238E27FC236}">
+                <a16:creationId xmlns:a16="http://schemas.microsoft.com/office/drawing/2014/main" id="{4E8F5B17-F662-4630-ADB5-7EC597AEB76B}"/>
+              </a:ext>
+            </a:extLst>
+          </p:cNvPr>
+          <p:cNvPicPr>
+            <a:picLocks noChangeAspect="1"/>
+          </p:cNvPicPr>
+          <p:nvPr/>
+        </p:nvPicPr>
+        <p:blipFill>
+          <a:blip r:embed="rId2"/>
+          <a:stretch>
+            <a:fillRect/>
+          </a:stretch>
+        </p:blipFill>
+        <p:spPr>
+          <a:xfrm>
+            <a:off x="53265" y="501649"/>
+            <a:ext cx="8771138" cy="3936581"/>
+          </a:xfrm>
+          <a:prstGeom prst="rect">
+            <a:avLst/>
+          </a:prstGeom>
+        </p:spPr>
+      </p:pic>
+      <p:sp>
+        <p:nvSpPr>
+          <p:cNvPr id="5" name="Заголовок 1">
+            <a:extLst>
+              <a:ext uri="{FF2B5EF4-FFF2-40B4-BE49-F238E27FC236}">
+                <a16:creationId xmlns:a16="http://schemas.microsoft.com/office/drawing/2014/main" id="{DF02E5EE-11DA-4C66-8B5D-2FE835557B70}"/>
+              </a:ext>
+            </a:extLst>
+          </p:cNvPr>
+          <p:cNvSpPr>
+            <a:spLocks noGrp="1"/>
+          </p:cNvSpPr>
+          <p:nvPr>
+            <p:ph type="title"/>
+          </p:nvPr>
+        </p:nvSpPr>
+        <p:spPr>
+          <a:xfrm>
+            <a:off x="547168" y="92968"/>
+            <a:ext cx="7886700" cy="422525"/>
+          </a:xfrm>
+        </p:spPr>
+        <p:txBody>
+          <a:bodyPr vert="horz" lIns="91440" tIns="45720" rIns="91440" bIns="45720" rtlCol="0" anchor="ctr">
+            <a:normAutofit/>
+          </a:bodyPr>
+          <a:lstStyle/>
+          <a:p>
+            <a:pPr algn="ctr"/>
+            <a:r>
+              <a:rPr lang="en-US" sz="2400" b="1" dirty="0">
+                <a:solidFill>
+                  <a:srgbClr val="00B0F0"/>
+                </a:solidFill>
+              </a:rPr>
+              <a:t>Student’s Distribution (t-distribution)</a:t>
+            </a:r>
+            <a:endParaRPr lang="ru-RU" sz="2400" b="1" dirty="0">
+              <a:solidFill>
+                <a:srgbClr val="00B0F0"/>
+              </a:solidFill>
+            </a:endParaRPr>
+          </a:p>
+        </p:txBody>
+      </p:sp>
+      <p:pic>
+        <p:nvPicPr>
+          <p:cNvPr id="6" name="Picture 5">
+            <a:extLst>
+              <a:ext uri="{FF2B5EF4-FFF2-40B4-BE49-F238E27FC236}">
+                <a16:creationId xmlns:a16="http://schemas.microsoft.com/office/drawing/2014/main" id="{06B68D01-68F4-4985-89CC-2748368AD215}"/>
+              </a:ext>
+            </a:extLst>
+          </p:cNvPr>
+          <p:cNvPicPr>
+            <a:picLocks noChangeAspect="1"/>
+          </p:cNvPicPr>
+          <p:nvPr/>
+        </p:nvPicPr>
+        <p:blipFill>
+          <a:blip r:embed="rId3"/>
+          <a:stretch>
+            <a:fillRect/>
+          </a:stretch>
+        </p:blipFill>
+        <p:spPr>
+          <a:xfrm>
+            <a:off x="140978" y="4603011"/>
+            <a:ext cx="4759495" cy="1155763"/>
+          </a:xfrm>
+          <a:prstGeom prst="rect">
+            <a:avLst/>
+          </a:prstGeom>
+        </p:spPr>
+      </p:pic>
+      <p:sp>
+        <p:nvSpPr>
+          <p:cNvPr id="7" name="TextBox 6">
+            <a:extLst>
+              <a:ext uri="{FF2B5EF4-FFF2-40B4-BE49-F238E27FC236}">
+                <a16:creationId xmlns:a16="http://schemas.microsoft.com/office/drawing/2014/main" id="{916E57B1-2D77-48B0-BDA3-B3CB0AE0890F}"/>
+              </a:ext>
+            </a:extLst>
+          </p:cNvPr>
+          <p:cNvSpPr txBox="1"/>
+          <p:nvPr/>
+        </p:nvSpPr>
+        <p:spPr>
+          <a:xfrm>
+            <a:off x="4900474" y="4477579"/>
+            <a:ext cx="4102548" cy="1877437"/>
+          </a:xfrm>
+          <a:prstGeom prst="rect">
+            <a:avLst/>
+          </a:prstGeom>
+          <a:noFill/>
+        </p:spPr>
+        <p:txBody>
+          <a:bodyPr wrap="square" rtlCol="0">
+            <a:spAutoFit/>
+          </a:bodyPr>
+          <a:lstStyle/>
+          <a:p>
+            <a:r>
+              <a:rPr lang="en-US" b="1" dirty="0"/>
+              <a:t>Application of t-distribution:</a:t>
+            </a:r>
+          </a:p>
+          <a:p>
+            <a:pPr marL="285750" indent="-285750">
+              <a:buFont typeface="Arial" panose="020B0604020202020204" pitchFamily="34" charset="0"/>
+              <a:buChar char="•"/>
+            </a:pPr>
+            <a:r>
+              <a:rPr lang="en-US" sz="1400" dirty="0"/>
+              <a:t>Test of Hypothesis of the Population Mean</a:t>
+            </a:r>
+          </a:p>
+          <a:p>
+            <a:pPr marL="285750" indent="-285750">
+              <a:buFont typeface="Arial" panose="020B0604020202020204" pitchFamily="34" charset="0"/>
+              <a:buChar char="•"/>
+            </a:pPr>
+            <a:r>
+              <a:rPr lang="en-US" sz="1400" dirty="0"/>
+              <a:t>Test of Hypothesis of the Difference Between Two Means</a:t>
+            </a:r>
+          </a:p>
+          <a:p>
+            <a:pPr marL="285750" indent="-285750">
+              <a:buFont typeface="Arial" panose="020B0604020202020204" pitchFamily="34" charset="0"/>
+              <a:buChar char="•"/>
+            </a:pPr>
+            <a:r>
+              <a:rPr lang="en-US" sz="1400" dirty="0"/>
+              <a:t>Test of Hypothesis of the Difference Between Two Means With Dependent Samples</a:t>
+            </a:r>
+          </a:p>
+          <a:p>
+            <a:pPr marL="285750" indent="-285750">
+              <a:buFont typeface="Arial" panose="020B0604020202020204" pitchFamily="34" charset="0"/>
+              <a:buChar char="•"/>
+            </a:pPr>
+            <a:r>
+              <a:rPr lang="en-US" sz="1400" dirty="0"/>
+              <a:t>Test of Hypothesis about the Coefficient of Correlation</a:t>
+            </a:r>
+          </a:p>
+        </p:txBody>
+      </p:sp>
+      <p:sp>
+        <p:nvSpPr>
+          <p:cNvPr id="8" name="Rectangle 7">
+            <a:extLst>
+              <a:ext uri="{FF2B5EF4-FFF2-40B4-BE49-F238E27FC236}">
+                <a16:creationId xmlns:a16="http://schemas.microsoft.com/office/drawing/2014/main" id="{77761C8E-545D-47A4-A062-E94FAB71C952}"/>
+              </a:ext>
+            </a:extLst>
+          </p:cNvPr>
+          <p:cNvSpPr/>
+          <p:nvPr/>
+        </p:nvSpPr>
+        <p:spPr>
+          <a:xfrm>
+            <a:off x="234724" y="6244350"/>
+            <a:ext cx="4178078" cy="461665"/>
+          </a:xfrm>
+          <a:prstGeom prst="rect">
+            <a:avLst/>
+          </a:prstGeom>
+        </p:spPr>
+        <p:txBody>
+          <a:bodyPr wrap="square">
+            <a:spAutoFit/>
+          </a:bodyPr>
+          <a:lstStyle/>
+          <a:p>
+            <a:r>
+              <a:rPr lang="en-US" sz="1200" dirty="0">
+                <a:hlinkClick r:id="rId4"/>
+              </a:rPr>
+              <a:t>https://businessjargons.com/applications-of-t-distribution.html</a:t>
+            </a:r>
+            <a:endParaRPr lang="en-US" sz="1200" dirty="0"/>
+          </a:p>
+          <a:p>
+            <a:r>
+              <a:rPr lang="en-US" sz="1200" dirty="0">
+                <a:hlinkClick r:id="rId5"/>
+              </a:rPr>
+              <a:t>https://en.wikipedia.org/wiki/Student%27s_t-distribution</a:t>
+            </a:r>
+            <a:endParaRPr lang="en-US" sz="1200" dirty="0"/>
+          </a:p>
+        </p:txBody>
+      </p:sp>
     </p:spTree>
     <p:extLst>
       <p:ext uri="{BB962C8B-B14F-4D97-AF65-F5344CB8AC3E}">
         <p14:creationId xmlns:p14="http://schemas.microsoft.com/office/powerpoint/2010/main" val="598574929"/>
+      </p:ext>
+    </p:extLst>
+  </p:cSld>
+  <p:clrMapOvr>
+    <a:masterClrMapping/>
+  </p:clrMapOvr>
+</p:sld>
+</file>
+
+<file path=ppt/slides/slide14.xml><?xml version="1.0" encoding="utf-8"?>
+<p:sld xmlns:a="http://schemas.openxmlformats.org/drawingml/2006/main" xmlns:r="http://schemas.openxmlformats.org/officeDocument/2006/relationships" xmlns:p="http://schemas.openxmlformats.org/presentationml/2006/main">
+  <p:cSld>
+    <p:spTree>
+      <p:nvGrpSpPr>
+        <p:cNvPr id="1" name=""/>
+        <p:cNvGrpSpPr/>
+        <p:nvPr/>
+      </p:nvGrpSpPr>
+      <p:grpSpPr>
+        <a:xfrm>
+          <a:off x="0" y="0"/>
+          <a:ext cx="0" cy="0"/>
+          <a:chOff x="0" y="0"/>
+          <a:chExt cx="0" cy="0"/>
+        </a:xfrm>
+      </p:grpSpPr>
+      <p:sp>
+        <p:nvSpPr>
+          <p:cNvPr id="4" name="Slide Number Placeholder 3">
+            <a:extLst>
+              <a:ext uri="{FF2B5EF4-FFF2-40B4-BE49-F238E27FC236}">
+                <a16:creationId xmlns:a16="http://schemas.microsoft.com/office/drawing/2014/main" id="{76E1C537-427D-4EB4-BA69-2EEF27D7C3AD}"/>
+              </a:ext>
+            </a:extLst>
+          </p:cNvPr>
+          <p:cNvSpPr>
+            <a:spLocks noGrp="1"/>
+          </p:cNvSpPr>
+          <p:nvPr>
+            <p:ph type="sldNum" sz="quarter" idx="12"/>
+          </p:nvPr>
+        </p:nvSpPr>
+        <p:spPr/>
+        <p:txBody>
+          <a:bodyPr/>
+          <a:lstStyle/>
+          <a:p>
+            <a:fld id="{C936BD1D-689F-4FB2-8C94-2D2423F07E62}" type="slidenum">
+              <a:rPr lang="ru-RU" smtClean="0"/>
+              <a:t>14</a:t>
+            </a:fld>
+            <a:endParaRPr lang="ru-RU"/>
+          </a:p>
+        </p:txBody>
+      </p:sp>
+      <p:sp>
+        <p:nvSpPr>
+          <p:cNvPr id="5" name="Заголовок 1">
+            <a:extLst>
+              <a:ext uri="{FF2B5EF4-FFF2-40B4-BE49-F238E27FC236}">
+                <a16:creationId xmlns:a16="http://schemas.microsoft.com/office/drawing/2014/main" id="{104231CB-699A-4836-B06D-D29FEFCF2553}"/>
+              </a:ext>
+            </a:extLst>
+          </p:cNvPr>
+          <p:cNvSpPr>
+            <a:spLocks noGrp="1"/>
+          </p:cNvSpPr>
+          <p:nvPr>
+            <p:ph type="title"/>
+          </p:nvPr>
+        </p:nvSpPr>
+        <p:spPr>
+          <a:xfrm>
+            <a:off x="424464" y="63285"/>
+            <a:ext cx="7886700" cy="315911"/>
+          </a:xfrm>
+        </p:spPr>
+        <p:txBody>
+          <a:bodyPr vert="horz" lIns="91440" tIns="45720" rIns="91440" bIns="45720" rtlCol="0" anchor="ctr">
+            <a:normAutofit fontScale="90000"/>
+          </a:bodyPr>
+          <a:lstStyle/>
+          <a:p>
+            <a:pPr algn="ctr"/>
+            <a:r>
+              <a:rPr lang="en-US" sz="2400" b="1" dirty="0">
+                <a:solidFill>
+                  <a:srgbClr val="00B0F0"/>
+                </a:solidFill>
+              </a:rPr>
+              <a:t>Fisher–</a:t>
+            </a:r>
+            <a:r>
+              <a:rPr lang="en-US" sz="2400" b="1" dirty="0" err="1">
+                <a:solidFill>
+                  <a:srgbClr val="00B0F0"/>
+                </a:solidFill>
+              </a:rPr>
+              <a:t>Snedecor</a:t>
+            </a:r>
+            <a:r>
+              <a:rPr lang="en-US" sz="2400" b="1" dirty="0">
+                <a:solidFill>
+                  <a:srgbClr val="00B0F0"/>
+                </a:solidFill>
+              </a:rPr>
+              <a:t> Distribution (F-distribution)</a:t>
+            </a:r>
+            <a:endParaRPr lang="ru-RU" sz="2400" b="1" dirty="0">
+              <a:solidFill>
+                <a:srgbClr val="00B0F0"/>
+              </a:solidFill>
+            </a:endParaRPr>
+          </a:p>
+        </p:txBody>
+      </p:sp>
+      <p:pic>
+        <p:nvPicPr>
+          <p:cNvPr id="7" name="Picture 6">
+            <a:extLst>
+              <a:ext uri="{FF2B5EF4-FFF2-40B4-BE49-F238E27FC236}">
+                <a16:creationId xmlns:a16="http://schemas.microsoft.com/office/drawing/2014/main" id="{1ED8503A-B87C-410E-AA27-45CF962C4C62}"/>
+              </a:ext>
+            </a:extLst>
+          </p:cNvPr>
+          <p:cNvPicPr>
+            <a:picLocks noChangeAspect="1"/>
+          </p:cNvPicPr>
+          <p:nvPr/>
+        </p:nvPicPr>
+        <p:blipFill>
+          <a:blip r:embed="rId2"/>
+          <a:stretch>
+            <a:fillRect/>
+          </a:stretch>
+        </p:blipFill>
+        <p:spPr>
+          <a:xfrm>
+            <a:off x="213064" y="509203"/>
+            <a:ext cx="8700117" cy="2690117"/>
+          </a:xfrm>
+          <a:prstGeom prst="rect">
+            <a:avLst/>
+          </a:prstGeom>
+        </p:spPr>
+      </p:pic>
+      <p:pic>
+        <p:nvPicPr>
+          <p:cNvPr id="8" name="Picture 7">
+            <a:extLst>
+              <a:ext uri="{FF2B5EF4-FFF2-40B4-BE49-F238E27FC236}">
+                <a16:creationId xmlns:a16="http://schemas.microsoft.com/office/drawing/2014/main" id="{91ED7985-398B-4482-B26B-E025C395BC1C}"/>
+              </a:ext>
+            </a:extLst>
+          </p:cNvPr>
+          <p:cNvPicPr>
+            <a:picLocks noChangeAspect="1"/>
+          </p:cNvPicPr>
+          <p:nvPr/>
+        </p:nvPicPr>
+        <p:blipFill>
+          <a:blip r:embed="rId3"/>
+          <a:stretch>
+            <a:fillRect/>
+          </a:stretch>
+        </p:blipFill>
+        <p:spPr>
+          <a:xfrm>
+            <a:off x="213064" y="3413340"/>
+            <a:ext cx="3476625" cy="3381375"/>
+          </a:xfrm>
+          <a:prstGeom prst="rect">
+            <a:avLst/>
+          </a:prstGeom>
+        </p:spPr>
+      </p:pic>
+      <p:sp>
+        <p:nvSpPr>
+          <p:cNvPr id="9" name="TextBox 8">
+            <a:extLst>
+              <a:ext uri="{FF2B5EF4-FFF2-40B4-BE49-F238E27FC236}">
+                <a16:creationId xmlns:a16="http://schemas.microsoft.com/office/drawing/2014/main" id="{29B525E7-681C-440E-9823-5D061E178F69}"/>
+              </a:ext>
+            </a:extLst>
+          </p:cNvPr>
+          <p:cNvSpPr txBox="1"/>
+          <p:nvPr/>
+        </p:nvSpPr>
+        <p:spPr>
+          <a:xfrm>
+            <a:off x="4030462" y="3613212"/>
+            <a:ext cx="4110361" cy="3262432"/>
+          </a:xfrm>
+          <a:prstGeom prst="rect">
+            <a:avLst/>
+          </a:prstGeom>
+          <a:noFill/>
+        </p:spPr>
+        <p:txBody>
+          <a:bodyPr wrap="square" rtlCol="0">
+            <a:spAutoFit/>
+          </a:bodyPr>
+          <a:lstStyle/>
+          <a:p>
+            <a:r>
+              <a:rPr lang="en-US" b="1" dirty="0"/>
+              <a:t>Application of F-distribution:</a:t>
+            </a:r>
+          </a:p>
+          <a:p>
+            <a:pPr marL="285750" indent="-285750">
+              <a:buFont typeface="Arial" panose="020B0604020202020204" pitchFamily="34" charset="0"/>
+              <a:buChar char="•"/>
+            </a:pPr>
+            <a:r>
+              <a:rPr lang="en-US" sz="1400" dirty="0"/>
+              <a:t>test for the equality of the two population variances</a:t>
+            </a:r>
+          </a:p>
+          <a:p>
+            <a:pPr marL="285750" indent="-285750">
+              <a:buFont typeface="Arial" panose="020B0604020202020204" pitchFamily="34" charset="0"/>
+              <a:buChar char="•"/>
+            </a:pPr>
+            <a:endParaRPr lang="en-US" sz="1400" dirty="0"/>
+          </a:p>
+          <a:p>
+            <a:pPr marL="285750" indent="-285750">
+              <a:buFont typeface="Arial" panose="020B0604020202020204" pitchFamily="34" charset="0"/>
+              <a:buChar char="•"/>
+            </a:pPr>
+            <a:r>
+              <a:rPr lang="en-US" sz="1400" dirty="0"/>
+              <a:t>test for the null hypothesis and alternative hypothesis in regression models</a:t>
+            </a:r>
+          </a:p>
+          <a:p>
+            <a:pPr marL="285750" indent="-285750">
+              <a:buFont typeface="Arial" panose="020B0604020202020204" pitchFamily="34" charset="0"/>
+              <a:buChar char="•"/>
+            </a:pPr>
+            <a:endParaRPr lang="en-US" sz="1400" dirty="0"/>
+          </a:p>
+          <a:p>
+            <a:pPr marL="285750" indent="-285750">
+              <a:buFont typeface="Arial" panose="020B0604020202020204" pitchFamily="34" charset="0"/>
+              <a:buChar char="•"/>
+            </a:pPr>
+            <a:r>
+              <a:rPr lang="en-US" sz="1400" dirty="0"/>
+              <a:t>testing of significance of an observed R</a:t>
+            </a:r>
+            <a:r>
+              <a:rPr lang="en-US" sz="1400" baseline="30000" dirty="0"/>
+              <a:t>2</a:t>
+            </a:r>
+            <a:r>
+              <a:rPr lang="en-US" sz="1400" dirty="0"/>
+              <a:t> (observed multiple correlation coefficient)  of a variate with k other variates in a random sample of size n from (k+1) variate population</a:t>
+            </a:r>
+          </a:p>
+          <a:p>
+            <a:endParaRPr lang="en-US" b="1" dirty="0"/>
+          </a:p>
+          <a:p>
+            <a:r>
+              <a:rPr lang="en-US" sz="1200" dirty="0">
+                <a:hlinkClick r:id="rId4"/>
+              </a:rPr>
+              <a:t>https://stepupanalytics.com/application-of-f-distribution/</a:t>
+            </a:r>
+            <a:endParaRPr lang="en-US" sz="1200" b="1" dirty="0"/>
+          </a:p>
+          <a:p>
+            <a:endParaRPr lang="en-US" b="1" dirty="0"/>
+          </a:p>
+        </p:txBody>
+      </p:sp>
+      <p:sp>
+        <p:nvSpPr>
+          <p:cNvPr id="10" name="Rectangle 9">
+            <a:extLst>
+              <a:ext uri="{FF2B5EF4-FFF2-40B4-BE49-F238E27FC236}">
+                <a16:creationId xmlns:a16="http://schemas.microsoft.com/office/drawing/2014/main" id="{01CB294B-FB16-44C7-B5CB-725585B094C7}"/>
+              </a:ext>
+            </a:extLst>
+          </p:cNvPr>
+          <p:cNvSpPr/>
+          <p:nvPr/>
+        </p:nvSpPr>
+        <p:spPr>
+          <a:xfrm>
+            <a:off x="3999908" y="6478989"/>
+            <a:ext cx="2908810" cy="276999"/>
+          </a:xfrm>
+          <a:prstGeom prst="rect">
+            <a:avLst/>
+          </a:prstGeom>
+        </p:spPr>
+        <p:txBody>
+          <a:bodyPr wrap="none">
+            <a:spAutoFit/>
+          </a:bodyPr>
+          <a:lstStyle/>
+          <a:p>
+            <a:r>
+              <a:rPr lang="en-US" sz="1200" dirty="0">
+                <a:hlinkClick r:id="rId5"/>
+              </a:rPr>
+              <a:t>https://en.wikipedia.org/wiki/F-distribution</a:t>
+            </a:r>
+            <a:endParaRPr lang="en-US" sz="1200" dirty="0"/>
+          </a:p>
+        </p:txBody>
+      </p:sp>
+    </p:spTree>
+    <p:extLst>
+      <p:ext uri="{BB962C8B-B14F-4D97-AF65-F5344CB8AC3E}">
+        <p14:creationId xmlns:p14="http://schemas.microsoft.com/office/powerpoint/2010/main" val="1563761418"/>
       </p:ext>
     </p:extLst>
   </p:cSld>
@@ -4811,20 +5216,8 @@
           </a:lstStyle>
           <a:p>
             <a:r>
-              <a:rPr lang="en-US" sz="2400" dirty="0" smtClean="0"/>
-              <a:t>Law </a:t>
-            </a:r>
-            <a:r>
               <a:rPr lang="en-US" sz="2400" dirty="0"/>
-              <a:t>of </a:t>
-            </a:r>
-            <a:r>
-              <a:rPr lang="en-US" sz="2400" dirty="0" smtClean="0"/>
-              <a:t>Large Numbers</a:t>
-            </a:r>
-            <a:r>
-              <a:rPr lang="en-US" sz="2400" dirty="0"/>
-              <a:t> (LLN)</a:t>
+              <a:t>Law of Large Numbers (LLN)</a:t>
             </a:r>
             <a:endParaRPr lang="ru-RU" sz="2400" dirty="0"/>
           </a:p>
@@ -4854,7 +5247,7 @@
           <a:p>
             <a:pPr algn="just"/>
             <a:r>
-              <a:rPr lang="en-US" sz="2400" dirty="0" smtClean="0">
+              <a:rPr lang="en-US" sz="2400" dirty="0">
                 <a:solidFill>
                   <a:srgbClr val="FF0000"/>
                 </a:solidFill>
@@ -4862,7 +5255,7 @@
               <a:t>Law of Large Numbers (LLN)</a:t>
             </a:r>
             <a:r>
-              <a:rPr lang="en-US" sz="2400" dirty="0" smtClean="0"/>
+              <a:rPr lang="en-US" sz="2400" dirty="0"/>
               <a:t> is a keystone for practical application of distribution of random values and their prediction.</a:t>
             </a:r>
           </a:p>
@@ -4873,14 +5266,14 @@
           <a:p>
             <a:pPr algn="just"/>
             <a:r>
-              <a:rPr lang="en-US" sz="2400" b="1" dirty="0" smtClean="0"/>
+              <a:rPr lang="en-US" sz="2400" b="1" dirty="0"/>
               <a:t>The General Theorem:</a:t>
             </a:r>
           </a:p>
           <a:p>
             <a:pPr algn="just"/>
             <a:r>
-              <a:rPr lang="en-US" sz="2400" dirty="0" smtClean="0"/>
+              <a:rPr lang="en-US" sz="2400" dirty="0"/>
               <a:t>Large quantity of random values follow a certain pattern/conditions -&gt; so it is possible to predict some stable outcome with no material influence of random values.</a:t>
             </a:r>
           </a:p>
@@ -4890,38 +5283,29 @@
           </a:p>
           <a:p>
             <a:r>
-              <a:rPr lang="en-US" sz="1600" dirty="0" smtClean="0"/>
+              <a:rPr lang="en-US" sz="1600" dirty="0"/>
               <a:t>In fact, LLN is  the </a:t>
             </a:r>
             <a:r>
-              <a:rPr lang="en-US" sz="1600" i="1" u="sng" dirty="0" smtClean="0"/>
+              <a:rPr lang="en-US" sz="1600" i="1" u="sng" dirty="0"/>
               <a:t>set of different theorems</a:t>
             </a:r>
             <a:r>
-              <a:rPr lang="en-US" sz="1600" i="1" dirty="0" smtClean="0"/>
+              <a:rPr lang="en-US" sz="1600" i="1" dirty="0"/>
               <a:t> </a:t>
             </a:r>
             <a:r>
-              <a:rPr lang="en-US" sz="1600" dirty="0" smtClean="0"/>
+              <a:rPr lang="en-US" sz="1600" dirty="0"/>
               <a:t>stipulating the rationale and application of LLN. The </a:t>
             </a:r>
             <a:r>
-              <a:rPr lang="en-US" sz="1600" dirty="0" err="1" smtClean="0"/>
+              <a:rPr lang="en-US" sz="1600" dirty="0" err="1"/>
               <a:t>Chebyshev’s</a:t>
             </a:r>
             <a:r>
-              <a:rPr lang="en-US" sz="1600" dirty="0" smtClean="0"/>
-              <a:t> Theorem is the most general LLN and </a:t>
-            </a:r>
-            <a:r>
               <a:rPr lang="en-US" sz="1600" dirty="0"/>
-              <a:t>Bernoulli </a:t>
-            </a:r>
-            <a:r>
-              <a:rPr lang="en-US" sz="1600" dirty="0" smtClean="0"/>
-              <a:t>Theorem is the simplest one.</a:t>
-            </a:r>
-            <a:endParaRPr lang="en-US" sz="1600" dirty="0"/>
+              <a:t> Theorem is the most general LLN and Bernoulli Theorem is the simplest one.</a:t>
+            </a:r>
           </a:p>
           <a:p>
             <a:pPr algn="just"/>
@@ -4933,15 +5317,9 @@
               <a:rPr lang="en-US" sz="1400" dirty="0">
                 <a:hlinkClick r:id="rId2"/>
               </a:rPr>
-              <a:t>https://</a:t>
-            </a:r>
-            <a:r>
-              <a:rPr lang="en-US" sz="1400" dirty="0" smtClean="0">
-                <a:hlinkClick r:id="rId2"/>
-              </a:rPr>
-              <a:t>en.wikipedia.org/wiki/Law_of_large_numbers</a:t>
-            </a:r>
-            <a:endParaRPr lang="en-US" sz="1400" dirty="0" smtClean="0"/>
+              <a:t>https://en.wikipedia.org/wiki/Law_of_large_numbers</a:t>
+            </a:r>
+            <a:endParaRPr lang="en-US" sz="1400" dirty="0"/>
           </a:p>
           <a:p>
             <a:pPr algn="just"/>
@@ -4965,13 +5343,6 @@
   <p:clrMapOvr>
     <a:masterClrMapping/>
   </p:clrMapOvr>
-  <p:timing>
-    <p:tnLst>
-      <p:par>
-        <p:cTn id="1" dur="indefinite" restart="never" nodeType="tmRoot"/>
-      </p:par>
-    </p:tnLst>
-  </p:timing>
 </p:sld>
 </file>
 
@@ -5017,23 +5388,19 @@
             <a:pPr marL="0" indent="0" algn="just">
               <a:buNone/>
             </a:pPr>
-            <a:endParaRPr lang="en-US" dirty="0" smtClean="0"/>
+            <a:endParaRPr lang="en-US" dirty="0"/>
           </a:p>
           <a:p>
             <a:pPr marL="0" indent="0" algn="just">
               <a:buNone/>
             </a:pPr>
             <a:r>
-              <a:rPr lang="en-US" dirty="0" err="1" smtClean="0"/>
+              <a:rPr lang="en-US" dirty="0" err="1"/>
               <a:t>Chebyshev’s</a:t>
             </a:r>
             <a:r>
-              <a:rPr lang="en-US" dirty="0" smtClean="0"/>
-              <a:t> inequality </a:t>
-            </a:r>
-            <a:r>
               <a:rPr lang="en-US" dirty="0"/>
-              <a:t> </a:t>
+              <a:t> inequality  </a:t>
             </a:r>
             <a:r>
               <a:rPr lang="en-US" b="1" dirty="0"/>
@@ -5041,19 +5408,7 @@
             </a:r>
             <a:r>
               <a:rPr lang="en-US" dirty="0"/>
-              <a:t> that, for a wide class of </a:t>
-            </a:r>
-            <a:r>
-              <a:rPr lang="en-US" dirty="0" smtClean="0"/>
-              <a:t>probability distributions, </a:t>
-            </a:r>
-            <a:r>
-              <a:rPr lang="en-US" dirty="0"/>
-              <a:t>no more than a certain fraction of values can be more than a certain distance from </a:t>
-            </a:r>
-            <a:r>
-              <a:rPr lang="en-US" dirty="0" smtClean="0"/>
-              <a:t>the mean.</a:t>
+              <a:t> that, for a wide class of probability distributions, no more than a certain fraction of values can be more than a certain distance from the mean.</a:t>
             </a:r>
           </a:p>
           <a:p>
@@ -5067,15 +5422,15 @@
               <a:buNone/>
             </a:pPr>
             <a:r>
-              <a:rPr lang="en-US" dirty="0" smtClean="0"/>
+              <a:rPr lang="en-US" dirty="0"/>
               <a:t>So it </a:t>
             </a:r>
             <a:r>
-              <a:rPr lang="en-US" i="1" u="sng" dirty="0" smtClean="0"/>
+              <a:rPr lang="en-US" i="1" u="sng" dirty="0"/>
               <a:t>stipulates</a:t>
             </a:r>
             <a:r>
-              <a:rPr lang="en-US" dirty="0" smtClean="0"/>
+              <a:rPr lang="en-US" dirty="0"/>
               <a:t> that random value is within the specific range from the mean.</a:t>
             </a:r>
           </a:p>
@@ -5090,15 +5445,15 @@
               <a:buNone/>
             </a:pPr>
             <a:r>
-              <a:rPr lang="en-US" dirty="0" smtClean="0"/>
+              <a:rPr lang="en-US" dirty="0"/>
               <a:t>The inequality is used to prove </a:t>
             </a:r>
             <a:r>
-              <a:rPr lang="en-US" dirty="0" err="1" smtClean="0"/>
+              <a:rPr lang="en-US" dirty="0" err="1"/>
               <a:t>Chebyshev’s</a:t>
             </a:r>
             <a:r>
-              <a:rPr lang="en-US" dirty="0" smtClean="0"/>
+              <a:rPr lang="en-US" dirty="0"/>
               <a:t> Theorem. </a:t>
             </a:r>
           </a:p>
@@ -5246,7 +5601,7 @@
               <a:buNone/>
             </a:pPr>
             <a:r>
-              <a:rPr lang="en-US" dirty="0" smtClean="0"/>
+              <a:rPr lang="en-US" dirty="0"/>
               <a:t>↑ of the quantity of random variables -&gt; Arithmetic Mean loses the random property -&gt;</a:t>
             </a:r>
           </a:p>
@@ -5255,7 +5610,7 @@
               <a:buNone/>
             </a:pPr>
             <a:r>
-              <a:rPr lang="en-US" dirty="0" smtClean="0">
+              <a:rPr lang="en-US" dirty="0">
                 <a:solidFill>
                   <a:srgbClr val="FF0000"/>
                 </a:solidFill>
@@ -5267,14 +5622,14 @@
             <a:pPr marL="0" indent="0" algn="just">
               <a:buNone/>
             </a:pPr>
-            <a:endParaRPr lang="en-US" dirty="0" smtClean="0"/>
+            <a:endParaRPr lang="en-US" dirty="0"/>
           </a:p>
           <a:p>
             <a:pPr marL="0" indent="0" algn="just">
               <a:buNone/>
             </a:pPr>
             <a:r>
-              <a:rPr lang="en-US" b="1" dirty="0" smtClean="0"/>
+              <a:rPr lang="en-US" b="1" dirty="0"/>
               <a:t>On-job application:</a:t>
             </a:r>
           </a:p>
@@ -5283,7 +5638,7 @@
               <a:buNone/>
             </a:pPr>
             <a:r>
-              <a:rPr lang="en-US" dirty="0" smtClean="0"/>
+              <a:rPr lang="en-US" dirty="0"/>
               <a:t>The descriptive statistics of the sample is assumed to give sufficient description of the general population.</a:t>
             </a:r>
             <a:endParaRPr lang="uk-UA" dirty="0"/>
@@ -5363,21 +5718,8 @@
                   <a:srgbClr val="00B0F0"/>
                 </a:solidFill>
               </a:rPr>
-              <a:t> </a:t>
-            </a:r>
-            <a:r>
-              <a:rPr lang="en-US" sz="2400" b="1" dirty="0" smtClean="0">
-                <a:solidFill>
-                  <a:srgbClr val="00B0F0"/>
-                </a:solidFill>
-              </a:rPr>
-              <a:t>Theorem</a:t>
-            </a:r>
-            <a:endParaRPr lang="en-US" sz="2400" b="1" dirty="0">
-              <a:solidFill>
-                <a:srgbClr val="00B0F0"/>
-              </a:solidFill>
-            </a:endParaRPr>
+              <a:t> Theorem</a:t>
+            </a:r>
           </a:p>
         </p:txBody>
       </p:sp>
@@ -5492,18 +5834,13 @@
           <a:p>
             <a:pPr algn="ctr"/>
             <a:r>
-              <a:rPr lang="en-US" sz="2400" b="1" dirty="0" smtClean="0">
+              <a:rPr lang="en-US" sz="2400" b="1" dirty="0">
                 <a:solidFill>
                   <a:srgbClr val="00B0F0"/>
                 </a:solidFill>
               </a:rPr>
               <a:t>Bernoulli’s Theorem</a:t>
             </a:r>
-            <a:endParaRPr lang="en-US" sz="2400" b="1" dirty="0">
-              <a:solidFill>
-                <a:srgbClr val="00B0F0"/>
-              </a:solidFill>
-            </a:endParaRPr>
           </a:p>
         </p:txBody>
       </p:sp>
@@ -5531,18 +5868,10 @@
             <a:pPr algn="just"/>
             <a:r>
               <a:rPr lang="en-US" sz="2400" dirty="0"/>
-              <a:t>↑ of the quantity of </a:t>
-            </a:r>
-            <a:r>
-              <a:rPr lang="en-US" sz="2400" dirty="0" smtClean="0"/>
-              <a:t>observations </a:t>
-            </a:r>
-            <a:r>
-              <a:rPr lang="en-US" sz="2400" dirty="0"/>
-              <a:t>-&gt; </a:t>
-            </a:r>
-            <a:r>
-              <a:rPr lang="en-US" sz="2400" dirty="0" smtClean="0">
+              <a:t>↑ of the quantity of observations -&gt; </a:t>
+            </a:r>
+            <a:r>
+              <a:rPr lang="en-US" sz="2400" dirty="0">
                 <a:solidFill>
                   <a:srgbClr val="FF0000"/>
                 </a:solidFill>
@@ -5550,18 +5879,18 @@
               <a:t>Frequency ~ Probability</a:t>
             </a:r>
             <a:r>
-              <a:rPr lang="en-US" sz="2400" dirty="0" smtClean="0"/>
+              <a:rPr lang="en-US" sz="2400" dirty="0"/>
               <a:t> </a:t>
             </a:r>
           </a:p>
           <a:p>
             <a:pPr algn="just"/>
-            <a:endParaRPr lang="en-US" sz="2400" dirty="0" smtClean="0"/>
+            <a:endParaRPr lang="en-US" sz="2400" dirty="0"/>
           </a:p>
           <a:p>
             <a:pPr algn="just"/>
             <a:r>
-              <a:rPr lang="en-US" sz="2400" dirty="0" smtClean="0"/>
+              <a:rPr lang="en-US" sz="2400" dirty="0"/>
               <a:t>where P of random variable is within the range (0, 1] </a:t>
             </a:r>
           </a:p>
@@ -5723,7 +6052,7 @@
           <a:lstStyle/>
           <a:p>
             <a:r>
-              <a:rPr lang="en-US" b="1" dirty="0" smtClean="0"/>
+              <a:rPr lang="en-US" b="1" dirty="0"/>
               <a:t>Stationarity</a:t>
             </a:r>
             <a:endParaRPr lang="ru-RU" b="1" dirty="0"/>
@@ -5782,15 +6111,6 @@
           </a:bodyPr>
           <a:lstStyle/>
           <a:p>
-            <a:r>
-              <a:rPr lang="en-US" sz="1200" dirty="0" smtClean="0">
-                <a:solidFill>
-                  <a:srgbClr val="222222"/>
-                </a:solidFill>
-                <a:latin typeface="Arial" panose="020B0604020202020204" pitchFamily="34" charset="0"/>
-              </a:rPr>
-              <a:t>Distribution is</a:t>
-            </a:r>
             <a:r>
               <a:rPr lang="en-US" sz="1200" dirty="0">
                 <a:solidFill>
@@ -5798,7 +6118,7 @@
                 </a:solidFill>
                 <a:latin typeface="Arial" panose="020B0604020202020204" pitchFamily="34" charset="0"/>
               </a:rPr>
-              <a:t> </a:t>
+              <a:t>Distribution is </a:t>
             </a:r>
             <a:r>
               <a:rPr lang="en-US" sz="1200" dirty="0">
@@ -5816,16 +6136,7 @@
                 </a:solidFill>
                 <a:latin typeface="Arial" panose="020B0604020202020204" pitchFamily="34" charset="0"/>
               </a:rPr>
-              <a:t> if </a:t>
-            </a:r>
-            <a:r>
-              <a:rPr lang="en-US" sz="1200" dirty="0" smtClean="0">
-                <a:solidFill>
-                  <a:srgbClr val="222222"/>
-                </a:solidFill>
-                <a:latin typeface="Arial" panose="020B0604020202020204" pitchFamily="34" charset="0"/>
-              </a:rPr>
-              <a:t>a linear combination</a:t>
+              <a:t> if a linear combination of two independent random variables with this distribution has the same distribution, up to location</a:t>
             </a:r>
             <a:r>
               <a:rPr lang="en-US" sz="1200" dirty="0">
@@ -5833,17 +6144,9 @@
                   <a:srgbClr val="222222"/>
                 </a:solidFill>
                 <a:latin typeface="Arial" panose="020B0604020202020204" pitchFamily="34" charset="0"/>
-              </a:rPr>
-              <a:t> of two </a:t>
-            </a:r>
-            <a:r>
-              <a:rPr lang="en-US" sz="1200" dirty="0" smtClean="0">
-                <a:solidFill>
-                  <a:srgbClr val="222222"/>
-                </a:solidFill>
-                <a:latin typeface="Arial" panose="020B0604020202020204" pitchFamily="34" charset="0"/>
-              </a:rPr>
-              <a:t>independent random variables</a:t>
+                <a:hlinkClick r:id="rId4" tooltip="Up to"/>
+              </a:rPr>
+              <a:t> </a:t>
             </a:r>
             <a:r>
               <a:rPr lang="en-US" sz="1200" dirty="0">
@@ -5852,73 +6155,12 @@
                 </a:solidFill>
                 <a:latin typeface="Arial" panose="020B0604020202020204" pitchFamily="34" charset="0"/>
               </a:rPr>
-              <a:t> with this distribution has the same distribution, </a:t>
-            </a:r>
-            <a:r>
-              <a:rPr lang="en-US" sz="1200" dirty="0" smtClean="0">
-                <a:solidFill>
-                  <a:srgbClr val="222222"/>
-                </a:solidFill>
-                <a:latin typeface="Arial" panose="020B0604020202020204" pitchFamily="34" charset="0"/>
-              </a:rPr>
-              <a:t>up to location</a:t>
-            </a:r>
-            <a:r>
-              <a:rPr lang="en-US" sz="1200" dirty="0" smtClean="0">
-                <a:solidFill>
-                  <a:srgbClr val="222222"/>
-                </a:solidFill>
-                <a:latin typeface="Arial" panose="020B0604020202020204" pitchFamily="34" charset="0"/>
-                <a:hlinkClick r:id="rId4" tooltip="Up to"/>
-              </a:rPr>
-              <a:t> </a:t>
-            </a:r>
-            <a:r>
-              <a:rPr lang="en-US" sz="1200" dirty="0" smtClean="0">
-                <a:solidFill>
-                  <a:srgbClr val="222222"/>
-                </a:solidFill>
-                <a:latin typeface="Arial" panose="020B0604020202020204" pitchFamily="34" charset="0"/>
-              </a:rPr>
-              <a:t>and</a:t>
-            </a:r>
+              <a:t>and scale parameters. </a:t>
+            </a:r>
+          </a:p>
+          <a:p>
             <a:r>
               <a:rPr lang="en-US" sz="1200" dirty="0">
-                <a:solidFill>
-                  <a:srgbClr val="222222"/>
-                </a:solidFill>
-                <a:latin typeface="Arial" panose="020B0604020202020204" pitchFamily="34" charset="0"/>
-              </a:rPr>
-              <a:t> </a:t>
-            </a:r>
-            <a:r>
-              <a:rPr lang="en-US" sz="1200" dirty="0" smtClean="0">
-                <a:solidFill>
-                  <a:srgbClr val="222222"/>
-                </a:solidFill>
-                <a:latin typeface="Arial" panose="020B0604020202020204" pitchFamily="34" charset="0"/>
-              </a:rPr>
-              <a:t>scale</a:t>
-            </a:r>
-            <a:r>
-              <a:rPr lang="en-US" sz="1200" dirty="0">
-                <a:solidFill>
-                  <a:srgbClr val="222222"/>
-                </a:solidFill>
-                <a:latin typeface="Arial" panose="020B0604020202020204" pitchFamily="34" charset="0"/>
-              </a:rPr>
-              <a:t> parameters. </a:t>
-            </a:r>
-            <a:endParaRPr lang="en-US" sz="1200" dirty="0" smtClean="0">
-              <a:solidFill>
-                <a:srgbClr val="222222"/>
-              </a:solidFill>
-              <a:latin typeface="Arial" panose="020B0604020202020204" pitchFamily="34" charset="0"/>
-            </a:endParaRPr>
-          </a:p>
-          <a:p>
-            <a:r>
-              <a:rPr lang="en-US" sz="1200" dirty="0" smtClean="0">
                 <a:solidFill>
                   <a:srgbClr val="222222"/>
                 </a:solidFill>
@@ -5994,7 +6236,7 @@
           <a:lstStyle/>
           <a:p>
             <a:r>
-              <a:rPr lang="en-US" b="1" dirty="0" smtClean="0"/>
+              <a:rPr lang="en-US" b="1" dirty="0"/>
               <a:t>Stability</a:t>
             </a:r>
             <a:endParaRPr lang="ru-RU" b="1" dirty="0"/>
@@ -6055,7 +6297,7 @@
           <a:lstStyle/>
           <a:p>
             <a:r>
-              <a:rPr lang="en-US" b="1" dirty="0" smtClean="0"/>
+              <a:rPr lang="en-US" b="1" dirty="0"/>
               <a:t>Finite Variance</a:t>
             </a:r>
             <a:endParaRPr lang="ru-RU" b="1" dirty="0"/>
@@ -6170,7 +6412,7 @@
           <a:p>
             <a:pPr algn="ctr"/>
             <a:r>
-              <a:rPr lang="en-US" sz="2400" b="1" dirty="0" smtClean="0">
+              <a:rPr lang="en-US" sz="2400" b="1" dirty="0">
                 <a:solidFill>
                   <a:srgbClr val="00B0F0"/>
                 </a:solidFill>
@@ -6258,15 +6500,9 @@
               <a:rPr lang="en-US" sz="1100" dirty="0">
                 <a:hlinkClick r:id="rId4"/>
               </a:rPr>
-              <a:t>https://</a:t>
-            </a:r>
-            <a:r>
-              <a:rPr lang="en-US" sz="1100" dirty="0" smtClean="0">
-                <a:hlinkClick r:id="rId4"/>
-              </a:rPr>
-              <a:t>en.wikipedia.org/wiki/Normal_distribution</a:t>
-            </a:r>
-            <a:endParaRPr lang="en-US" sz="1100" dirty="0" smtClean="0"/>
+              <a:t>https://en.wikipedia.org/wiki/Normal_distribution</a:t>
+            </a:r>
+            <a:endParaRPr lang="en-US" sz="1100" dirty="0"/>
           </a:p>
           <a:p>
             <a:r>
@@ -6304,13 +6540,13 @@
               <a:lstStyle/>
               <a:p>
                 <a:r>
-                  <a:rPr lang="en-US" sz="1200" dirty="0" smtClean="0"/>
+                  <a:rPr lang="en-US" sz="1200" dirty="0"/>
                   <a:t>where</a:t>
                 </a:r>
               </a:p>
               <a:p>
                 <a:r>
-                  <a:rPr lang="ru-RU" sz="1200" dirty="0" smtClean="0">
+                  <a:rPr lang="ru-RU" sz="1200" dirty="0">
                     <a:solidFill>
                       <a:srgbClr val="FF0000"/>
                     </a:solidFill>
@@ -6318,16 +6554,8 @@
                   <a:t>µ</a:t>
                 </a:r>
                 <a:r>
-                  <a:rPr lang="en-US" sz="1200" dirty="0" smtClean="0"/>
-                  <a:t> </a:t>
-                </a:r>
-                <a:r>
                   <a:rPr lang="en-US" sz="1200" dirty="0"/>
-                  <a:t>–</a:t>
-                </a:r>
-                <a:r>
-                  <a:rPr lang="en-US" sz="1200" dirty="0" smtClean="0"/>
-                  <a:t> the mean or expected value of the distribution (also it could be median and mode)</a:t>
+                  <a:t> – the mean or expected value of the distribution (also it could be median and mode)</a:t>
                 </a:r>
               </a:p>
               <a:p>
@@ -6340,7 +6568,7 @@
                   <a:t>σ</a:t>
                 </a:r>
                 <a:r>
-                  <a:rPr lang="en-US" sz="1200" dirty="0" smtClean="0"/>
+                  <a:rPr lang="en-US" sz="1200" dirty="0"/>
                   <a:t> – the standard deviation</a:t>
                 </a:r>
               </a:p>
@@ -6387,16 +6615,8 @@
                   </m:oMath>
                 </a14:m>
                 <a:r>
-                  <a:rPr lang="en-US" sz="1200" dirty="0" smtClean="0"/>
-                  <a:t> </a:t>
-                </a:r>
-                <a:r>
                   <a:rPr lang="en-US" sz="1200" dirty="0"/>
-                  <a:t>–</a:t>
-                </a:r>
-                <a:r>
-                  <a:rPr lang="en-US" sz="1200" dirty="0" smtClean="0"/>
-                  <a:t> the variance</a:t>
+                  <a:t> – the variance</a:t>
                 </a:r>
               </a:p>
             </p:txBody>
@@ -6464,11 +6684,11 @@
           <a:lstStyle/>
           <a:p>
             <a:r>
-              <a:rPr lang="en-US" sz="1200" dirty="0" smtClean="0"/>
+              <a:rPr lang="en-US" sz="1200" dirty="0"/>
               <a:t>Area under the curve = </a:t>
             </a:r>
             <a:r>
-              <a:rPr lang="en-US" sz="1200" b="1" dirty="0" smtClean="0"/>
+              <a:rPr lang="en-US" sz="1200" b="1" dirty="0"/>
               <a:t>1 (probability) </a:t>
             </a:r>
           </a:p>
@@ -6551,7 +6771,7 @@
           <a:p>
             <a:pPr algn="ctr"/>
             <a:r>
-              <a:rPr lang="en-US" sz="2400" b="1" dirty="0" smtClean="0">
+              <a:rPr lang="en-US" sz="2400" b="1" dirty="0">
                 <a:solidFill>
                   <a:srgbClr val="00B0F0"/>
                 </a:solidFill>
@@ -6589,46 +6809,16 @@
           <a:p>
             <a:pPr algn="just"/>
             <a:r>
-              <a:rPr lang="en-US" dirty="0" smtClean="0">
-                <a:latin typeface="pt sans"/>
-              </a:rPr>
-              <a:t>The </a:t>
-            </a:r>
-            <a:r>
               <a:rPr lang="en-US" dirty="0">
                 <a:latin typeface="pt sans"/>
               </a:rPr>
-              <a:t>sampling distribution of the sample means </a:t>
+              <a:t>The sampling distribution of the sample means </a:t>
             </a:r>
             <a:r>
               <a:rPr lang="en-US" i="1" u="sng" dirty="0">
                 <a:latin typeface="pt sans"/>
               </a:rPr>
-              <a:t>approaches a </a:t>
-            </a:r>
-            <a:r>
-              <a:rPr lang="en-US" i="1" u="sng" dirty="0" smtClean="0">
-                <a:latin typeface="pt sans"/>
-              </a:rPr>
-              <a:t>normal distribution</a:t>
-            </a:r>
-            <a:r>
-              <a:rPr lang="en-US" i="1" u="sng" dirty="0">
-                <a:latin typeface="pt sans"/>
-              </a:rPr>
-              <a:t> as the </a:t>
-            </a:r>
-            <a:r>
-              <a:rPr lang="en-US" i="1" u="sng" dirty="0" smtClean="0">
-                <a:latin typeface="pt sans"/>
-              </a:rPr>
-              <a:t>sample size</a:t>
-            </a:r>
-            <a:r>
-              <a:rPr lang="en-US" i="1" u="sng" dirty="0">
-                <a:latin typeface="pt sans"/>
-              </a:rPr>
-              <a:t> gets larger</a:t>
+              <a:t>approaches a normal distribution as the sample size gets larger</a:t>
             </a:r>
             <a:r>
               <a:rPr lang="en-US" dirty="0">
@@ -6678,25 +6868,13 @@
               <a:rPr lang="en-US" sz="1400" dirty="0">
                 <a:latin typeface="pt sans"/>
               </a:rPr>
-              <a:t>An essential component of the Central Limit Theorem is that the </a:t>
-            </a:r>
-            <a:r>
-              <a:rPr lang="en-US" sz="1400" dirty="0" smtClean="0">
-                <a:latin typeface="pt sans"/>
-              </a:rPr>
-              <a:t>average </a:t>
-            </a:r>
-            <a:r>
-              <a:rPr lang="en-US" sz="1400" b="1" dirty="0" smtClean="0">
-                <a:latin typeface="pt sans"/>
-              </a:rPr>
-              <a:t>of </a:t>
+              <a:t>An essential component of the Central Limit Theorem is that the average </a:t>
             </a:r>
             <a:r>
               <a:rPr lang="en-US" sz="1400" b="1" dirty="0">
                 <a:latin typeface="pt sans"/>
               </a:rPr>
-              <a:t>your sample means will be the population mean</a:t>
+              <a:t>of your sample means will be the population mean</a:t>
             </a:r>
             <a:r>
               <a:rPr lang="en-US" sz="1400" dirty="0">
@@ -6704,15 +6882,6 @@
               </a:rPr>
               <a:t>. </a:t>
             </a:r>
-            <a:endParaRPr lang="en-US" sz="1400" dirty="0" smtClean="0">
-              <a:latin typeface="pt sans"/>
-            </a:endParaRPr>
-          </a:p>
-          <a:p>
-            <a:pPr algn="just"/>
-            <a:endParaRPr lang="en-US" sz="1400" dirty="0" smtClean="0">
-              <a:latin typeface="pt sans"/>
-            </a:endParaRPr>
           </a:p>
           <a:p>
             <a:pPr algn="just"/>
@@ -6728,47 +6897,29 @@
           </a:p>
           <a:p>
             <a:pPr algn="just"/>
-            <a:r>
-              <a:rPr lang="en-US" sz="1400" dirty="0" smtClean="0">
-                <a:latin typeface="pt sans"/>
-              </a:rPr>
-              <a:t>Similarly</a:t>
-            </a:r>
+            <a:endParaRPr lang="en-US" sz="1400" dirty="0">
+              <a:latin typeface="pt sans"/>
+            </a:endParaRPr>
+          </a:p>
+          <a:p>
+            <a:pPr algn="just"/>
             <a:r>
               <a:rPr lang="en-US" sz="1400" dirty="0">
                 <a:latin typeface="pt sans"/>
               </a:rPr>
-              <a:t>, if you find the </a:t>
+              <a:t>Similarly, if you find the </a:t>
             </a:r>
             <a:r>
               <a:rPr lang="en-US" sz="1400" i="1" u="sng" dirty="0">
                 <a:latin typeface="pt sans"/>
               </a:rPr>
-              <a:t>average of all of the </a:t>
-            </a:r>
-            <a:r>
-              <a:rPr lang="en-US" sz="1400" i="1" u="sng" dirty="0" smtClean="0">
-                <a:latin typeface="pt sans"/>
-              </a:rPr>
-              <a:t>standard deviations</a:t>
+              <a:t>average of all of the standard deviations</a:t>
             </a:r>
             <a:r>
               <a:rPr lang="en-US" sz="1400" dirty="0">
                 <a:latin typeface="pt sans"/>
               </a:rPr>
-              <a:t> in your </a:t>
-            </a:r>
-            <a:r>
-              <a:rPr lang="en-US" sz="1400" dirty="0" smtClean="0">
-                <a:latin typeface="pt sans"/>
-              </a:rPr>
-              <a:t>samples, </a:t>
-            </a:r>
-            <a:r>
-              <a:rPr lang="en-US" sz="1400" dirty="0">
-                <a:latin typeface="pt sans"/>
-              </a:rPr>
-              <a:t>you’ll find the </a:t>
+              <a:t> in your samples, you’ll find the </a:t>
             </a:r>
             <a:r>
               <a:rPr lang="en-US" sz="1400" b="1" dirty="0">
@@ -6894,7 +7045,7 @@
           <a:p>
             <a:pPr algn="ctr"/>
             <a:r>
-              <a:rPr lang="en-US" sz="2400" b="1" dirty="0" smtClean="0">
+              <a:rPr lang="en-US" sz="2400" b="1" dirty="0">
                 <a:solidFill>
                   <a:srgbClr val="00B0F0"/>
                 </a:solidFill>
@@ -6957,16 +7108,12 @@
             <a:pPr algn="just"/>
             <a:r>
               <a:rPr lang="en-US" sz="1200" dirty="0"/>
-              <a:t>An empirical rule stating that, for many reasonably symmetric unimodal distributions, almost all of the population lies within three standard deviations of the mean</a:t>
-            </a:r>
-            <a:r>
-              <a:rPr lang="en-US" sz="1200" dirty="0" smtClean="0"/>
-              <a:t>.</a:t>
+              <a:t>An empirical rule stating that, for many reasonably symmetric unimodal distributions, almost all of the population lies within three standard deviations of the mean.</a:t>
             </a:r>
           </a:p>
           <a:p>
             <a:pPr algn="just"/>
-            <a:endParaRPr lang="en-US" sz="1200" dirty="0" smtClean="0">
+            <a:endParaRPr lang="en-US" sz="1200" dirty="0">
               <a:solidFill>
                 <a:srgbClr val="222222"/>
               </a:solidFill>
@@ -6976,22 +7123,13 @@
           <a:p>
             <a:pPr algn="just"/>
             <a:r>
-              <a:rPr lang="en-US" sz="1200" dirty="0" smtClean="0">
-                <a:solidFill>
-                  <a:srgbClr val="222222"/>
-                </a:solidFill>
-                <a:latin typeface="Arial" panose="020B0604020202020204" pitchFamily="34" charset="0"/>
-              </a:rPr>
-              <a:t>In statistics, the</a:t>
-            </a:r>
-            <a:r>
               <a:rPr lang="en-US" sz="1200" dirty="0">
                 <a:solidFill>
                   <a:srgbClr val="222222"/>
                 </a:solidFill>
                 <a:latin typeface="Arial" panose="020B0604020202020204" pitchFamily="34" charset="0"/>
               </a:rPr>
-              <a:t> </a:t>
+              <a:t>In statistics, the </a:t>
             </a:r>
             <a:r>
               <a:rPr lang="en-US" sz="1200" b="1" dirty="0">
@@ -7000,25 +7138,7 @@
                 </a:solidFill>
                 <a:latin typeface="Arial" panose="020B0604020202020204" pitchFamily="34" charset="0"/>
               </a:rPr>
-              <a:t>empirical </a:t>
-            </a:r>
-            <a:r>
-              <a:rPr lang="en-US" sz="1200" b="1" dirty="0" smtClean="0">
-                <a:solidFill>
-                  <a:srgbClr val="222222"/>
-                </a:solidFill>
-                <a:latin typeface="Arial" panose="020B0604020202020204" pitchFamily="34" charset="0"/>
-              </a:rPr>
-              <a:t>rule</a:t>
-            </a:r>
-            <a:r>
-              <a:rPr lang="en-US" sz="1200" dirty="0" smtClean="0">
-                <a:solidFill>
-                  <a:srgbClr val="222222"/>
-                </a:solidFill>
-                <a:latin typeface="Arial" panose="020B0604020202020204" pitchFamily="34" charset="0"/>
-              </a:rPr>
-              <a:t> stipulates that the specific fraction of the population lies  within a band </a:t>
+              <a:t>empirical rule</a:t>
             </a:r>
             <a:r>
               <a:rPr lang="en-US" sz="1200" dirty="0">
@@ -7027,16 +7147,16 @@
                 </a:solidFill>
                 <a:latin typeface="Arial" panose="020B0604020202020204" pitchFamily="34" charset="0"/>
               </a:rPr>
-              <a:t>around the </a:t>
-            </a:r>
-            <a:r>
-              <a:rPr lang="en-US" sz="1200" dirty="0" smtClean="0">
+              <a:t> stipulates that the specific fraction of the population lies  within a band around the mean in a normal distribution</a:t>
+            </a:r>
+            <a:r>
+              <a:rPr lang="en-US" sz="1200" dirty="0">
                 <a:solidFill>
-                  <a:srgbClr val="222222"/>
+                  <a:srgbClr val="0B0080"/>
                 </a:solidFill>
                 <a:latin typeface="Arial" panose="020B0604020202020204" pitchFamily="34" charset="0"/>
               </a:rPr>
-              <a:t>mean</a:t>
+              <a:t> </a:t>
             </a:r>
             <a:r>
               <a:rPr lang="en-US" sz="1200" dirty="0">
@@ -7045,52 +7165,7 @@
                 </a:solidFill>
                 <a:latin typeface="Arial" panose="020B0604020202020204" pitchFamily="34" charset="0"/>
               </a:rPr>
-              <a:t> in a </a:t>
-            </a:r>
-            <a:r>
-              <a:rPr lang="en-US" sz="1200" dirty="0" smtClean="0">
-                <a:solidFill>
-                  <a:srgbClr val="222222"/>
-                </a:solidFill>
-                <a:latin typeface="Arial" panose="020B0604020202020204" pitchFamily="34" charset="0"/>
-              </a:rPr>
-              <a:t>normal distribution</a:t>
-            </a:r>
-            <a:r>
-              <a:rPr lang="en-US" sz="1200" dirty="0" smtClean="0">
-                <a:solidFill>
-                  <a:srgbClr val="0B0080"/>
-                </a:solidFill>
-                <a:latin typeface="Arial" panose="020B0604020202020204" pitchFamily="34" charset="0"/>
-              </a:rPr>
-              <a:t> </a:t>
-            </a:r>
-            <a:r>
-              <a:rPr lang="en-US" sz="1200" dirty="0" smtClean="0">
-                <a:solidFill>
-                  <a:srgbClr val="222222"/>
-                </a:solidFill>
-                <a:latin typeface="Arial" panose="020B0604020202020204" pitchFamily="34" charset="0"/>
-              </a:rPr>
-              <a:t>with </a:t>
-            </a:r>
-            <a:r>
-              <a:rPr lang="en-US" sz="1200" dirty="0">
-                <a:solidFill>
-                  <a:srgbClr val="222222"/>
-                </a:solidFill>
-                <a:latin typeface="Arial" panose="020B0604020202020204" pitchFamily="34" charset="0"/>
-              </a:rPr>
-              <a:t>a width of two, four and six </a:t>
-            </a:r>
-            <a:r>
-              <a:rPr lang="en-US" sz="1200" dirty="0" smtClean="0">
-                <a:solidFill>
-                  <a:srgbClr val="222222"/>
-                </a:solidFill>
-                <a:latin typeface="Arial" panose="020B0604020202020204" pitchFamily="34" charset="0"/>
-              </a:rPr>
-              <a:t>standard deviations. </a:t>
+              <a:t>with a width of two, four and six standard deviations. </a:t>
             </a:r>
             <a:endParaRPr lang="ru-RU" sz="1200" dirty="0"/>
           </a:p>
@@ -7123,30 +7198,18 @@
               </a:rPr>
               <a:t>https://www.oxfordreference.com/view/10.1093/oi/authority.20110803104447825</a:t>
             </a:r>
-            <a:endParaRPr lang="en-US" sz="1100" dirty="0" smtClean="0">
+            <a:endParaRPr lang="en-US" sz="1100" dirty="0">
               <a:hlinkClick r:id="rId4"/>
             </a:endParaRPr>
           </a:p>
           <a:p>
             <a:r>
-              <a:rPr lang="en-US" sz="1100" dirty="0" smtClean="0">
-                <a:hlinkClick r:id="rId4"/>
-              </a:rPr>
-              <a:t>https</a:t>
-            </a:r>
-            <a:r>
               <a:rPr lang="en-US" sz="1100" dirty="0">
                 <a:hlinkClick r:id="rId4"/>
               </a:rPr>
-              <a:t>://</a:t>
-            </a:r>
-            <a:r>
-              <a:rPr lang="en-US" sz="1100" dirty="0" smtClean="0">
-                <a:hlinkClick r:id="rId4"/>
-              </a:rPr>
-              <a:t>en.wikipedia.org/wiki/68%E2%80%9395%E2%80%9399.7_rule</a:t>
-            </a:r>
-            <a:endParaRPr lang="en-US" sz="1100" dirty="0" smtClean="0"/>
+              <a:t>https://en.wikipedia.org/wiki/68%E2%80%9395%E2%80%9399.7_rule</a:t>
+            </a:r>
+            <a:endParaRPr lang="en-US" sz="1100" dirty="0"/>
           </a:p>
           <a:p>
             <a:r>

</xml_diff>

<commit_message>
Poisson and exponential distributions are added.
</commit_message>
<xml_diff>
--- a/Distributions.pptx
+++ b/Distributions.pptx
@@ -5,7 +5,7 @@
     <p:sldMasterId id="2147483660" r:id="rId1"/>
   </p:sldMasterIdLst>
   <p:notesMasterIdLst>
-    <p:notesMasterId r:id="rId16"/>
+    <p:notesMasterId r:id="rId18"/>
   </p:notesMasterIdLst>
   <p:sldIdLst>
     <p:sldId id="257" r:id="rId2"/>
@@ -22,6 +22,8 @@
     <p:sldId id="267" r:id="rId13"/>
     <p:sldId id="268" r:id="rId14"/>
     <p:sldId id="269" r:id="rId15"/>
+    <p:sldId id="271" r:id="rId16"/>
+    <p:sldId id="270" r:id="rId17"/>
   </p:sldIdLst>
   <p:sldSz cx="9144000" cy="6858000" type="screen4x3"/>
   <p:notesSz cx="6858000" cy="9144000"/>
@@ -222,7 +224,7 @@
           <a:p>
             <a:fld id="{CD863C69-6AC4-4515-84BB-C614EE551B82}" type="datetimeFigureOut">
               <a:rPr lang="ru-RU" smtClean="0"/>
-              <a:t>25.07.2019</a:t>
+              <a:t>26.07.2019</a:t>
             </a:fld>
             <a:endParaRPr lang="ru-RU"/>
           </a:p>
@@ -620,7 +622,7 @@
           <a:p>
             <a:fld id="{BF38C05E-219E-4729-9909-5B693F1E4DB2}" type="datetime1">
               <a:rPr lang="ru-RU" smtClean="0"/>
-              <a:t>25.07.2019</a:t>
+              <a:t>26.07.2019</a:t>
             </a:fld>
             <a:endParaRPr lang="ru-RU"/>
           </a:p>
@@ -790,7 +792,7 @@
           <a:p>
             <a:fld id="{E587BD1D-74D3-449F-A3CA-F47BBACDADC1}" type="datetime1">
               <a:rPr lang="ru-RU" smtClean="0"/>
-              <a:t>25.07.2019</a:t>
+              <a:t>26.07.2019</a:t>
             </a:fld>
             <a:endParaRPr lang="ru-RU"/>
           </a:p>
@@ -970,7 +972,7 @@
           <a:p>
             <a:fld id="{F156E365-3C59-403F-A598-8903968D44C1}" type="datetime1">
               <a:rPr lang="ru-RU" smtClean="0"/>
-              <a:t>25.07.2019</a:t>
+              <a:t>26.07.2019</a:t>
             </a:fld>
             <a:endParaRPr lang="ru-RU"/>
           </a:p>
@@ -1140,7 +1142,7 @@
           <a:p>
             <a:fld id="{D71D973D-7295-497C-A5AE-B81A0C1EA542}" type="datetime1">
               <a:rPr lang="ru-RU" smtClean="0"/>
-              <a:t>25.07.2019</a:t>
+              <a:t>26.07.2019</a:t>
             </a:fld>
             <a:endParaRPr lang="ru-RU"/>
           </a:p>
@@ -1384,7 +1386,7 @@
           <a:p>
             <a:fld id="{D43ACA65-1DF0-4542-9513-2573006F2B09}" type="datetime1">
               <a:rPr lang="ru-RU" smtClean="0"/>
-              <a:t>25.07.2019</a:t>
+              <a:t>26.07.2019</a:t>
             </a:fld>
             <a:endParaRPr lang="ru-RU"/>
           </a:p>
@@ -1616,7 +1618,7 @@
           <a:p>
             <a:fld id="{CE5D4F0D-BE92-42E2-AC19-D4AE919B8EEA}" type="datetime1">
               <a:rPr lang="ru-RU" smtClean="0"/>
-              <a:t>25.07.2019</a:t>
+              <a:t>26.07.2019</a:t>
             </a:fld>
             <a:endParaRPr lang="ru-RU"/>
           </a:p>
@@ -1983,7 +1985,7 @@
           <a:p>
             <a:fld id="{31712A4F-404C-4E2A-B048-29FEE1F56BCC}" type="datetime1">
               <a:rPr lang="ru-RU" smtClean="0"/>
-              <a:t>25.07.2019</a:t>
+              <a:t>26.07.2019</a:t>
             </a:fld>
             <a:endParaRPr lang="ru-RU"/>
           </a:p>
@@ -2101,7 +2103,7 @@
           <a:p>
             <a:fld id="{A591E32F-21C9-4A73-9D8C-CB8422C8AD99}" type="datetime1">
               <a:rPr lang="ru-RU" smtClean="0"/>
-              <a:t>25.07.2019</a:t>
+              <a:t>26.07.2019</a:t>
             </a:fld>
             <a:endParaRPr lang="ru-RU"/>
           </a:p>
@@ -2196,7 +2198,7 @@
           <a:p>
             <a:fld id="{E8BE7035-4758-4463-AF71-B436150BF40F}" type="datetime1">
               <a:rPr lang="ru-RU" smtClean="0"/>
-              <a:t>25.07.2019</a:t>
+              <a:t>26.07.2019</a:t>
             </a:fld>
             <a:endParaRPr lang="ru-RU"/>
           </a:p>
@@ -2473,7 +2475,7 @@
           <a:p>
             <a:fld id="{8BF22BB4-229E-48DC-A891-0BD3792CC568}" type="datetime1">
               <a:rPr lang="ru-RU" smtClean="0"/>
-              <a:t>25.07.2019</a:t>
+              <a:t>26.07.2019</a:t>
             </a:fld>
             <a:endParaRPr lang="ru-RU"/>
           </a:p>
@@ -2730,7 +2732,7 @@
           <a:p>
             <a:fld id="{B32F65DE-1A63-4DFF-816D-2C4DB2F0AABF}" type="datetime1">
               <a:rPr lang="ru-RU" smtClean="0"/>
-              <a:t>25.07.2019</a:t>
+              <a:t>26.07.2019</a:t>
             </a:fld>
             <a:endParaRPr lang="ru-RU"/>
           </a:p>
@@ -2943,7 +2945,7 @@
           <a:p>
             <a:fld id="{58F37F58-E97F-4EAB-9CA9-C9A7312871A5}" type="datetime1">
               <a:rPr lang="ru-RU" smtClean="0"/>
-              <a:t>25.07.2019</a:t>
+              <a:t>26.07.2019</a:t>
             </a:fld>
             <a:endParaRPr lang="ru-RU"/>
           </a:p>
@@ -5148,6 +5150,659 @@
     <p:extLst>
       <p:ext uri="{BB962C8B-B14F-4D97-AF65-F5344CB8AC3E}">
         <p14:creationId xmlns:p14="http://schemas.microsoft.com/office/powerpoint/2010/main" val="1563761418"/>
+      </p:ext>
+    </p:extLst>
+  </p:cSld>
+  <p:clrMapOvr>
+    <a:masterClrMapping/>
+  </p:clrMapOvr>
+</p:sld>
+</file>
+
+<file path=ppt/slides/slide15.xml><?xml version="1.0" encoding="utf-8"?>
+<p:sld xmlns:a="http://schemas.openxmlformats.org/drawingml/2006/main" xmlns:r="http://schemas.openxmlformats.org/officeDocument/2006/relationships" xmlns:p="http://schemas.openxmlformats.org/presentationml/2006/main">
+  <p:cSld>
+    <p:spTree>
+      <p:nvGrpSpPr>
+        <p:cNvPr id="1" name=""/>
+        <p:cNvGrpSpPr/>
+        <p:nvPr/>
+      </p:nvGrpSpPr>
+      <p:grpSpPr>
+        <a:xfrm>
+          <a:off x="0" y="0"/>
+          <a:ext cx="0" cy="0"/>
+          <a:chOff x="0" y="0"/>
+          <a:chExt cx="0" cy="0"/>
+        </a:xfrm>
+      </p:grpSpPr>
+      <p:sp>
+        <p:nvSpPr>
+          <p:cNvPr id="4" name="Slide Number Placeholder 3">
+            <a:extLst>
+              <a:ext uri="{FF2B5EF4-FFF2-40B4-BE49-F238E27FC236}">
+                <a16:creationId xmlns:a16="http://schemas.microsoft.com/office/drawing/2014/main" id="{A48DD153-8E18-42B7-99CE-1D9A19873F6D}"/>
+              </a:ext>
+            </a:extLst>
+          </p:cNvPr>
+          <p:cNvSpPr>
+            <a:spLocks noGrp="1"/>
+          </p:cNvSpPr>
+          <p:nvPr>
+            <p:ph type="sldNum" sz="quarter" idx="12"/>
+          </p:nvPr>
+        </p:nvSpPr>
+        <p:spPr/>
+        <p:txBody>
+          <a:bodyPr/>
+          <a:lstStyle/>
+          <a:p>
+            <a:fld id="{C936BD1D-689F-4FB2-8C94-2D2423F07E62}" type="slidenum">
+              <a:rPr lang="ru-RU" smtClean="0"/>
+              <a:t>15</a:t>
+            </a:fld>
+            <a:endParaRPr lang="ru-RU"/>
+          </a:p>
+        </p:txBody>
+      </p:sp>
+      <p:sp>
+        <p:nvSpPr>
+          <p:cNvPr id="5" name="Заголовок 1">
+            <a:extLst>
+              <a:ext uri="{FF2B5EF4-FFF2-40B4-BE49-F238E27FC236}">
+                <a16:creationId xmlns:a16="http://schemas.microsoft.com/office/drawing/2014/main" id="{BE566B2C-FB9D-4128-94AB-57542513831A}"/>
+              </a:ext>
+            </a:extLst>
+          </p:cNvPr>
+          <p:cNvSpPr>
+            <a:spLocks noGrp="1"/>
+          </p:cNvSpPr>
+          <p:nvPr>
+            <p:ph type="title"/>
+          </p:nvPr>
+        </p:nvSpPr>
+        <p:spPr>
+          <a:xfrm>
+            <a:off x="424464" y="63285"/>
+            <a:ext cx="7886700" cy="315911"/>
+          </a:xfrm>
+        </p:spPr>
+        <p:txBody>
+          <a:bodyPr vert="horz" lIns="91440" tIns="45720" rIns="91440" bIns="45720" rtlCol="0" anchor="ctr">
+            <a:normAutofit fontScale="90000"/>
+          </a:bodyPr>
+          <a:lstStyle/>
+          <a:p>
+            <a:pPr algn="ctr"/>
+            <a:r>
+              <a:rPr lang="en-US" sz="2400" b="1" dirty="0">
+                <a:solidFill>
+                  <a:srgbClr val="00B0F0"/>
+                </a:solidFill>
+              </a:rPr>
+              <a:t>Poisson Distribution</a:t>
+            </a:r>
+            <a:endParaRPr lang="ru-RU" sz="2400" b="1" dirty="0">
+              <a:solidFill>
+                <a:srgbClr val="00B0F0"/>
+              </a:solidFill>
+            </a:endParaRPr>
+          </a:p>
+        </p:txBody>
+      </p:sp>
+      <p:pic>
+        <p:nvPicPr>
+          <p:cNvPr id="6" name="Picture 5">
+            <a:extLst>
+              <a:ext uri="{FF2B5EF4-FFF2-40B4-BE49-F238E27FC236}">
+                <a16:creationId xmlns:a16="http://schemas.microsoft.com/office/drawing/2014/main" id="{AC11D1EF-8DB4-402F-8FF0-1EC9BC664353}"/>
+              </a:ext>
+            </a:extLst>
+          </p:cNvPr>
+          <p:cNvPicPr>
+            <a:picLocks noChangeAspect="1"/>
+          </p:cNvPicPr>
+          <p:nvPr/>
+        </p:nvPicPr>
+        <p:blipFill>
+          <a:blip r:embed="rId2"/>
+          <a:stretch>
+            <a:fillRect/>
+          </a:stretch>
+        </p:blipFill>
+        <p:spPr>
+          <a:xfrm>
+            <a:off x="170380" y="379196"/>
+            <a:ext cx="3876675" cy="4657725"/>
+          </a:xfrm>
+          <a:prstGeom prst="rect">
+            <a:avLst/>
+          </a:prstGeom>
+        </p:spPr>
+      </p:pic>
+      <p:pic>
+        <p:nvPicPr>
+          <p:cNvPr id="7" name="Picture 6">
+            <a:extLst>
+              <a:ext uri="{FF2B5EF4-FFF2-40B4-BE49-F238E27FC236}">
+                <a16:creationId xmlns:a16="http://schemas.microsoft.com/office/drawing/2014/main" id="{4C972E4E-B5AC-4D3C-B97D-DB7CBED31D26}"/>
+              </a:ext>
+            </a:extLst>
+          </p:cNvPr>
+          <p:cNvPicPr>
+            <a:picLocks noChangeAspect="1"/>
+          </p:cNvPicPr>
+          <p:nvPr/>
+        </p:nvPicPr>
+        <p:blipFill>
+          <a:blip r:embed="rId3"/>
+          <a:stretch>
+            <a:fillRect/>
+          </a:stretch>
+        </p:blipFill>
+        <p:spPr>
+          <a:xfrm>
+            <a:off x="4097299" y="633303"/>
+            <a:ext cx="4972056" cy="2074755"/>
+          </a:xfrm>
+          <a:prstGeom prst="rect">
+            <a:avLst/>
+          </a:prstGeom>
+        </p:spPr>
+      </p:pic>
+      <p:sp>
+        <p:nvSpPr>
+          <p:cNvPr id="8" name="Rectangle 7">
+            <a:extLst>
+              <a:ext uri="{FF2B5EF4-FFF2-40B4-BE49-F238E27FC236}">
+                <a16:creationId xmlns:a16="http://schemas.microsoft.com/office/drawing/2014/main" id="{9C39D50F-795B-41BF-A4A8-FF4B2CA95483}"/>
+              </a:ext>
+            </a:extLst>
+          </p:cNvPr>
+          <p:cNvSpPr/>
+          <p:nvPr/>
+        </p:nvSpPr>
+        <p:spPr>
+          <a:xfrm>
+            <a:off x="4047055" y="2962165"/>
+            <a:ext cx="4972055" cy="646331"/>
+          </a:xfrm>
+          <a:prstGeom prst="rect">
+            <a:avLst/>
+          </a:prstGeom>
+        </p:spPr>
+        <p:txBody>
+          <a:bodyPr wrap="square">
+            <a:spAutoFit/>
+          </a:bodyPr>
+          <a:lstStyle/>
+          <a:p>
+            <a:r>
+              <a:rPr lang="en-US" sz="1200" dirty="0">
+                <a:hlinkClick r:id="rId4"/>
+              </a:rPr>
+              <a:t>https://corporatefinanceinstitute.com/resources/knowledge/other/poisson-distribution/</a:t>
+            </a:r>
+            <a:endParaRPr lang="en-US" sz="1200" dirty="0"/>
+          </a:p>
+          <a:p>
+            <a:r>
+              <a:rPr lang="en-US" sz="1200" dirty="0">
+                <a:hlinkClick r:id="rId5"/>
+              </a:rPr>
+              <a:t>https://en.wikipedia.org/wiki/Poisson_distribution</a:t>
+            </a:r>
+            <a:endParaRPr lang="en-US" sz="1200" dirty="0"/>
+          </a:p>
+        </p:txBody>
+      </p:sp>
+    </p:spTree>
+    <p:extLst>
+      <p:ext uri="{BB962C8B-B14F-4D97-AF65-F5344CB8AC3E}">
+        <p14:creationId xmlns:p14="http://schemas.microsoft.com/office/powerpoint/2010/main" val="3741169717"/>
+      </p:ext>
+    </p:extLst>
+  </p:cSld>
+  <p:clrMapOvr>
+    <a:masterClrMapping/>
+  </p:clrMapOvr>
+</p:sld>
+</file>
+
+<file path=ppt/slides/slide16.xml><?xml version="1.0" encoding="utf-8"?>
+<p:sld xmlns:a="http://schemas.openxmlformats.org/drawingml/2006/main" xmlns:r="http://schemas.openxmlformats.org/officeDocument/2006/relationships" xmlns:p="http://schemas.openxmlformats.org/presentationml/2006/main">
+  <p:cSld>
+    <p:spTree>
+      <p:nvGrpSpPr>
+        <p:cNvPr id="1" name=""/>
+        <p:cNvGrpSpPr/>
+        <p:nvPr/>
+      </p:nvGrpSpPr>
+      <p:grpSpPr>
+        <a:xfrm>
+          <a:off x="0" y="0"/>
+          <a:ext cx="0" cy="0"/>
+          <a:chOff x="0" y="0"/>
+          <a:chExt cx="0" cy="0"/>
+        </a:xfrm>
+      </p:grpSpPr>
+      <p:sp>
+        <p:nvSpPr>
+          <p:cNvPr id="4" name="Slide Number Placeholder 3">
+            <a:extLst>
+              <a:ext uri="{FF2B5EF4-FFF2-40B4-BE49-F238E27FC236}">
+                <a16:creationId xmlns:a16="http://schemas.microsoft.com/office/drawing/2014/main" id="{A961D9F6-E29C-436D-AEE9-F2C2C51413F4}"/>
+              </a:ext>
+            </a:extLst>
+          </p:cNvPr>
+          <p:cNvSpPr>
+            <a:spLocks noGrp="1"/>
+          </p:cNvSpPr>
+          <p:nvPr>
+            <p:ph type="sldNum" sz="quarter" idx="12"/>
+          </p:nvPr>
+        </p:nvSpPr>
+        <p:spPr/>
+        <p:txBody>
+          <a:bodyPr/>
+          <a:lstStyle/>
+          <a:p>
+            <a:fld id="{C936BD1D-689F-4FB2-8C94-2D2423F07E62}" type="slidenum">
+              <a:rPr lang="ru-RU" smtClean="0"/>
+              <a:t>16</a:t>
+            </a:fld>
+            <a:endParaRPr lang="ru-RU"/>
+          </a:p>
+        </p:txBody>
+      </p:sp>
+      <p:sp>
+        <p:nvSpPr>
+          <p:cNvPr id="5" name="Заголовок 1">
+            <a:extLst>
+              <a:ext uri="{FF2B5EF4-FFF2-40B4-BE49-F238E27FC236}">
+                <a16:creationId xmlns:a16="http://schemas.microsoft.com/office/drawing/2014/main" id="{1FA74852-421A-4D53-877F-561791F4B39C}"/>
+              </a:ext>
+            </a:extLst>
+          </p:cNvPr>
+          <p:cNvSpPr txBox="1">
+            <a:spLocks/>
+          </p:cNvSpPr>
+          <p:nvPr/>
+        </p:nvSpPr>
+        <p:spPr>
+          <a:xfrm>
+            <a:off x="424464" y="63285"/>
+            <a:ext cx="7886700" cy="315911"/>
+          </a:xfrm>
+          <a:prstGeom prst="rect">
+            <a:avLst/>
+          </a:prstGeom>
+        </p:spPr>
+        <p:txBody>
+          <a:bodyPr vert="horz" lIns="91440" tIns="45720" rIns="91440" bIns="45720" rtlCol="0" anchor="ctr">
+            <a:normAutofit fontScale="75000" lnSpcReduction="20000"/>
+          </a:bodyPr>
+          <a:lstStyle>
+            <a:lvl1pPr algn="l" defTabSz="914400" rtl="0" eaLnBrk="1" latinLnBrk="0" hangingPunct="1">
+              <a:lnSpc>
+                <a:spcPct val="90000"/>
+              </a:lnSpc>
+              <a:spcBef>
+                <a:spcPct val="0"/>
+              </a:spcBef>
+              <a:buNone/>
+              <a:defRPr sz="4400" kern="1200">
+                <a:solidFill>
+                  <a:schemeClr val="tx1"/>
+                </a:solidFill>
+                <a:latin typeface="+mj-lt"/>
+                <a:ea typeface="+mj-ea"/>
+                <a:cs typeface="+mj-cs"/>
+              </a:defRPr>
+            </a:lvl1pPr>
+          </a:lstStyle>
+          <a:p>
+            <a:pPr algn="ctr"/>
+            <a:r>
+              <a:rPr lang="en-US" sz="2400" b="1" dirty="0">
+                <a:solidFill>
+                  <a:srgbClr val="00B0F0"/>
+                </a:solidFill>
+              </a:rPr>
+              <a:t>Exponential Distribution</a:t>
+            </a:r>
+            <a:endParaRPr lang="ru-RU" sz="2400" b="1" dirty="0">
+              <a:solidFill>
+                <a:srgbClr val="00B0F0"/>
+              </a:solidFill>
+            </a:endParaRPr>
+          </a:p>
+        </p:txBody>
+      </p:sp>
+      <p:pic>
+        <p:nvPicPr>
+          <p:cNvPr id="6" name="Picture 5">
+            <a:extLst>
+              <a:ext uri="{FF2B5EF4-FFF2-40B4-BE49-F238E27FC236}">
+                <a16:creationId xmlns:a16="http://schemas.microsoft.com/office/drawing/2014/main" id="{1612815A-C907-424E-A4F6-174E1BD9AB84}"/>
+              </a:ext>
+            </a:extLst>
+          </p:cNvPr>
+          <p:cNvPicPr>
+            <a:picLocks noChangeAspect="1"/>
+          </p:cNvPicPr>
+          <p:nvPr/>
+        </p:nvPicPr>
+        <p:blipFill>
+          <a:blip r:embed="rId2"/>
+          <a:stretch>
+            <a:fillRect/>
+          </a:stretch>
+        </p:blipFill>
+        <p:spPr>
+          <a:xfrm>
+            <a:off x="236472" y="538648"/>
+            <a:ext cx="3800475" cy="2533650"/>
+          </a:xfrm>
+          <a:prstGeom prst="rect">
+            <a:avLst/>
+          </a:prstGeom>
+        </p:spPr>
+      </p:pic>
+      <p:pic>
+        <p:nvPicPr>
+          <p:cNvPr id="7" name="Picture 6">
+            <a:extLst>
+              <a:ext uri="{FF2B5EF4-FFF2-40B4-BE49-F238E27FC236}">
+                <a16:creationId xmlns:a16="http://schemas.microsoft.com/office/drawing/2014/main" id="{EA20794C-8664-49AC-B04F-F3871300F946}"/>
+              </a:ext>
+            </a:extLst>
+          </p:cNvPr>
+          <p:cNvPicPr>
+            <a:picLocks noChangeAspect="1"/>
+          </p:cNvPicPr>
+          <p:nvPr/>
+        </p:nvPicPr>
+        <p:blipFill>
+          <a:blip r:embed="rId3"/>
+          <a:stretch>
+            <a:fillRect/>
+          </a:stretch>
+        </p:blipFill>
+        <p:spPr>
+          <a:xfrm>
+            <a:off x="4036947" y="675205"/>
+            <a:ext cx="2514600" cy="581025"/>
+          </a:xfrm>
+          <a:prstGeom prst="rect">
+            <a:avLst/>
+          </a:prstGeom>
+        </p:spPr>
+      </p:pic>
+      <p:sp>
+        <p:nvSpPr>
+          <p:cNvPr id="8" name="TextBox 7">
+            <a:extLst>
+              <a:ext uri="{FF2B5EF4-FFF2-40B4-BE49-F238E27FC236}">
+                <a16:creationId xmlns:a16="http://schemas.microsoft.com/office/drawing/2014/main" id="{FEB03536-28DC-4114-B65A-FFE2079C62C7}"/>
+              </a:ext>
+            </a:extLst>
+          </p:cNvPr>
+          <p:cNvSpPr txBox="1"/>
+          <p:nvPr/>
+        </p:nvSpPr>
+        <p:spPr>
+          <a:xfrm>
+            <a:off x="4036947" y="1474237"/>
+            <a:ext cx="4948433" cy="646331"/>
+          </a:xfrm>
+          <a:prstGeom prst="rect">
+            <a:avLst/>
+          </a:prstGeom>
+          <a:noFill/>
+        </p:spPr>
+        <p:txBody>
+          <a:bodyPr wrap="square" rtlCol="0">
+            <a:spAutoFit/>
+          </a:bodyPr>
+          <a:lstStyle/>
+          <a:p>
+            <a:r>
+              <a:rPr lang="en-US" dirty="0"/>
+              <a:t>where </a:t>
+            </a:r>
+            <a:r>
+              <a:rPr lang="el-GR" dirty="0">
+                <a:solidFill>
+                  <a:srgbClr val="FF0000"/>
+                </a:solidFill>
+              </a:rPr>
+              <a:t>λ</a:t>
+            </a:r>
+            <a:r>
+              <a:rPr lang="en-US" dirty="0"/>
+              <a:t> – parameter rate, </a:t>
+            </a:r>
+            <a:r>
+              <a:rPr lang="en-US" dirty="0">
+                <a:solidFill>
+                  <a:srgbClr val="FF0000"/>
+                </a:solidFill>
+              </a:rPr>
+              <a:t>x</a:t>
+            </a:r>
+            <a:r>
+              <a:rPr lang="en-US" dirty="0"/>
+              <a:t> – random variable</a:t>
+            </a:r>
+          </a:p>
+          <a:p>
+            <a:endParaRPr lang="en-US" dirty="0"/>
+          </a:p>
+        </p:txBody>
+      </p:sp>
+      <p:sp>
+        <p:nvSpPr>
+          <p:cNvPr id="9" name="Rectangle 8">
+            <a:extLst>
+              <a:ext uri="{FF2B5EF4-FFF2-40B4-BE49-F238E27FC236}">
+                <a16:creationId xmlns:a16="http://schemas.microsoft.com/office/drawing/2014/main" id="{427E1FCA-FD16-45AA-9073-978D654F94F0}"/>
+              </a:ext>
+            </a:extLst>
+          </p:cNvPr>
+          <p:cNvSpPr/>
+          <p:nvPr/>
+        </p:nvSpPr>
+        <p:spPr>
+          <a:xfrm>
+            <a:off x="236472" y="3028157"/>
+            <a:ext cx="8966717" cy="3416320"/>
+          </a:xfrm>
+          <a:prstGeom prst="rect">
+            <a:avLst/>
+          </a:prstGeom>
+        </p:spPr>
+        <p:txBody>
+          <a:bodyPr wrap="square">
+            <a:spAutoFit/>
+          </a:bodyPr>
+          <a:lstStyle/>
+          <a:p>
+            <a:r>
+              <a:rPr lang="en-US" dirty="0">
+                <a:solidFill>
+                  <a:srgbClr val="000000"/>
+                </a:solidFill>
+                <a:latin typeface="Arial" panose="020B0604020202020204" pitchFamily="34" charset="0"/>
+              </a:rPr>
+              <a:t>The exponential distribution occurs naturally when describing the waiting time in a homogeneous Poisson process. </a:t>
+            </a:r>
+          </a:p>
+          <a:p>
+            <a:endParaRPr lang="en-US" dirty="0">
+              <a:solidFill>
+                <a:srgbClr val="000000"/>
+              </a:solidFill>
+              <a:latin typeface="Arial" panose="020B0604020202020204" pitchFamily="34" charset="0"/>
+            </a:endParaRPr>
+          </a:p>
+          <a:p>
+            <a:r>
+              <a:rPr lang="en-US" dirty="0">
+                <a:solidFill>
+                  <a:srgbClr val="000000"/>
+                </a:solidFill>
+                <a:latin typeface="Arial" panose="020B0604020202020204" pitchFamily="34" charset="0"/>
+              </a:rPr>
+              <a:t>It can be used in a range of disciplines including queuing theory, physics, reliability theory, and hydrology.</a:t>
+            </a:r>
+          </a:p>
+          <a:p>
+            <a:endParaRPr lang="en-US" dirty="0">
+              <a:solidFill>
+                <a:srgbClr val="000000"/>
+              </a:solidFill>
+              <a:latin typeface="Arial" panose="020B0604020202020204" pitchFamily="34" charset="0"/>
+            </a:endParaRPr>
+          </a:p>
+          <a:p>
+            <a:r>
+              <a:rPr lang="en-US" b="1" dirty="0">
+                <a:solidFill>
+                  <a:srgbClr val="000000"/>
+                </a:solidFill>
+                <a:latin typeface="Arial" panose="020B0604020202020204" pitchFamily="34" charset="0"/>
+              </a:rPr>
+              <a:t>Examples</a:t>
+            </a:r>
+            <a:r>
+              <a:rPr lang="en-US" dirty="0">
+                <a:solidFill>
+                  <a:srgbClr val="000000"/>
+                </a:solidFill>
+                <a:latin typeface="Arial" panose="020B0604020202020204" pitchFamily="34" charset="0"/>
+              </a:rPr>
+              <a:t> of events that may be modeled by exponential distribution include:</a:t>
+            </a:r>
+          </a:p>
+          <a:p>
+            <a:pPr>
+              <a:buFont typeface="Arial" panose="020B0604020202020204" pitchFamily="34" charset="0"/>
+              <a:buChar char="•"/>
+            </a:pPr>
+            <a:r>
+              <a:rPr lang="en-US" dirty="0">
+                <a:solidFill>
+                  <a:srgbClr val="000000"/>
+                </a:solidFill>
+                <a:latin typeface="Arial" panose="020B0604020202020204" pitchFamily="34" charset="0"/>
+              </a:rPr>
+              <a:t> time until a radioactive particle decays</a:t>
+            </a:r>
+          </a:p>
+          <a:p>
+            <a:pPr>
+              <a:buFont typeface="Arial" panose="020B0604020202020204" pitchFamily="34" charset="0"/>
+              <a:buChar char="•"/>
+            </a:pPr>
+            <a:r>
+              <a:rPr lang="en-US" dirty="0">
+                <a:solidFill>
+                  <a:srgbClr val="000000"/>
+                </a:solidFill>
+                <a:latin typeface="Arial" panose="020B0604020202020204" pitchFamily="34" charset="0"/>
+              </a:rPr>
+              <a:t> time between clicks of a Geiger counter</a:t>
+            </a:r>
+          </a:p>
+          <a:p>
+            <a:pPr>
+              <a:buFont typeface="Arial" panose="020B0604020202020204" pitchFamily="34" charset="0"/>
+              <a:buChar char="•"/>
+            </a:pPr>
+            <a:r>
+              <a:rPr lang="en-US" dirty="0">
+                <a:solidFill>
+                  <a:srgbClr val="000000"/>
+                </a:solidFill>
+                <a:latin typeface="Arial" panose="020B0604020202020204" pitchFamily="34" charset="0"/>
+              </a:rPr>
+              <a:t> time until default on payment to company debt holders</a:t>
+            </a:r>
+          </a:p>
+          <a:p>
+            <a:pPr>
+              <a:buFont typeface="Arial" panose="020B0604020202020204" pitchFamily="34" charset="0"/>
+              <a:buChar char="•"/>
+            </a:pPr>
+            <a:r>
+              <a:rPr lang="en-US" dirty="0">
+                <a:solidFill>
+                  <a:srgbClr val="000000"/>
+                </a:solidFill>
+                <a:latin typeface="Arial" panose="020B0604020202020204" pitchFamily="34" charset="0"/>
+              </a:rPr>
+              <a:t> distance between mutations on a DNA strand</a:t>
+            </a:r>
+          </a:p>
+          <a:p>
+            <a:pPr>
+              <a:buFont typeface="Arial" panose="020B0604020202020204" pitchFamily="34" charset="0"/>
+              <a:buChar char="•"/>
+            </a:pPr>
+            <a:r>
+              <a:rPr lang="en-US" dirty="0">
+                <a:solidFill>
+                  <a:srgbClr val="000000"/>
+                </a:solidFill>
+                <a:latin typeface="Arial" panose="020B0604020202020204" pitchFamily="34" charset="0"/>
+              </a:rPr>
+              <a:t> time it takes for a bank teller to serve a customer</a:t>
+            </a:r>
+          </a:p>
+        </p:txBody>
+      </p:sp>
+      <p:sp>
+        <p:nvSpPr>
+          <p:cNvPr id="10" name="Rectangle 9">
+            <a:extLst>
+              <a:ext uri="{FF2B5EF4-FFF2-40B4-BE49-F238E27FC236}">
+                <a16:creationId xmlns:a16="http://schemas.microsoft.com/office/drawing/2014/main" id="{2CCC2379-EDBF-4F87-BF47-99508DB77396}"/>
+              </a:ext>
+            </a:extLst>
+          </p:cNvPr>
+          <p:cNvSpPr/>
+          <p:nvPr/>
+        </p:nvSpPr>
+        <p:spPr>
+          <a:xfrm>
+            <a:off x="236472" y="6538913"/>
+            <a:ext cx="8518849" cy="369332"/>
+          </a:xfrm>
+          <a:prstGeom prst="rect">
+            <a:avLst/>
+          </a:prstGeom>
+        </p:spPr>
+        <p:txBody>
+          <a:bodyPr wrap="square">
+            <a:spAutoFit/>
+          </a:bodyPr>
+          <a:lstStyle/>
+          <a:p>
+            <a:r>
+              <a:rPr lang="en-US" dirty="0">
+                <a:hlinkClick r:id="rId4"/>
+              </a:rPr>
+              <a:t>http://wiki.stat.ucla.edu/socr/index.php/AP_Statistics_Curriculum_2007_Exponential</a:t>
+            </a:r>
+            <a:endParaRPr lang="en-US" dirty="0"/>
+          </a:p>
+        </p:txBody>
+      </p:sp>
+    </p:spTree>
+    <p:extLst>
+      <p:ext uri="{BB962C8B-B14F-4D97-AF65-F5344CB8AC3E}">
+        <p14:creationId xmlns:p14="http://schemas.microsoft.com/office/powerpoint/2010/main" val="1787590485"/>
       </p:ext>
     </p:extLst>
   </p:cSld>

</xml_diff>

<commit_message>
all distributions are added.
</commit_message>
<xml_diff>
--- a/Distributions.pptx
+++ b/Distributions.pptx
@@ -5,7 +5,7 @@
     <p:sldMasterId id="2147483660" r:id="rId1"/>
   </p:sldMasterIdLst>
   <p:notesMasterIdLst>
-    <p:notesMasterId r:id="rId18"/>
+    <p:notesMasterId r:id="rId20"/>
   </p:notesMasterIdLst>
   <p:sldIdLst>
     <p:sldId id="257" r:id="rId2"/>
@@ -24,6 +24,8 @@
     <p:sldId id="269" r:id="rId15"/>
     <p:sldId id="271" r:id="rId16"/>
     <p:sldId id="270" r:id="rId17"/>
+    <p:sldId id="272" r:id="rId18"/>
+    <p:sldId id="273" r:id="rId19"/>
   </p:sldIdLst>
   <p:sldSz cx="9144000" cy="6858000" type="screen4x3"/>
   <p:notesSz cx="6858000" cy="9144000"/>
@@ -224,7 +226,7 @@
           <a:p>
             <a:fld id="{CD863C69-6AC4-4515-84BB-C614EE551B82}" type="datetimeFigureOut">
               <a:rPr lang="ru-RU" smtClean="0"/>
-              <a:t>26.07.2019</a:t>
+              <a:t>27.07.2019</a:t>
             </a:fld>
             <a:endParaRPr lang="ru-RU"/>
           </a:p>
@@ -622,7 +624,7 @@
           <a:p>
             <a:fld id="{BF38C05E-219E-4729-9909-5B693F1E4DB2}" type="datetime1">
               <a:rPr lang="ru-RU" smtClean="0"/>
-              <a:t>26.07.2019</a:t>
+              <a:t>27.07.2019</a:t>
             </a:fld>
             <a:endParaRPr lang="ru-RU"/>
           </a:p>
@@ -792,7 +794,7 @@
           <a:p>
             <a:fld id="{E587BD1D-74D3-449F-A3CA-F47BBACDADC1}" type="datetime1">
               <a:rPr lang="ru-RU" smtClean="0"/>
-              <a:t>26.07.2019</a:t>
+              <a:t>27.07.2019</a:t>
             </a:fld>
             <a:endParaRPr lang="ru-RU"/>
           </a:p>
@@ -972,7 +974,7 @@
           <a:p>
             <a:fld id="{F156E365-3C59-403F-A598-8903968D44C1}" type="datetime1">
               <a:rPr lang="ru-RU" smtClean="0"/>
-              <a:t>26.07.2019</a:t>
+              <a:t>27.07.2019</a:t>
             </a:fld>
             <a:endParaRPr lang="ru-RU"/>
           </a:p>
@@ -1142,7 +1144,7 @@
           <a:p>
             <a:fld id="{D71D973D-7295-497C-A5AE-B81A0C1EA542}" type="datetime1">
               <a:rPr lang="ru-RU" smtClean="0"/>
-              <a:t>26.07.2019</a:t>
+              <a:t>27.07.2019</a:t>
             </a:fld>
             <a:endParaRPr lang="ru-RU"/>
           </a:p>
@@ -1386,7 +1388,7 @@
           <a:p>
             <a:fld id="{D43ACA65-1DF0-4542-9513-2573006F2B09}" type="datetime1">
               <a:rPr lang="ru-RU" smtClean="0"/>
-              <a:t>26.07.2019</a:t>
+              <a:t>27.07.2019</a:t>
             </a:fld>
             <a:endParaRPr lang="ru-RU"/>
           </a:p>
@@ -1618,7 +1620,7 @@
           <a:p>
             <a:fld id="{CE5D4F0D-BE92-42E2-AC19-D4AE919B8EEA}" type="datetime1">
               <a:rPr lang="ru-RU" smtClean="0"/>
-              <a:t>26.07.2019</a:t>
+              <a:t>27.07.2019</a:t>
             </a:fld>
             <a:endParaRPr lang="ru-RU"/>
           </a:p>
@@ -1985,7 +1987,7 @@
           <a:p>
             <a:fld id="{31712A4F-404C-4E2A-B048-29FEE1F56BCC}" type="datetime1">
               <a:rPr lang="ru-RU" smtClean="0"/>
-              <a:t>26.07.2019</a:t>
+              <a:t>27.07.2019</a:t>
             </a:fld>
             <a:endParaRPr lang="ru-RU"/>
           </a:p>
@@ -2103,7 +2105,7 @@
           <a:p>
             <a:fld id="{A591E32F-21C9-4A73-9D8C-CB8422C8AD99}" type="datetime1">
               <a:rPr lang="ru-RU" smtClean="0"/>
-              <a:t>26.07.2019</a:t>
+              <a:t>27.07.2019</a:t>
             </a:fld>
             <a:endParaRPr lang="ru-RU"/>
           </a:p>
@@ -2198,7 +2200,7 @@
           <a:p>
             <a:fld id="{E8BE7035-4758-4463-AF71-B436150BF40F}" type="datetime1">
               <a:rPr lang="ru-RU" smtClean="0"/>
-              <a:t>26.07.2019</a:t>
+              <a:t>27.07.2019</a:t>
             </a:fld>
             <a:endParaRPr lang="ru-RU"/>
           </a:p>
@@ -2475,7 +2477,7 @@
           <a:p>
             <a:fld id="{8BF22BB4-229E-48DC-A891-0BD3792CC568}" type="datetime1">
               <a:rPr lang="ru-RU" smtClean="0"/>
-              <a:t>26.07.2019</a:t>
+              <a:t>27.07.2019</a:t>
             </a:fld>
             <a:endParaRPr lang="ru-RU"/>
           </a:p>
@@ -2732,7 +2734,7 @@
           <a:p>
             <a:fld id="{B32F65DE-1A63-4DFF-816D-2C4DB2F0AABF}" type="datetime1">
               <a:rPr lang="ru-RU" smtClean="0"/>
-              <a:t>26.07.2019</a:t>
+              <a:t>27.07.2019</a:t>
             </a:fld>
             <a:endParaRPr lang="ru-RU"/>
           </a:p>
@@ -2945,7 +2947,7 @@
           <a:p>
             <a:fld id="{58F37F58-E97F-4EAB-9CA9-C9A7312871A5}" type="datetime1">
               <a:rPr lang="ru-RU" smtClean="0"/>
-              <a:t>26.07.2019</a:t>
+              <a:t>27.07.2019</a:t>
             </a:fld>
             <a:endParaRPr lang="ru-RU"/>
           </a:p>
@@ -5240,7 +5242,31 @@
                   <a:srgbClr val="00B0F0"/>
                 </a:solidFill>
               </a:rPr>
-              <a:t>Poisson Distribution</a:t>
+              <a:t>Poisson </a:t>
+            </a:r>
+            <a:r>
+              <a:rPr lang="en-US" sz="2400" b="1" dirty="0" smtClean="0">
+                <a:solidFill>
+                  <a:srgbClr val="00B0F0"/>
+                </a:solidFill>
+              </a:rPr>
+              <a:t>Distribution (</a:t>
+            </a:r>
+            <a:r>
+              <a:rPr lang="en-US" sz="2400" b="1" dirty="0" err="1" smtClean="0">
+                <a:solidFill>
+                  <a:srgbClr val="00B0F0"/>
+                </a:solidFill>
+              </a:rPr>
+              <a:t>descrete</a:t>
+            </a:r>
+            <a:r>
+              <a:rPr lang="en-US" sz="2400" b="1" dirty="0" smtClean="0">
+                <a:solidFill>
+                  <a:srgbClr val="00B0F0"/>
+                </a:solidFill>
+              </a:rPr>
+              <a:t>)</a:t>
             </a:r>
             <a:endParaRPr lang="ru-RU" sz="2400" b="1" dirty="0">
               <a:solidFill>
@@ -5440,7 +5466,7 @@
         </p:spPr>
         <p:txBody>
           <a:bodyPr vert="horz" lIns="91440" tIns="45720" rIns="91440" bIns="45720" rtlCol="0" anchor="ctr">
-            <a:normAutofit fontScale="75000" lnSpcReduction="20000"/>
+            <a:normAutofit fontScale="82500" lnSpcReduction="20000"/>
           </a:bodyPr>
           <a:lstStyle>
             <a:lvl1pPr algn="l" defTabSz="914400" rtl="0" eaLnBrk="1" latinLnBrk="0" hangingPunct="1">
@@ -5803,6 +5829,649 @@
     <p:extLst>
       <p:ext uri="{BB962C8B-B14F-4D97-AF65-F5344CB8AC3E}">
         <p14:creationId xmlns:p14="http://schemas.microsoft.com/office/powerpoint/2010/main" val="1787590485"/>
+      </p:ext>
+    </p:extLst>
+  </p:cSld>
+  <p:clrMapOvr>
+    <a:masterClrMapping/>
+  </p:clrMapOvr>
+</p:sld>
+</file>
+
+<file path=ppt/slides/slide17.xml><?xml version="1.0" encoding="utf-8"?>
+<p:sld xmlns:a="http://schemas.openxmlformats.org/drawingml/2006/main" xmlns:r="http://schemas.openxmlformats.org/officeDocument/2006/relationships" xmlns:p="http://schemas.openxmlformats.org/presentationml/2006/main">
+  <p:cSld>
+    <p:spTree>
+      <p:nvGrpSpPr>
+        <p:cNvPr id="1" name=""/>
+        <p:cNvGrpSpPr/>
+        <p:nvPr/>
+      </p:nvGrpSpPr>
+      <p:grpSpPr>
+        <a:xfrm>
+          <a:off x="0" y="0"/>
+          <a:ext cx="0" cy="0"/>
+          <a:chOff x="0" y="0"/>
+          <a:chExt cx="0" cy="0"/>
+        </a:xfrm>
+      </p:grpSpPr>
+      <p:sp>
+        <p:nvSpPr>
+          <p:cNvPr id="4" name="Номер слайда 3"/>
+          <p:cNvSpPr>
+            <a:spLocks noGrp="1"/>
+          </p:cNvSpPr>
+          <p:nvPr>
+            <p:ph type="sldNum" sz="quarter" idx="12"/>
+          </p:nvPr>
+        </p:nvSpPr>
+        <p:spPr/>
+        <p:txBody>
+          <a:bodyPr/>
+          <a:lstStyle/>
+          <a:p>
+            <a:fld id="{C936BD1D-689F-4FB2-8C94-2D2423F07E62}" type="slidenum">
+              <a:rPr lang="ru-RU" smtClean="0"/>
+              <a:t>17</a:t>
+            </a:fld>
+            <a:endParaRPr lang="ru-RU"/>
+          </a:p>
+        </p:txBody>
+      </p:sp>
+      <p:sp>
+        <p:nvSpPr>
+          <p:cNvPr id="5" name="Заголовок 1">
+            <a:extLst>
+              <a:ext uri="{FF2B5EF4-FFF2-40B4-BE49-F238E27FC236}">
+                <a16:creationId xmlns:a16="http://schemas.microsoft.com/office/drawing/2014/main" id="{1FA74852-421A-4D53-877F-561791F4B39C}"/>
+              </a:ext>
+            </a:extLst>
+          </p:cNvPr>
+          <p:cNvSpPr txBox="1">
+            <a:spLocks/>
+          </p:cNvSpPr>
+          <p:nvPr/>
+        </p:nvSpPr>
+        <p:spPr>
+          <a:xfrm>
+            <a:off x="315822" y="135712"/>
+            <a:ext cx="7886700" cy="315911"/>
+          </a:xfrm>
+          <a:prstGeom prst="rect">
+            <a:avLst/>
+          </a:prstGeom>
+        </p:spPr>
+        <p:txBody>
+          <a:bodyPr vert="horz" lIns="91440" tIns="45720" rIns="91440" bIns="45720" rtlCol="0" anchor="ctr">
+            <a:normAutofit fontScale="82500" lnSpcReduction="20000"/>
+          </a:bodyPr>
+          <a:lstStyle>
+            <a:lvl1pPr algn="l" defTabSz="914400" rtl="0" eaLnBrk="1" latinLnBrk="0" hangingPunct="1">
+              <a:lnSpc>
+                <a:spcPct val="90000"/>
+              </a:lnSpc>
+              <a:spcBef>
+                <a:spcPct val="0"/>
+              </a:spcBef>
+              <a:buNone/>
+              <a:defRPr sz="4400" kern="1200">
+                <a:solidFill>
+                  <a:schemeClr val="tx1"/>
+                </a:solidFill>
+                <a:latin typeface="+mj-lt"/>
+                <a:ea typeface="+mj-ea"/>
+                <a:cs typeface="+mj-cs"/>
+              </a:defRPr>
+            </a:lvl1pPr>
+          </a:lstStyle>
+          <a:p>
+            <a:pPr algn="ctr"/>
+            <a:r>
+              <a:rPr lang="en-US" sz="2400" b="1" dirty="0" smtClean="0">
+                <a:solidFill>
+                  <a:srgbClr val="00B0F0"/>
+                </a:solidFill>
+              </a:rPr>
+              <a:t>Binomial Distribution (</a:t>
+            </a:r>
+            <a:r>
+              <a:rPr lang="en-US" sz="2400" b="1" dirty="0" err="1" smtClean="0">
+                <a:solidFill>
+                  <a:srgbClr val="00B0F0"/>
+                </a:solidFill>
+              </a:rPr>
+              <a:t>descrete</a:t>
+            </a:r>
+            <a:r>
+              <a:rPr lang="en-US" sz="2400" b="1" dirty="0" smtClean="0">
+                <a:solidFill>
+                  <a:srgbClr val="00B0F0"/>
+                </a:solidFill>
+              </a:rPr>
+              <a:t>)</a:t>
+            </a:r>
+            <a:endParaRPr lang="ru-RU" sz="2400" b="1" dirty="0">
+              <a:solidFill>
+                <a:srgbClr val="00B0F0"/>
+              </a:solidFill>
+            </a:endParaRPr>
+          </a:p>
+        </p:txBody>
+      </p:sp>
+      <p:pic>
+        <p:nvPicPr>
+          <p:cNvPr id="7" name="Рисунок 6"/>
+          <p:cNvPicPr>
+            <a:picLocks noChangeAspect="1"/>
+          </p:cNvPicPr>
+          <p:nvPr/>
+        </p:nvPicPr>
+        <p:blipFill>
+          <a:blip r:embed="rId2"/>
+          <a:stretch>
+            <a:fillRect/>
+          </a:stretch>
+        </p:blipFill>
+        <p:spPr>
+          <a:xfrm>
+            <a:off x="315822" y="561079"/>
+            <a:ext cx="7102561" cy="815048"/>
+          </a:xfrm>
+          <a:prstGeom prst="rect">
+            <a:avLst/>
+          </a:prstGeom>
+        </p:spPr>
+      </p:pic>
+      <p:pic>
+        <p:nvPicPr>
+          <p:cNvPr id="8" name="Рисунок 7"/>
+          <p:cNvPicPr>
+            <a:picLocks noChangeAspect="1"/>
+          </p:cNvPicPr>
+          <p:nvPr/>
+        </p:nvPicPr>
+        <p:blipFill>
+          <a:blip r:embed="rId3"/>
+          <a:stretch>
+            <a:fillRect/>
+          </a:stretch>
+        </p:blipFill>
+        <p:spPr>
+          <a:xfrm>
+            <a:off x="315822" y="1199679"/>
+            <a:ext cx="1905000" cy="819150"/>
+          </a:xfrm>
+          <a:prstGeom prst="rect">
+            <a:avLst/>
+          </a:prstGeom>
+        </p:spPr>
+      </p:pic>
+      <p:pic>
+        <p:nvPicPr>
+          <p:cNvPr id="9" name="Рисунок 8"/>
+          <p:cNvPicPr>
+            <a:picLocks noChangeAspect="1"/>
+          </p:cNvPicPr>
+          <p:nvPr/>
+        </p:nvPicPr>
+        <p:blipFill>
+          <a:blip r:embed="rId4"/>
+          <a:stretch>
+            <a:fillRect/>
+          </a:stretch>
+        </p:blipFill>
+        <p:spPr>
+          <a:xfrm>
+            <a:off x="315822" y="2014728"/>
+            <a:ext cx="8574681" cy="449328"/>
+          </a:xfrm>
+          <a:prstGeom prst="rect">
+            <a:avLst/>
+          </a:prstGeom>
+        </p:spPr>
+      </p:pic>
+      <p:pic>
+        <p:nvPicPr>
+          <p:cNvPr id="10" name="Рисунок 9"/>
+          <p:cNvPicPr>
+            <a:picLocks noChangeAspect="1"/>
+          </p:cNvPicPr>
+          <p:nvPr/>
+        </p:nvPicPr>
+        <p:blipFill>
+          <a:blip r:embed="rId5"/>
+          <a:stretch>
+            <a:fillRect/>
+          </a:stretch>
+        </p:blipFill>
+        <p:spPr>
+          <a:xfrm>
+            <a:off x="300398" y="2464056"/>
+            <a:ext cx="3840847" cy="2687366"/>
+          </a:xfrm>
+          <a:prstGeom prst="rect">
+            <a:avLst/>
+          </a:prstGeom>
+        </p:spPr>
+      </p:pic>
+      <p:sp>
+        <p:nvSpPr>
+          <p:cNvPr id="11" name="Прямоугольник 10"/>
+          <p:cNvSpPr/>
+          <p:nvPr/>
+        </p:nvSpPr>
+        <p:spPr>
+          <a:xfrm>
+            <a:off x="4141245" y="2672229"/>
+            <a:ext cx="4572000" cy="1754326"/>
+          </a:xfrm>
+          <a:prstGeom prst="rect">
+            <a:avLst/>
+          </a:prstGeom>
+        </p:spPr>
+        <p:txBody>
+          <a:bodyPr>
+            <a:spAutoFit/>
+          </a:bodyPr>
+          <a:lstStyle/>
+          <a:p>
+            <a:pPr algn="just"/>
+            <a:r>
+              <a:rPr lang="en-US" b="1" dirty="0">
+                <a:solidFill>
+                  <a:srgbClr val="333333"/>
+                </a:solidFill>
+                <a:latin typeface="Nunito Sans"/>
+              </a:rPr>
+              <a:t>Binomial </a:t>
+            </a:r>
+            <a:r>
+              <a:rPr lang="en-US" b="1" dirty="0" smtClean="0">
+                <a:solidFill>
+                  <a:srgbClr val="333333"/>
+                </a:solidFill>
+                <a:latin typeface="Nunito Sans"/>
+              </a:rPr>
+              <a:t>distribution</a:t>
+            </a:r>
+            <a:r>
+              <a:rPr lang="en-US" dirty="0" smtClean="0"/>
+              <a:t> </a:t>
+            </a:r>
+            <a:r>
+              <a:rPr lang="en-US" dirty="0"/>
+              <a:t>can be applied whenever you're talking about the number of successes in a fixed number of independent trials, with the same fixed probability of success on each trial. </a:t>
+            </a:r>
+            <a:r>
+              <a:rPr lang="en-US" dirty="0" smtClean="0"/>
+              <a:t> </a:t>
+            </a:r>
+            <a:r>
+              <a:rPr lang="en-US" dirty="0"/>
+              <a:t>"fixed" means not random.</a:t>
+            </a:r>
+            <a:endParaRPr lang="ru-RU" dirty="0"/>
+          </a:p>
+        </p:txBody>
+      </p:sp>
+    </p:spTree>
+    <p:extLst>
+      <p:ext uri="{BB962C8B-B14F-4D97-AF65-F5344CB8AC3E}">
+        <p14:creationId xmlns:p14="http://schemas.microsoft.com/office/powerpoint/2010/main" val="1270886787"/>
+      </p:ext>
+    </p:extLst>
+  </p:cSld>
+  <p:clrMapOvr>
+    <a:masterClrMapping/>
+  </p:clrMapOvr>
+</p:sld>
+</file>
+
+<file path=ppt/slides/slide18.xml><?xml version="1.0" encoding="utf-8"?>
+<p:sld xmlns:a="http://schemas.openxmlformats.org/drawingml/2006/main" xmlns:r="http://schemas.openxmlformats.org/officeDocument/2006/relationships" xmlns:p="http://schemas.openxmlformats.org/presentationml/2006/main">
+  <p:cSld>
+    <p:spTree>
+      <p:nvGrpSpPr>
+        <p:cNvPr id="1" name=""/>
+        <p:cNvGrpSpPr/>
+        <p:nvPr/>
+      </p:nvGrpSpPr>
+      <p:grpSpPr>
+        <a:xfrm>
+          <a:off x="0" y="0"/>
+          <a:ext cx="0" cy="0"/>
+          <a:chOff x="0" y="0"/>
+          <a:chExt cx="0" cy="0"/>
+        </a:xfrm>
+      </p:grpSpPr>
+      <p:sp>
+        <p:nvSpPr>
+          <p:cNvPr id="4" name="Номер слайда 3"/>
+          <p:cNvSpPr>
+            <a:spLocks noGrp="1"/>
+          </p:cNvSpPr>
+          <p:nvPr>
+            <p:ph type="sldNum" sz="quarter" idx="12"/>
+          </p:nvPr>
+        </p:nvSpPr>
+        <p:spPr/>
+        <p:txBody>
+          <a:bodyPr/>
+          <a:lstStyle/>
+          <a:p>
+            <a:fld id="{C936BD1D-689F-4FB2-8C94-2D2423F07E62}" type="slidenum">
+              <a:rPr lang="ru-RU" smtClean="0"/>
+              <a:t>18</a:t>
+            </a:fld>
+            <a:endParaRPr lang="ru-RU"/>
+          </a:p>
+        </p:txBody>
+      </p:sp>
+      <p:sp>
+        <p:nvSpPr>
+          <p:cNvPr id="6" name="Заголовок 1">
+            <a:extLst>
+              <a:ext uri="{FF2B5EF4-FFF2-40B4-BE49-F238E27FC236}">
+                <a16:creationId xmlns:a16="http://schemas.microsoft.com/office/drawing/2014/main" id="{1FA74852-421A-4D53-877F-561791F4B39C}"/>
+              </a:ext>
+            </a:extLst>
+          </p:cNvPr>
+          <p:cNvSpPr txBox="1">
+            <a:spLocks noGrp="1"/>
+          </p:cNvSpPr>
+          <p:nvPr>
+            <p:ph type="title"/>
+          </p:nvPr>
+        </p:nvSpPr>
+        <p:spPr>
+          <a:xfrm>
+            <a:off x="628650" y="175003"/>
+            <a:ext cx="7886700" cy="331991"/>
+          </a:xfrm>
+          <a:prstGeom prst="rect">
+            <a:avLst/>
+          </a:prstGeom>
+        </p:spPr>
+        <p:txBody>
+          <a:bodyPr vert="horz" lIns="91440" tIns="45720" rIns="91440" bIns="45720" rtlCol="0" anchor="ctr">
+            <a:normAutofit fontScale="90000"/>
+          </a:bodyPr>
+          <a:lstStyle>
+            <a:lvl1pPr algn="l" defTabSz="914400" rtl="0" eaLnBrk="1" latinLnBrk="0" hangingPunct="1">
+              <a:lnSpc>
+                <a:spcPct val="90000"/>
+              </a:lnSpc>
+              <a:spcBef>
+                <a:spcPct val="0"/>
+              </a:spcBef>
+              <a:buNone/>
+              <a:defRPr sz="4400" kern="1200">
+                <a:solidFill>
+                  <a:schemeClr val="tx1"/>
+                </a:solidFill>
+                <a:latin typeface="+mj-lt"/>
+                <a:ea typeface="+mj-ea"/>
+                <a:cs typeface="+mj-cs"/>
+              </a:defRPr>
+            </a:lvl1pPr>
+          </a:lstStyle>
+          <a:p>
+            <a:pPr algn="ctr"/>
+            <a:r>
+              <a:rPr lang="en-US" sz="2400" b="1" dirty="0" smtClean="0">
+                <a:solidFill>
+                  <a:srgbClr val="00B0F0"/>
+                </a:solidFill>
+              </a:rPr>
+              <a:t>Log-Normal Distribution</a:t>
+            </a:r>
+            <a:endParaRPr lang="ru-RU" sz="2400" b="1" dirty="0">
+              <a:solidFill>
+                <a:srgbClr val="00B0F0"/>
+              </a:solidFill>
+            </a:endParaRPr>
+          </a:p>
+        </p:txBody>
+      </p:sp>
+      <p:pic>
+        <p:nvPicPr>
+          <p:cNvPr id="8" name="Рисунок 7"/>
+          <p:cNvPicPr>
+            <a:picLocks noChangeAspect="1"/>
+          </p:cNvPicPr>
+          <p:nvPr/>
+        </p:nvPicPr>
+        <p:blipFill>
+          <a:blip r:embed="rId2"/>
+          <a:stretch>
+            <a:fillRect/>
+          </a:stretch>
+        </p:blipFill>
+        <p:spPr>
+          <a:xfrm>
+            <a:off x="193847" y="697635"/>
+            <a:ext cx="3119721" cy="3155477"/>
+          </a:xfrm>
+          <a:prstGeom prst="rect">
+            <a:avLst/>
+          </a:prstGeom>
+        </p:spPr>
+      </p:pic>
+      <p:pic>
+        <p:nvPicPr>
+          <p:cNvPr id="9" name="Рисунок 8"/>
+          <p:cNvPicPr>
+            <a:picLocks noChangeAspect="1"/>
+          </p:cNvPicPr>
+          <p:nvPr/>
+        </p:nvPicPr>
+        <p:blipFill>
+          <a:blip r:embed="rId3"/>
+          <a:stretch>
+            <a:fillRect/>
+          </a:stretch>
+        </p:blipFill>
+        <p:spPr>
+          <a:xfrm>
+            <a:off x="3154236" y="697635"/>
+            <a:ext cx="2187309" cy="514661"/>
+          </a:xfrm>
+          <a:prstGeom prst="rect">
+            <a:avLst/>
+          </a:prstGeom>
+        </p:spPr>
+      </p:pic>
+      <p:sp>
+        <p:nvSpPr>
+          <p:cNvPr id="32" name="AutoShape 25" descr="\log _{a}(Y)"/>
+          <p:cNvSpPr>
+            <a:spLocks noChangeAspect="1" noChangeArrowheads="1"/>
+          </p:cNvSpPr>
+          <p:nvPr/>
+        </p:nvSpPr>
+        <p:spPr bwMode="auto">
+          <a:xfrm>
+            <a:off x="5184775" y="-144463"/>
+            <a:ext cx="304800" cy="304801"/>
+          </a:xfrm>
+          <a:prstGeom prst="rect">
+            <a:avLst/>
+          </a:prstGeom>
+          <a:noFill/>
+          <a:extLst>
+            <a:ext uri="{909E8E84-426E-40DD-AFC4-6F175D3DCCD1}">
+              <a14:hiddenFill xmlns:a14="http://schemas.microsoft.com/office/drawing/2010/main">
+                <a:solidFill>
+                  <a:srgbClr val="FFFFFF"/>
+                </a:solidFill>
+              </a14:hiddenFill>
+            </a:ext>
+          </a:extLst>
+        </p:spPr>
+        <p:txBody>
+          <a:bodyPr vert="horz" wrap="square" lIns="91440" tIns="45720" rIns="91440" bIns="45720" numCol="1" anchor="t" anchorCtr="0" compatLnSpc="1">
+            <a:prstTxWarp prst="textNoShape">
+              <a:avLst/>
+            </a:prstTxWarp>
+          </a:bodyPr>
+          <a:lstStyle/>
+          <a:p>
+            <a:endParaRPr lang="ru-RU"/>
+          </a:p>
+        </p:txBody>
+      </p:sp>
+      <p:sp>
+        <p:nvSpPr>
+          <p:cNvPr id="33" name="AutoShape 26" descr="\log _{b}(Y)"/>
+          <p:cNvSpPr>
+            <a:spLocks noChangeAspect="1" noChangeArrowheads="1"/>
+          </p:cNvSpPr>
+          <p:nvPr/>
+        </p:nvSpPr>
+        <p:spPr bwMode="auto">
+          <a:xfrm>
+            <a:off x="7189788" y="-144463"/>
+            <a:ext cx="304800" cy="304801"/>
+          </a:xfrm>
+          <a:prstGeom prst="rect">
+            <a:avLst/>
+          </a:prstGeom>
+          <a:noFill/>
+          <a:extLst>
+            <a:ext uri="{909E8E84-426E-40DD-AFC4-6F175D3DCCD1}">
+              <a14:hiddenFill xmlns:a14="http://schemas.microsoft.com/office/drawing/2010/main">
+                <a:solidFill>
+                  <a:srgbClr val="FFFFFF"/>
+                </a:solidFill>
+              </a14:hiddenFill>
+            </a:ext>
+          </a:extLst>
+        </p:spPr>
+        <p:txBody>
+          <a:bodyPr vert="horz" wrap="square" lIns="91440" tIns="45720" rIns="91440" bIns="45720" numCol="1" anchor="t" anchorCtr="0" compatLnSpc="1">
+            <a:prstTxWarp prst="textNoShape">
+              <a:avLst/>
+            </a:prstTxWarp>
+          </a:bodyPr>
+          <a:lstStyle/>
+          <a:p>
+            <a:endParaRPr lang="ru-RU"/>
+          </a:p>
+        </p:txBody>
+      </p:sp>
+      <p:sp>
+        <p:nvSpPr>
+          <p:cNvPr id="34" name="AutoShape 27" descr="a,b\neq 1"/>
+          <p:cNvSpPr>
+            <a:spLocks noChangeAspect="1" noChangeArrowheads="1"/>
+          </p:cNvSpPr>
+          <p:nvPr/>
+        </p:nvSpPr>
+        <p:spPr bwMode="auto">
+          <a:xfrm>
+            <a:off x="9004300" y="-144463"/>
+            <a:ext cx="304800" cy="304801"/>
+          </a:xfrm>
+          <a:prstGeom prst="rect">
+            <a:avLst/>
+          </a:prstGeom>
+          <a:noFill/>
+          <a:extLst>
+            <a:ext uri="{909E8E84-426E-40DD-AFC4-6F175D3DCCD1}">
+              <a14:hiddenFill xmlns:a14="http://schemas.microsoft.com/office/drawing/2010/main">
+                <a:solidFill>
+                  <a:srgbClr val="FFFFFF"/>
+                </a:solidFill>
+              </a14:hiddenFill>
+            </a:ext>
+          </a:extLst>
+        </p:spPr>
+        <p:txBody>
+          <a:bodyPr vert="horz" wrap="square" lIns="91440" tIns="45720" rIns="91440" bIns="45720" numCol="1" anchor="t" anchorCtr="0" compatLnSpc="1">
+            <a:prstTxWarp prst="textNoShape">
+              <a:avLst/>
+            </a:prstTxWarp>
+          </a:bodyPr>
+          <a:lstStyle/>
+          <a:p>
+            <a:endParaRPr lang="ru-RU"/>
+          </a:p>
+        </p:txBody>
+      </p:sp>
+      <p:sp>
+        <p:nvSpPr>
+          <p:cNvPr id="35" name="AutoShape 28" descr="e^{X}"/>
+          <p:cNvSpPr>
+            <a:spLocks noChangeAspect="1" noChangeArrowheads="1"/>
+          </p:cNvSpPr>
+          <p:nvPr/>
+        </p:nvSpPr>
+        <p:spPr bwMode="auto">
+          <a:xfrm>
+            <a:off x="9829800" y="-144463"/>
+            <a:ext cx="304800" cy="304801"/>
+          </a:xfrm>
+          <a:prstGeom prst="rect">
+            <a:avLst/>
+          </a:prstGeom>
+          <a:noFill/>
+          <a:extLst>
+            <a:ext uri="{909E8E84-426E-40DD-AFC4-6F175D3DCCD1}">
+              <a14:hiddenFill xmlns:a14="http://schemas.microsoft.com/office/drawing/2010/main">
+                <a:solidFill>
+                  <a:srgbClr val="FFFFFF"/>
+                </a:solidFill>
+              </a14:hiddenFill>
+            </a:ext>
+          </a:extLst>
+        </p:spPr>
+        <p:txBody>
+          <a:bodyPr vert="horz" wrap="square" lIns="91440" tIns="45720" rIns="91440" bIns="45720" numCol="1" anchor="t" anchorCtr="0" compatLnSpc="1">
+            <a:prstTxWarp prst="textNoShape">
+              <a:avLst/>
+            </a:prstTxWarp>
+          </a:bodyPr>
+          <a:lstStyle/>
+          <a:p>
+            <a:endParaRPr lang="ru-RU"/>
+          </a:p>
+        </p:txBody>
+      </p:sp>
+      <p:sp>
+        <p:nvSpPr>
+          <p:cNvPr id="50" name="Прямоугольник 49"/>
+          <p:cNvSpPr/>
+          <p:nvPr/>
+        </p:nvSpPr>
+        <p:spPr>
+          <a:xfrm>
+            <a:off x="3499164" y="1402937"/>
+            <a:ext cx="5400391" cy="369332"/>
+          </a:xfrm>
+          <a:prstGeom prst="rect">
+            <a:avLst/>
+          </a:prstGeom>
+        </p:spPr>
+        <p:txBody>
+          <a:bodyPr wrap="square">
+            <a:spAutoFit/>
+          </a:bodyPr>
+          <a:lstStyle/>
+          <a:p>
+            <a:r>
+              <a:rPr lang="en-US" dirty="0">
+                <a:hlinkClick r:id="rId4"/>
+              </a:rPr>
+              <a:t>https://en.wikipedia.org/wiki/Log-normal_distribution</a:t>
+            </a:r>
+            <a:endParaRPr lang="ru-RU" dirty="0"/>
+          </a:p>
+        </p:txBody>
+      </p:sp>
+    </p:spTree>
+    <p:extLst>
+      <p:ext uri="{BB962C8B-B14F-4D97-AF65-F5344CB8AC3E}">
+        <p14:creationId xmlns:p14="http://schemas.microsoft.com/office/powerpoint/2010/main" val="262330563"/>
       </p:ext>
     </p:extLst>
   </p:cSld>

</xml_diff>